<commit_message>
added 2 slides in ppt (History)
- Added 2 slides in ppt referring History
- Created a presentation resources folder where all the pictures, videos and resources used in presentation file will be placed.
</commit_message>
<xml_diff>
--- a/extreme_programming.pptx
+++ b/extreme_programming.pptx
@@ -4,8 +4,13 @@
   <p:sldMasterIdLst>
     <p:sldMasterId id="2147483648" r:id="rId1"/>
   </p:sldMasterIdLst>
+  <p:notesMasterIdLst>
+    <p:notesMasterId r:id="rId5"/>
+  </p:notesMasterIdLst>
   <p:sldIdLst>
     <p:sldId id="256" r:id="rId2"/>
+    <p:sldId id="257" r:id="rId3"/>
+    <p:sldId id="258" r:id="rId4"/>
   </p:sldIdLst>
   <p:sldSz cx="12192000" cy="6858000"/>
   <p:notesSz cx="6858000" cy="9144000"/>
@@ -104,7 +109,534 @@
       </a:defRPr>
     </a:lvl9pPr>
   </p:defaultTextStyle>
+  <p:extLst>
+    <p:ext uri="{EFAFB233-063F-42B5-8137-9DF3F51BA10A}">
+      <p15:sldGuideLst xmlns:p15="http://schemas.microsoft.com/office/powerpoint/2012/main"/>
+    </p:ext>
+  </p:extLst>
 </p:presentation>
+</file>
+
+<file path=ppt/notesMasters/notesMaster1.xml><?xml version="1.0" encoding="utf-8"?>
+<p:notesMaster xmlns:a="http://schemas.openxmlformats.org/drawingml/2006/main" xmlns:r="http://schemas.openxmlformats.org/officeDocument/2006/relationships" xmlns:p="http://schemas.openxmlformats.org/presentationml/2006/main">
+  <p:cSld>
+    <p:bg>
+      <p:bgRef idx="1001">
+        <a:schemeClr val="bg1"/>
+      </p:bgRef>
+    </p:bg>
+    <p:spTree>
+      <p:nvGrpSpPr>
+        <p:cNvPr id="1" name=""/>
+        <p:cNvGrpSpPr/>
+        <p:nvPr/>
+      </p:nvGrpSpPr>
+      <p:grpSpPr>
+        <a:xfrm>
+          <a:off x="0" y="0"/>
+          <a:ext cx="0" cy="0"/>
+          <a:chOff x="0" y="0"/>
+          <a:chExt cx="0" cy="0"/>
+        </a:xfrm>
+      </p:grpSpPr>
+      <p:sp>
+        <p:nvSpPr>
+          <p:cNvPr id="2" name="Header Placeholder 1"/>
+          <p:cNvSpPr>
+            <a:spLocks noGrp="1"/>
+          </p:cNvSpPr>
+          <p:nvPr>
+            <p:ph type="hdr" sz="quarter"/>
+          </p:nvPr>
+        </p:nvSpPr>
+        <p:spPr>
+          <a:xfrm>
+            <a:off x="0" y="0"/>
+            <a:ext cx="2971800" cy="458788"/>
+          </a:xfrm>
+          <a:prstGeom prst="rect">
+            <a:avLst/>
+          </a:prstGeom>
+        </p:spPr>
+        <p:txBody>
+          <a:bodyPr vert="horz" lIns="91440" tIns="45720" rIns="91440" bIns="45720" rtlCol="0"/>
+          <a:lstStyle>
+            <a:lvl1pPr algn="l">
+              <a:defRPr sz="1200"/>
+            </a:lvl1pPr>
+          </a:lstStyle>
+          <a:p>
+            <a:endParaRPr lang="en-US"/>
+          </a:p>
+        </p:txBody>
+      </p:sp>
+      <p:sp>
+        <p:nvSpPr>
+          <p:cNvPr id="3" name="Date Placeholder 2"/>
+          <p:cNvSpPr>
+            <a:spLocks noGrp="1"/>
+          </p:cNvSpPr>
+          <p:nvPr>
+            <p:ph type="dt" idx="1"/>
+          </p:nvPr>
+        </p:nvSpPr>
+        <p:spPr>
+          <a:xfrm>
+            <a:off x="3884613" y="0"/>
+            <a:ext cx="2971800" cy="458788"/>
+          </a:xfrm>
+          <a:prstGeom prst="rect">
+            <a:avLst/>
+          </a:prstGeom>
+        </p:spPr>
+        <p:txBody>
+          <a:bodyPr vert="horz" lIns="91440" tIns="45720" rIns="91440" bIns="45720" rtlCol="0"/>
+          <a:lstStyle>
+            <a:lvl1pPr algn="r">
+              <a:defRPr sz="1200"/>
+            </a:lvl1pPr>
+          </a:lstStyle>
+          <a:p>
+            <a:fld id="{70711676-1DE2-458B-90FC-D5D4D01EA265}" type="datetimeFigureOut">
+              <a:rPr lang="en-US" smtClean="0"/>
+              <a:t>19|12|6</a:t>
+            </a:fld>
+            <a:endParaRPr lang="en-US"/>
+          </a:p>
+        </p:txBody>
+      </p:sp>
+      <p:sp>
+        <p:nvSpPr>
+          <p:cNvPr id="4" name="Slide Image Placeholder 3"/>
+          <p:cNvSpPr>
+            <a:spLocks noGrp="1" noRot="1" noChangeAspect="1"/>
+          </p:cNvSpPr>
+          <p:nvPr>
+            <p:ph type="sldImg" idx="2"/>
+          </p:nvPr>
+        </p:nvSpPr>
+        <p:spPr>
+          <a:xfrm>
+            <a:off x="685800" y="1143000"/>
+            <a:ext cx="5486400" cy="3086100"/>
+          </a:xfrm>
+          <a:prstGeom prst="rect">
+            <a:avLst/>
+          </a:prstGeom>
+          <a:noFill/>
+          <a:ln w="12700">
+            <a:solidFill>
+              <a:prstClr val="black"/>
+            </a:solidFill>
+          </a:ln>
+        </p:spPr>
+        <p:txBody>
+          <a:bodyPr vert="horz" lIns="91440" tIns="45720" rIns="91440" bIns="45720" rtlCol="0" anchor="ctr"/>
+          <a:lstStyle/>
+          <a:p>
+            <a:endParaRPr lang="en-US"/>
+          </a:p>
+        </p:txBody>
+      </p:sp>
+      <p:sp>
+        <p:nvSpPr>
+          <p:cNvPr id="5" name="Notes Placeholder 4"/>
+          <p:cNvSpPr>
+            <a:spLocks noGrp="1"/>
+          </p:cNvSpPr>
+          <p:nvPr>
+            <p:ph type="body" sz="quarter" idx="3"/>
+          </p:nvPr>
+        </p:nvSpPr>
+        <p:spPr>
+          <a:xfrm>
+            <a:off x="685800" y="4400550"/>
+            <a:ext cx="5486400" cy="3600450"/>
+          </a:xfrm>
+          <a:prstGeom prst="rect">
+            <a:avLst/>
+          </a:prstGeom>
+        </p:spPr>
+        <p:txBody>
+          <a:bodyPr vert="horz" lIns="91440" tIns="45720" rIns="91440" bIns="45720" rtlCol="0"/>
+          <a:lstStyle/>
+          <a:p>
+            <a:pPr lvl="0"/>
+            <a:r>
+              <a:rPr lang="en-US" smtClean="0"/>
+              <a:t>Click to edit Master text styles</a:t>
+            </a:r>
+          </a:p>
+          <a:p>
+            <a:pPr lvl="1"/>
+            <a:r>
+              <a:rPr lang="en-US" smtClean="0"/>
+              <a:t>Second level</a:t>
+            </a:r>
+          </a:p>
+          <a:p>
+            <a:pPr lvl="2"/>
+            <a:r>
+              <a:rPr lang="en-US" smtClean="0"/>
+              <a:t>Third level</a:t>
+            </a:r>
+          </a:p>
+          <a:p>
+            <a:pPr lvl="3"/>
+            <a:r>
+              <a:rPr lang="en-US" smtClean="0"/>
+              <a:t>Fourth level</a:t>
+            </a:r>
+          </a:p>
+          <a:p>
+            <a:pPr lvl="4"/>
+            <a:r>
+              <a:rPr lang="en-US" smtClean="0"/>
+              <a:t>Fifth level</a:t>
+            </a:r>
+            <a:endParaRPr lang="en-US"/>
+          </a:p>
+        </p:txBody>
+      </p:sp>
+      <p:sp>
+        <p:nvSpPr>
+          <p:cNvPr id="6" name="Footer Placeholder 5"/>
+          <p:cNvSpPr>
+            <a:spLocks noGrp="1"/>
+          </p:cNvSpPr>
+          <p:nvPr>
+            <p:ph type="ftr" sz="quarter" idx="4"/>
+          </p:nvPr>
+        </p:nvSpPr>
+        <p:spPr>
+          <a:xfrm>
+            <a:off x="0" y="8685213"/>
+            <a:ext cx="2971800" cy="458787"/>
+          </a:xfrm>
+          <a:prstGeom prst="rect">
+            <a:avLst/>
+          </a:prstGeom>
+        </p:spPr>
+        <p:txBody>
+          <a:bodyPr vert="horz" lIns="91440" tIns="45720" rIns="91440" bIns="45720" rtlCol="0" anchor="b"/>
+          <a:lstStyle>
+            <a:lvl1pPr algn="l">
+              <a:defRPr sz="1200"/>
+            </a:lvl1pPr>
+          </a:lstStyle>
+          <a:p>
+            <a:endParaRPr lang="en-US"/>
+          </a:p>
+        </p:txBody>
+      </p:sp>
+      <p:sp>
+        <p:nvSpPr>
+          <p:cNvPr id="7" name="Slide Number Placeholder 6"/>
+          <p:cNvSpPr>
+            <a:spLocks noGrp="1"/>
+          </p:cNvSpPr>
+          <p:nvPr>
+            <p:ph type="sldNum" sz="quarter" idx="5"/>
+          </p:nvPr>
+        </p:nvSpPr>
+        <p:spPr>
+          <a:xfrm>
+            <a:off x="3884613" y="8685213"/>
+            <a:ext cx="2971800" cy="458787"/>
+          </a:xfrm>
+          <a:prstGeom prst="rect">
+            <a:avLst/>
+          </a:prstGeom>
+        </p:spPr>
+        <p:txBody>
+          <a:bodyPr vert="horz" lIns="91440" tIns="45720" rIns="91440" bIns="45720" rtlCol="0" anchor="b"/>
+          <a:lstStyle>
+            <a:lvl1pPr algn="r">
+              <a:defRPr sz="1200"/>
+            </a:lvl1pPr>
+          </a:lstStyle>
+          <a:p>
+            <a:fld id="{76E79186-0F7F-4415-A6CE-613EF7028156}" type="slidenum">
+              <a:rPr lang="en-US" smtClean="0"/>
+              <a:t>‹#›</a:t>
+            </a:fld>
+            <a:endParaRPr lang="en-US"/>
+          </a:p>
+        </p:txBody>
+      </p:sp>
+    </p:spTree>
+    <p:extLst>
+      <p:ext uri="{BB962C8B-B14F-4D97-AF65-F5344CB8AC3E}">
+        <p14:creationId xmlns:p14="http://schemas.microsoft.com/office/powerpoint/2010/main" val="3713907381"/>
+      </p:ext>
+    </p:extLst>
+  </p:cSld>
+  <p:clrMap bg1="lt1" tx1="dk1" bg2="lt2" tx2="dk2" accent1="accent1" accent2="accent2" accent3="accent3" accent4="accent4" accent5="accent5" accent6="accent6" hlink="hlink" folHlink="folHlink"/>
+  <p:notesStyle>
+    <a:lvl1pPr marL="0" algn="l" defTabSz="914400" rtl="0" eaLnBrk="1" latinLnBrk="0" hangingPunct="1">
+      <a:defRPr sz="1200" kern="1200">
+        <a:solidFill>
+          <a:schemeClr val="tx1"/>
+        </a:solidFill>
+        <a:latin typeface="+mn-lt"/>
+        <a:ea typeface="+mn-ea"/>
+        <a:cs typeface="+mn-cs"/>
+      </a:defRPr>
+    </a:lvl1pPr>
+    <a:lvl2pPr marL="457200" algn="l" defTabSz="914400" rtl="0" eaLnBrk="1" latinLnBrk="0" hangingPunct="1">
+      <a:defRPr sz="1200" kern="1200">
+        <a:solidFill>
+          <a:schemeClr val="tx1"/>
+        </a:solidFill>
+        <a:latin typeface="+mn-lt"/>
+        <a:ea typeface="+mn-ea"/>
+        <a:cs typeface="+mn-cs"/>
+      </a:defRPr>
+    </a:lvl2pPr>
+    <a:lvl3pPr marL="914400" algn="l" defTabSz="914400" rtl="0" eaLnBrk="1" latinLnBrk="0" hangingPunct="1">
+      <a:defRPr sz="1200" kern="1200">
+        <a:solidFill>
+          <a:schemeClr val="tx1"/>
+        </a:solidFill>
+        <a:latin typeface="+mn-lt"/>
+        <a:ea typeface="+mn-ea"/>
+        <a:cs typeface="+mn-cs"/>
+      </a:defRPr>
+    </a:lvl3pPr>
+    <a:lvl4pPr marL="1371600" algn="l" defTabSz="914400" rtl="0" eaLnBrk="1" latinLnBrk="0" hangingPunct="1">
+      <a:defRPr sz="1200" kern="1200">
+        <a:solidFill>
+          <a:schemeClr val="tx1"/>
+        </a:solidFill>
+        <a:latin typeface="+mn-lt"/>
+        <a:ea typeface="+mn-ea"/>
+        <a:cs typeface="+mn-cs"/>
+      </a:defRPr>
+    </a:lvl4pPr>
+    <a:lvl5pPr marL="1828800" algn="l" defTabSz="914400" rtl="0" eaLnBrk="1" latinLnBrk="0" hangingPunct="1">
+      <a:defRPr sz="1200" kern="1200">
+        <a:solidFill>
+          <a:schemeClr val="tx1"/>
+        </a:solidFill>
+        <a:latin typeface="+mn-lt"/>
+        <a:ea typeface="+mn-ea"/>
+        <a:cs typeface="+mn-cs"/>
+      </a:defRPr>
+    </a:lvl5pPr>
+    <a:lvl6pPr marL="2286000" algn="l" defTabSz="914400" rtl="0" eaLnBrk="1" latinLnBrk="0" hangingPunct="1">
+      <a:defRPr sz="1200" kern="1200">
+        <a:solidFill>
+          <a:schemeClr val="tx1"/>
+        </a:solidFill>
+        <a:latin typeface="+mn-lt"/>
+        <a:ea typeface="+mn-ea"/>
+        <a:cs typeface="+mn-cs"/>
+      </a:defRPr>
+    </a:lvl6pPr>
+    <a:lvl7pPr marL="2743200" algn="l" defTabSz="914400" rtl="0" eaLnBrk="1" latinLnBrk="0" hangingPunct="1">
+      <a:defRPr sz="1200" kern="1200">
+        <a:solidFill>
+          <a:schemeClr val="tx1"/>
+        </a:solidFill>
+        <a:latin typeface="+mn-lt"/>
+        <a:ea typeface="+mn-ea"/>
+        <a:cs typeface="+mn-cs"/>
+      </a:defRPr>
+    </a:lvl7pPr>
+    <a:lvl8pPr marL="3200400" algn="l" defTabSz="914400" rtl="0" eaLnBrk="1" latinLnBrk="0" hangingPunct="1">
+      <a:defRPr sz="1200" kern="1200">
+        <a:solidFill>
+          <a:schemeClr val="tx1"/>
+        </a:solidFill>
+        <a:latin typeface="+mn-lt"/>
+        <a:ea typeface="+mn-ea"/>
+        <a:cs typeface="+mn-cs"/>
+      </a:defRPr>
+    </a:lvl8pPr>
+    <a:lvl9pPr marL="3657600" algn="l" defTabSz="914400" rtl="0" eaLnBrk="1" latinLnBrk="0" hangingPunct="1">
+      <a:defRPr sz="1200" kern="1200">
+        <a:solidFill>
+          <a:schemeClr val="tx1"/>
+        </a:solidFill>
+        <a:latin typeface="+mn-lt"/>
+        <a:ea typeface="+mn-ea"/>
+        <a:cs typeface="+mn-cs"/>
+      </a:defRPr>
+    </a:lvl9pPr>
+  </p:notesStyle>
+</p:notesMaster>
+</file>
+
+<file path=ppt/notesSlides/notesSlide1.xml><?xml version="1.0" encoding="utf-8"?>
+<p:notes xmlns:a="http://schemas.openxmlformats.org/drawingml/2006/main" xmlns:r="http://schemas.openxmlformats.org/officeDocument/2006/relationships" xmlns:p="http://schemas.openxmlformats.org/presentationml/2006/main">
+  <p:cSld>
+    <p:spTree>
+      <p:nvGrpSpPr>
+        <p:cNvPr id="1" name=""/>
+        <p:cNvGrpSpPr/>
+        <p:nvPr/>
+      </p:nvGrpSpPr>
+      <p:grpSpPr>
+        <a:xfrm>
+          <a:off x="0" y="0"/>
+          <a:ext cx="0" cy="0"/>
+          <a:chOff x="0" y="0"/>
+          <a:chExt cx="0" cy="0"/>
+        </a:xfrm>
+      </p:grpSpPr>
+      <p:sp>
+        <p:nvSpPr>
+          <p:cNvPr id="2" name="Slide Image Placeholder 1"/>
+          <p:cNvSpPr>
+            <a:spLocks noGrp="1" noRot="1" noChangeAspect="1"/>
+          </p:cNvSpPr>
+          <p:nvPr>
+            <p:ph type="sldImg"/>
+          </p:nvPr>
+        </p:nvSpPr>
+        <p:spPr/>
+      </p:sp>
+      <p:sp>
+        <p:nvSpPr>
+          <p:cNvPr id="3" name="Notes Placeholder 2"/>
+          <p:cNvSpPr>
+            <a:spLocks noGrp="1"/>
+          </p:cNvSpPr>
+          <p:nvPr>
+            <p:ph type="body" idx="1"/>
+          </p:nvPr>
+        </p:nvSpPr>
+        <p:spPr/>
+        <p:txBody>
+          <a:bodyPr/>
+          <a:lstStyle/>
+          <a:p>
+            <a:r>
+              <a:rPr lang="en-US" dirty="0" smtClean="0"/>
+              <a:t>START OF AASHISH! (RISE OF CONCEPT)</a:t>
+            </a:r>
+            <a:endParaRPr lang="en-US" dirty="0"/>
+          </a:p>
+        </p:txBody>
+      </p:sp>
+      <p:sp>
+        <p:nvSpPr>
+          <p:cNvPr id="4" name="Slide Number Placeholder 3"/>
+          <p:cNvSpPr>
+            <a:spLocks noGrp="1"/>
+          </p:cNvSpPr>
+          <p:nvPr>
+            <p:ph type="sldNum" sz="quarter" idx="10"/>
+          </p:nvPr>
+        </p:nvSpPr>
+        <p:spPr/>
+        <p:txBody>
+          <a:bodyPr/>
+          <a:lstStyle/>
+          <a:p>
+            <a:fld id="{76E79186-0F7F-4415-A6CE-613EF7028156}" type="slidenum">
+              <a:rPr lang="en-US" smtClean="0"/>
+              <a:t>2</a:t>
+            </a:fld>
+            <a:endParaRPr lang="en-US"/>
+          </a:p>
+        </p:txBody>
+      </p:sp>
+    </p:spTree>
+    <p:extLst>
+      <p:ext uri="{BB962C8B-B14F-4D97-AF65-F5344CB8AC3E}">
+        <p14:creationId xmlns:p14="http://schemas.microsoft.com/office/powerpoint/2010/main" val="4002730355"/>
+      </p:ext>
+    </p:extLst>
+  </p:cSld>
+  <p:clrMapOvr>
+    <a:masterClrMapping/>
+  </p:clrMapOvr>
+</p:notes>
+</file>
+
+<file path=ppt/notesSlides/notesSlide2.xml><?xml version="1.0" encoding="utf-8"?>
+<p:notes xmlns:a="http://schemas.openxmlformats.org/drawingml/2006/main" xmlns:r="http://schemas.openxmlformats.org/officeDocument/2006/relationships" xmlns:p="http://schemas.openxmlformats.org/presentationml/2006/main">
+  <p:cSld>
+    <p:spTree>
+      <p:nvGrpSpPr>
+        <p:cNvPr id="1" name=""/>
+        <p:cNvGrpSpPr/>
+        <p:nvPr/>
+      </p:nvGrpSpPr>
+      <p:grpSpPr>
+        <a:xfrm>
+          <a:off x="0" y="0"/>
+          <a:ext cx="0" cy="0"/>
+          <a:chOff x="0" y="0"/>
+          <a:chExt cx="0" cy="0"/>
+        </a:xfrm>
+      </p:grpSpPr>
+      <p:sp>
+        <p:nvSpPr>
+          <p:cNvPr id="2" name="Slide Image Placeholder 1"/>
+          <p:cNvSpPr>
+            <a:spLocks noGrp="1" noRot="1" noChangeAspect="1"/>
+          </p:cNvSpPr>
+          <p:nvPr>
+            <p:ph type="sldImg"/>
+          </p:nvPr>
+        </p:nvSpPr>
+        <p:spPr/>
+      </p:sp>
+      <p:sp>
+        <p:nvSpPr>
+          <p:cNvPr id="3" name="Notes Placeholder 2"/>
+          <p:cNvSpPr>
+            <a:spLocks noGrp="1"/>
+          </p:cNvSpPr>
+          <p:nvPr>
+            <p:ph type="body" idx="1"/>
+          </p:nvPr>
+        </p:nvSpPr>
+        <p:spPr/>
+        <p:txBody>
+          <a:bodyPr/>
+          <a:lstStyle/>
+          <a:p>
+            <a:endParaRPr lang="en-US" dirty="0"/>
+          </a:p>
+        </p:txBody>
+      </p:sp>
+      <p:sp>
+        <p:nvSpPr>
+          <p:cNvPr id="4" name="Slide Number Placeholder 3"/>
+          <p:cNvSpPr>
+            <a:spLocks noGrp="1"/>
+          </p:cNvSpPr>
+          <p:nvPr>
+            <p:ph type="sldNum" sz="quarter" idx="10"/>
+          </p:nvPr>
+        </p:nvSpPr>
+        <p:spPr/>
+        <p:txBody>
+          <a:bodyPr/>
+          <a:lstStyle/>
+          <a:p>
+            <a:fld id="{76E79186-0F7F-4415-A6CE-613EF7028156}" type="slidenum">
+              <a:rPr lang="en-US" smtClean="0"/>
+              <a:t>3</a:t>
+            </a:fld>
+            <a:endParaRPr lang="en-US"/>
+          </a:p>
+        </p:txBody>
+      </p:sp>
+    </p:spTree>
+    <p:extLst>
+      <p:ext uri="{BB962C8B-B14F-4D97-AF65-F5344CB8AC3E}">
+        <p14:creationId xmlns:p14="http://schemas.microsoft.com/office/powerpoint/2010/main" val="2799486911"/>
+      </p:ext>
+    </p:extLst>
+  </p:cSld>
+  <p:clrMapOvr>
+    <a:masterClrMapping/>
+  </p:clrMapOvr>
+</p:notes>
 </file>
 
 <file path=ppt/slideLayouts/slideLayout1.xml><?xml version="1.0" encoding="utf-8"?>
@@ -238,7 +770,7 @@
           <a:p>
             <a:fld id="{EF60C9F4-19BA-40F2-B011-90CF0A2B4916}" type="datetimeFigureOut">
               <a:rPr lang="en-US" smtClean="0"/>
-              <a:t>19|12|5</a:t>
+              <a:t>19|12|6</a:t>
             </a:fld>
             <a:endParaRPr lang="en-US"/>
           </a:p>
@@ -408,7 +940,7 @@
           <a:p>
             <a:fld id="{EF60C9F4-19BA-40F2-B011-90CF0A2B4916}" type="datetimeFigureOut">
               <a:rPr lang="en-US" smtClean="0"/>
-              <a:t>19|12|5</a:t>
+              <a:t>19|12|6</a:t>
             </a:fld>
             <a:endParaRPr lang="en-US"/>
           </a:p>
@@ -588,7 +1120,7 @@
           <a:p>
             <a:fld id="{EF60C9F4-19BA-40F2-B011-90CF0A2B4916}" type="datetimeFigureOut">
               <a:rPr lang="en-US" smtClean="0"/>
-              <a:t>19|12|5</a:t>
+              <a:t>19|12|6</a:t>
             </a:fld>
             <a:endParaRPr lang="en-US"/>
           </a:p>
@@ -758,7 +1290,7 @@
           <a:p>
             <a:fld id="{EF60C9F4-19BA-40F2-B011-90CF0A2B4916}" type="datetimeFigureOut">
               <a:rPr lang="en-US" smtClean="0"/>
-              <a:t>19|12|5</a:t>
+              <a:t>19|12|6</a:t>
             </a:fld>
             <a:endParaRPr lang="en-US"/>
           </a:p>
@@ -1004,7 +1536,7 @@
           <a:p>
             <a:fld id="{EF60C9F4-19BA-40F2-B011-90CF0A2B4916}" type="datetimeFigureOut">
               <a:rPr lang="en-US" smtClean="0"/>
-              <a:t>19|12|5</a:t>
+              <a:t>19|12|6</a:t>
             </a:fld>
             <a:endParaRPr lang="en-US"/>
           </a:p>
@@ -1236,7 +1768,7 @@
           <a:p>
             <a:fld id="{EF60C9F4-19BA-40F2-B011-90CF0A2B4916}" type="datetimeFigureOut">
               <a:rPr lang="en-US" smtClean="0"/>
-              <a:t>19|12|5</a:t>
+              <a:t>19|12|6</a:t>
             </a:fld>
             <a:endParaRPr lang="en-US"/>
           </a:p>
@@ -1603,7 +2135,7 @@
           <a:p>
             <a:fld id="{EF60C9F4-19BA-40F2-B011-90CF0A2B4916}" type="datetimeFigureOut">
               <a:rPr lang="en-US" smtClean="0"/>
-              <a:t>19|12|5</a:t>
+              <a:t>19|12|6</a:t>
             </a:fld>
             <a:endParaRPr lang="en-US"/>
           </a:p>
@@ -1721,7 +2253,7 @@
           <a:p>
             <a:fld id="{EF60C9F4-19BA-40F2-B011-90CF0A2B4916}" type="datetimeFigureOut">
               <a:rPr lang="en-US" smtClean="0"/>
-              <a:t>19|12|5</a:t>
+              <a:t>19|12|6</a:t>
             </a:fld>
             <a:endParaRPr lang="en-US"/>
           </a:p>
@@ -1816,7 +2348,7 @@
           <a:p>
             <a:fld id="{EF60C9F4-19BA-40F2-B011-90CF0A2B4916}" type="datetimeFigureOut">
               <a:rPr lang="en-US" smtClean="0"/>
-              <a:t>19|12|5</a:t>
+              <a:t>19|12|6</a:t>
             </a:fld>
             <a:endParaRPr lang="en-US"/>
           </a:p>
@@ -2093,7 +2625,7 @@
           <a:p>
             <a:fld id="{EF60C9F4-19BA-40F2-B011-90CF0A2B4916}" type="datetimeFigureOut">
               <a:rPr lang="en-US" smtClean="0"/>
-              <a:t>19|12|5</a:t>
+              <a:t>19|12|6</a:t>
             </a:fld>
             <a:endParaRPr lang="en-US"/>
           </a:p>
@@ -2346,7 +2878,7 @@
           <a:p>
             <a:fld id="{EF60C9F4-19BA-40F2-B011-90CF0A2B4916}" type="datetimeFigureOut">
               <a:rPr lang="en-US" smtClean="0"/>
-              <a:t>19|12|5</a:t>
+              <a:t>19|12|6</a:t>
             </a:fld>
             <a:endParaRPr lang="en-US"/>
           </a:p>
@@ -2559,7 +3091,7 @@
           <a:p>
             <a:fld id="{EF60C9F4-19BA-40F2-B011-90CF0A2B4916}" type="datetimeFigureOut">
               <a:rPr lang="en-US" smtClean="0"/>
-              <a:t>19|12|5</a:t>
+              <a:t>19|12|6</a:t>
             </a:fld>
             <a:endParaRPr lang="en-US"/>
           </a:p>
@@ -3103,6 +3635,824 @@
   <p:clrMapOvr>
     <a:masterClrMapping/>
   </p:clrMapOvr>
+  <p:timing>
+    <p:tnLst>
+      <p:par>
+        <p:cTn id="1" dur="indefinite" restart="never" nodeType="tmRoot"/>
+      </p:par>
+    </p:tnLst>
+  </p:timing>
+</p:sld>
+</file>
+
+<file path=ppt/slides/slide2.xml><?xml version="1.0" encoding="utf-8"?>
+<p:sld xmlns:a="http://schemas.openxmlformats.org/drawingml/2006/main" xmlns:r="http://schemas.openxmlformats.org/officeDocument/2006/relationships" xmlns:p="http://schemas.openxmlformats.org/presentationml/2006/main">
+  <p:cSld>
+    <p:spTree>
+      <p:nvGrpSpPr>
+        <p:cNvPr id="1" name=""/>
+        <p:cNvGrpSpPr/>
+        <p:nvPr/>
+      </p:nvGrpSpPr>
+      <p:grpSpPr>
+        <a:xfrm>
+          <a:off x="0" y="0"/>
+          <a:ext cx="0" cy="0"/>
+          <a:chOff x="0" y="0"/>
+          <a:chExt cx="0" cy="0"/>
+        </a:xfrm>
+      </p:grpSpPr>
+      <p:sp>
+        <p:nvSpPr>
+          <p:cNvPr id="2" name="Title 1"/>
+          <p:cNvSpPr>
+            <a:spLocks noGrp="1"/>
+          </p:cNvSpPr>
+          <p:nvPr>
+            <p:ph type="title"/>
+          </p:nvPr>
+        </p:nvSpPr>
+        <p:spPr/>
+        <p:txBody>
+          <a:bodyPr/>
+          <a:lstStyle/>
+          <a:p>
+            <a:r>
+              <a:rPr lang="en-US" dirty="0" smtClean="0"/>
+              <a:t>Rise of Extreme Programming</a:t>
+            </a:r>
+            <a:endParaRPr lang="en-US" dirty="0"/>
+          </a:p>
+        </p:txBody>
+      </p:sp>
+      <p:sp>
+        <p:nvSpPr>
+          <p:cNvPr id="3" name="Content Placeholder 2"/>
+          <p:cNvSpPr>
+            <a:spLocks noGrp="1"/>
+          </p:cNvSpPr>
+          <p:nvPr>
+            <p:ph idx="1"/>
+          </p:nvPr>
+        </p:nvSpPr>
+        <p:spPr>
+          <a:xfrm>
+            <a:off x="838200" y="1825625"/>
+            <a:ext cx="10515600" cy="1054053"/>
+          </a:xfrm>
+        </p:spPr>
+        <p:txBody>
+          <a:bodyPr/>
+          <a:lstStyle/>
+          <a:p>
+            <a:r>
+              <a:rPr lang="en-US" dirty="0" smtClean="0"/>
+              <a:t>In 1990s, Object Oriented Programming replaced procedural programming.</a:t>
+            </a:r>
+            <a:endParaRPr lang="en-US" dirty="0"/>
+          </a:p>
+        </p:txBody>
+      </p:sp>
+      <p:pic>
+        <p:nvPicPr>
+          <p:cNvPr id="4" name="Picture 3"/>
+          <p:cNvPicPr>
+            <a:picLocks noChangeAspect="1"/>
+          </p:cNvPicPr>
+          <p:nvPr/>
+        </p:nvPicPr>
+        <p:blipFill>
+          <a:blip r:embed="rId3">
+            <a:extLst>
+              <a:ext uri="{28A0092B-C50C-407E-A947-70E740481C1C}">
+                <a14:useLocalDpi xmlns:a14="http://schemas.microsoft.com/office/drawing/2010/main" val="0"/>
+              </a:ext>
+            </a:extLst>
+          </a:blip>
+          <a:stretch>
+            <a:fillRect/>
+          </a:stretch>
+        </p:blipFill>
+        <p:spPr>
+          <a:xfrm>
+            <a:off x="2946517" y="3207225"/>
+            <a:ext cx="6298966" cy="2320119"/>
+          </a:xfrm>
+          <a:prstGeom prst="rect">
+            <a:avLst/>
+          </a:prstGeom>
+        </p:spPr>
+      </p:pic>
+    </p:spTree>
+    <p:extLst>
+      <p:ext uri="{BB962C8B-B14F-4D97-AF65-F5344CB8AC3E}">
+        <p14:creationId xmlns:p14="http://schemas.microsoft.com/office/powerpoint/2010/main" val="736929604"/>
+      </p:ext>
+    </p:extLst>
+  </p:cSld>
+  <p:clrMapOvr>
+    <a:masterClrMapping/>
+  </p:clrMapOvr>
+  <p:timing>
+    <p:tnLst>
+      <p:par>
+        <p:cTn id="1" dur="indefinite" restart="never" nodeType="tmRoot">
+          <p:childTnLst>
+            <p:seq concurrent="1" nextAc="seek">
+              <p:cTn id="2" dur="indefinite" nodeType="mainSeq">
+                <p:childTnLst>
+                  <p:par>
+                    <p:cTn id="3" fill="hold">
+                      <p:stCondLst>
+                        <p:cond delay="indefinite"/>
+                      </p:stCondLst>
+                      <p:childTnLst>
+                        <p:par>
+                          <p:cTn id="4" fill="hold">
+                            <p:stCondLst>
+                              <p:cond delay="0"/>
+                            </p:stCondLst>
+                            <p:childTnLst>
+                              <p:par>
+                                <p:cTn id="5" presetID="1" presetClass="entr" presetSubtype="0" fill="hold" nodeType="clickEffect">
+                                  <p:stCondLst>
+                                    <p:cond delay="0"/>
+                                  </p:stCondLst>
+                                  <p:childTnLst>
+                                    <p:set>
+                                      <p:cBhvr>
+                                        <p:cTn id="6" dur="1" fill="hold">
+                                          <p:stCondLst>
+                                            <p:cond delay="0"/>
+                                          </p:stCondLst>
+                                        </p:cTn>
+                                        <p:tgtEl>
+                                          <p:spTgt spid="4"/>
+                                        </p:tgtEl>
+                                        <p:attrNameLst>
+                                          <p:attrName>style.visibility</p:attrName>
+                                        </p:attrNameLst>
+                                      </p:cBhvr>
+                                      <p:to>
+                                        <p:strVal val="visible"/>
+                                      </p:to>
+                                    </p:set>
+                                  </p:childTnLst>
+                                </p:cTn>
+                              </p:par>
+                            </p:childTnLst>
+                          </p:cTn>
+                        </p:par>
+                      </p:childTnLst>
+                    </p:cTn>
+                  </p:par>
+                </p:childTnLst>
+              </p:cTn>
+              <p:prevCondLst>
+                <p:cond evt="onPrev" delay="0">
+                  <p:tgtEl>
+                    <p:sldTgt/>
+                  </p:tgtEl>
+                </p:cond>
+              </p:prevCondLst>
+              <p:nextCondLst>
+                <p:cond evt="onNext" delay="0">
+                  <p:tgtEl>
+                    <p:sldTgt/>
+                  </p:tgtEl>
+                </p:cond>
+              </p:nextCondLst>
+            </p:seq>
+          </p:childTnLst>
+        </p:cTn>
+      </p:par>
+    </p:tnLst>
+  </p:timing>
+</p:sld>
+</file>
+
+<file path=ppt/slides/slide3.xml><?xml version="1.0" encoding="utf-8"?>
+<p:sld xmlns:a="http://schemas.openxmlformats.org/drawingml/2006/main" xmlns:r="http://schemas.openxmlformats.org/officeDocument/2006/relationships" xmlns:p="http://schemas.openxmlformats.org/presentationml/2006/main">
+  <p:cSld>
+    <p:spTree>
+      <p:nvGrpSpPr>
+        <p:cNvPr id="1" name=""/>
+        <p:cNvGrpSpPr/>
+        <p:nvPr/>
+      </p:nvGrpSpPr>
+      <p:grpSpPr>
+        <a:xfrm>
+          <a:off x="0" y="0"/>
+          <a:ext cx="0" cy="0"/>
+          <a:chOff x="0" y="0"/>
+          <a:chExt cx="0" cy="0"/>
+        </a:xfrm>
+      </p:grpSpPr>
+      <p:sp>
+        <p:nvSpPr>
+          <p:cNvPr id="2" name="Title 1"/>
+          <p:cNvSpPr>
+            <a:spLocks noGrp="1"/>
+          </p:cNvSpPr>
+          <p:nvPr>
+            <p:ph type="title"/>
+          </p:nvPr>
+        </p:nvSpPr>
+        <p:spPr/>
+        <p:txBody>
+          <a:bodyPr/>
+          <a:lstStyle/>
+          <a:p>
+            <a:r>
+              <a:rPr lang="en-US" dirty="0" smtClean="0"/>
+              <a:t>Rise of Extreme Programming</a:t>
+            </a:r>
+            <a:endParaRPr lang="en-US" dirty="0"/>
+          </a:p>
+        </p:txBody>
+      </p:sp>
+      <p:sp>
+        <p:nvSpPr>
+          <p:cNvPr id="3" name="Content Placeholder 2"/>
+          <p:cNvSpPr>
+            <a:spLocks noGrp="1"/>
+          </p:cNvSpPr>
+          <p:nvPr>
+            <p:ph idx="1"/>
+          </p:nvPr>
+        </p:nvSpPr>
+        <p:spPr>
+          <a:xfrm>
+            <a:off x="838200" y="1825625"/>
+            <a:ext cx="10515600" cy="1054053"/>
+          </a:xfrm>
+        </p:spPr>
+        <p:txBody>
+          <a:bodyPr/>
+          <a:lstStyle/>
+          <a:p>
+            <a:r>
+              <a:rPr lang="en-US" dirty="0" smtClean="0"/>
+              <a:t>Internet changed the business requirement to rapidly changing.</a:t>
+            </a:r>
+            <a:endParaRPr lang="en-US" dirty="0"/>
+          </a:p>
+        </p:txBody>
+      </p:sp>
+      <p:grpSp>
+        <p:nvGrpSpPr>
+          <p:cNvPr id="17" name="Group 16"/>
+          <p:cNvGrpSpPr/>
+          <p:nvPr/>
+        </p:nvGrpSpPr>
+        <p:grpSpPr>
+          <a:xfrm>
+            <a:off x="436730" y="2879678"/>
+            <a:ext cx="10887070" cy="2975212"/>
+            <a:chOff x="436730" y="2879678"/>
+            <a:chExt cx="10887070" cy="2975212"/>
+          </a:xfrm>
+        </p:grpSpPr>
+        <p:sp>
+          <p:nvSpPr>
+            <p:cNvPr id="5" name="Explosion 1 4"/>
+            <p:cNvSpPr/>
+            <p:nvPr/>
+          </p:nvSpPr>
+          <p:spPr>
+            <a:xfrm>
+              <a:off x="436730" y="2879678"/>
+              <a:ext cx="2879678" cy="2975212"/>
+            </a:xfrm>
+            <a:prstGeom prst="irregularSeal1">
+              <a:avLst/>
+            </a:prstGeom>
+          </p:spPr>
+          <p:style>
+            <a:lnRef idx="2">
+              <a:schemeClr val="accent1">
+                <a:shade val="50000"/>
+              </a:schemeClr>
+            </a:lnRef>
+            <a:fillRef idx="1">
+              <a:schemeClr val="accent1"/>
+            </a:fillRef>
+            <a:effectRef idx="0">
+              <a:schemeClr val="accent1"/>
+            </a:effectRef>
+            <a:fontRef idx="minor">
+              <a:schemeClr val="lt1"/>
+            </a:fontRef>
+          </p:style>
+          <p:txBody>
+            <a:bodyPr rtlCol="0" anchor="ctr"/>
+            <a:lstStyle/>
+            <a:p>
+              <a:pPr algn="ctr"/>
+              <a:r>
+                <a:rPr lang="en-US" dirty="0" smtClean="0"/>
+                <a:t>Dot Com Bubble</a:t>
+              </a:r>
+              <a:endParaRPr lang="en-US" dirty="0"/>
+            </a:p>
+          </p:txBody>
+        </p:sp>
+        <p:cxnSp>
+          <p:nvCxnSpPr>
+            <p:cNvPr id="8" name="Straight Arrow Connector 7"/>
+            <p:cNvCxnSpPr/>
+            <p:nvPr/>
+          </p:nvCxnSpPr>
+          <p:spPr>
+            <a:xfrm>
+              <a:off x="3658739" y="4341766"/>
+              <a:ext cx="1372737" cy="17012"/>
+            </a:xfrm>
+            <a:prstGeom prst="straightConnector1">
+              <a:avLst/>
+            </a:prstGeom>
+            <a:ln>
+              <a:tailEnd type="triangle"/>
+            </a:ln>
+          </p:spPr>
+          <p:style>
+            <a:lnRef idx="1">
+              <a:schemeClr val="accent1"/>
+            </a:lnRef>
+            <a:fillRef idx="0">
+              <a:schemeClr val="accent1"/>
+            </a:fillRef>
+            <a:effectRef idx="0">
+              <a:schemeClr val="accent1"/>
+            </a:effectRef>
+            <a:fontRef idx="minor">
+              <a:schemeClr val="tx1"/>
+            </a:fontRef>
+          </p:style>
+        </p:cxnSp>
+        <p:sp>
+          <p:nvSpPr>
+            <p:cNvPr id="10" name="TextBox 9"/>
+            <p:cNvSpPr txBox="1"/>
+            <p:nvPr/>
+          </p:nvSpPr>
+          <p:spPr>
+            <a:xfrm>
+              <a:off x="5222544" y="4088662"/>
+              <a:ext cx="2619628" cy="523220"/>
+            </a:xfrm>
+            <a:prstGeom prst="rect">
+              <a:avLst/>
+            </a:prstGeom>
+            <a:noFill/>
+          </p:spPr>
+          <p:txBody>
+            <a:bodyPr wrap="none" rtlCol="0">
+              <a:spAutoFit/>
+            </a:bodyPr>
+            <a:lstStyle/>
+            <a:p>
+              <a:r>
+                <a:rPr lang="en-US" sz="2800" dirty="0" smtClean="0"/>
+                <a:t>↑ Internet rose</a:t>
+              </a:r>
+              <a:endParaRPr lang="en-US" dirty="0"/>
+            </a:p>
+          </p:txBody>
+        </p:sp>
+        <p:cxnSp>
+          <p:nvCxnSpPr>
+            <p:cNvPr id="11" name="Straight Arrow Connector 10"/>
+            <p:cNvCxnSpPr/>
+            <p:nvPr/>
+          </p:nvCxnSpPr>
+          <p:spPr>
+            <a:xfrm>
+              <a:off x="8033240" y="4352050"/>
+              <a:ext cx="1372737" cy="17012"/>
+            </a:xfrm>
+            <a:prstGeom prst="straightConnector1">
+              <a:avLst/>
+            </a:prstGeom>
+            <a:ln>
+              <a:tailEnd type="triangle"/>
+            </a:ln>
+          </p:spPr>
+          <p:style>
+            <a:lnRef idx="1">
+              <a:schemeClr val="accent1"/>
+            </a:lnRef>
+            <a:fillRef idx="0">
+              <a:schemeClr val="accent1"/>
+            </a:fillRef>
+            <a:effectRef idx="0">
+              <a:schemeClr val="accent1"/>
+            </a:effectRef>
+            <a:fontRef idx="minor">
+              <a:schemeClr val="tx1"/>
+            </a:fontRef>
+          </p:style>
+        </p:cxnSp>
+        <p:sp>
+          <p:nvSpPr>
+            <p:cNvPr id="12" name="TextBox 11"/>
+            <p:cNvSpPr txBox="1"/>
+            <p:nvPr/>
+          </p:nvSpPr>
+          <p:spPr>
+            <a:xfrm>
+              <a:off x="9597045" y="4080156"/>
+              <a:ext cx="1726755" cy="646331"/>
+            </a:xfrm>
+            <a:prstGeom prst="rect">
+              <a:avLst/>
+            </a:prstGeom>
+            <a:noFill/>
+          </p:spPr>
+          <p:txBody>
+            <a:bodyPr wrap="none" rtlCol="0">
+              <a:spAutoFit/>
+            </a:bodyPr>
+            <a:lstStyle/>
+            <a:p>
+              <a:r>
+                <a:rPr lang="en-US" dirty="0" smtClean="0"/>
+                <a:t>Development</a:t>
+              </a:r>
+            </a:p>
+            <a:p>
+              <a:pPr algn="ctr"/>
+              <a:r>
+                <a:rPr lang="en-US" dirty="0" smtClean="0"/>
+                <a:t>Time </a:t>
+              </a:r>
+              <a:r>
+                <a:rPr lang="en-US" dirty="0"/>
+                <a:t>↓</a:t>
+              </a:r>
+              <a:endParaRPr lang="en-US" dirty="0"/>
+            </a:p>
+          </p:txBody>
+        </p:sp>
+      </p:grpSp>
+      <p:sp>
+        <p:nvSpPr>
+          <p:cNvPr id="18" name="Rectangle 17"/>
+          <p:cNvSpPr/>
+          <p:nvPr/>
+        </p:nvSpPr>
+        <p:spPr>
+          <a:xfrm>
+            <a:off x="3038460" y="2610292"/>
+            <a:ext cx="6115080" cy="1323439"/>
+          </a:xfrm>
+          <a:prstGeom prst="rect">
+            <a:avLst/>
+          </a:prstGeom>
+          <a:noFill/>
+        </p:spPr>
+        <p:txBody>
+          <a:bodyPr wrap="square" lIns="91440" tIns="45720" rIns="91440" bIns="45720">
+            <a:spAutoFit/>
+          </a:bodyPr>
+          <a:lstStyle/>
+          <a:p>
+            <a:pPr algn="ctr"/>
+            <a:r>
+              <a:rPr lang="en-US" sz="8000" b="1" cap="none" spc="0" dirty="0" smtClean="0">
+                <a:ln w="10160">
+                  <a:solidFill>
+                    <a:schemeClr val="accent5"/>
+                  </a:solidFill>
+                  <a:prstDash val="solid"/>
+                </a:ln>
+                <a:solidFill>
+                  <a:srgbClr val="FFFFFF"/>
+                </a:solidFill>
+                <a:effectLst>
+                  <a:outerShdw blurRad="38100" dist="22860" dir="5400000" algn="tl" rotWithShape="0">
+                    <a:srgbClr val="000000">
+                      <a:alpha val="30000"/>
+                    </a:srgbClr>
+                  </a:outerShdw>
+                </a:effectLst>
+              </a:rPr>
+              <a:t>KENT BECK</a:t>
+            </a:r>
+            <a:endParaRPr lang="en-US" sz="8000" b="1" cap="none" spc="0" dirty="0">
+              <a:ln w="10160">
+                <a:solidFill>
+                  <a:schemeClr val="accent5"/>
+                </a:solidFill>
+                <a:prstDash val="solid"/>
+              </a:ln>
+              <a:solidFill>
+                <a:srgbClr val="FFFFFF"/>
+              </a:solidFill>
+              <a:effectLst>
+                <a:outerShdw blurRad="38100" dist="22860" dir="5400000" algn="tl" rotWithShape="0">
+                  <a:srgbClr val="000000">
+                    <a:alpha val="30000"/>
+                  </a:srgbClr>
+                </a:outerShdw>
+              </a:effectLst>
+            </a:endParaRPr>
+          </a:p>
+        </p:txBody>
+      </p:sp>
+    </p:spTree>
+    <p:extLst>
+      <p:ext uri="{BB962C8B-B14F-4D97-AF65-F5344CB8AC3E}">
+        <p14:creationId xmlns:p14="http://schemas.microsoft.com/office/powerpoint/2010/main" val="166721128"/>
+      </p:ext>
+    </p:extLst>
+  </p:cSld>
+  <p:clrMapOvr>
+    <a:masterClrMapping/>
+  </p:clrMapOvr>
+  <p:timing>
+    <p:tnLst>
+      <p:par>
+        <p:cTn id="1" dur="indefinite" restart="never" nodeType="tmRoot">
+          <p:childTnLst>
+            <p:seq concurrent="1" nextAc="seek">
+              <p:cTn id="2" dur="indefinite" nodeType="mainSeq">
+                <p:childTnLst>
+                  <p:par>
+                    <p:cTn id="3" fill="hold">
+                      <p:stCondLst>
+                        <p:cond delay="indefinite"/>
+                      </p:stCondLst>
+                      <p:childTnLst>
+                        <p:par>
+                          <p:cTn id="4" fill="hold">
+                            <p:stCondLst>
+                              <p:cond delay="0"/>
+                            </p:stCondLst>
+                            <p:childTnLst>
+                              <p:par>
+                                <p:cTn id="5" presetID="1" presetClass="entr" presetSubtype="0" fill="hold" nodeType="clickEffect">
+                                  <p:stCondLst>
+                                    <p:cond delay="0"/>
+                                  </p:stCondLst>
+                                  <p:childTnLst>
+                                    <p:set>
+                                      <p:cBhvr>
+                                        <p:cTn id="6" dur="1" fill="hold">
+                                          <p:stCondLst>
+                                            <p:cond delay="0"/>
+                                          </p:stCondLst>
+                                        </p:cTn>
+                                        <p:tgtEl>
+                                          <p:spTgt spid="17"/>
+                                        </p:tgtEl>
+                                        <p:attrNameLst>
+                                          <p:attrName>style.visibility</p:attrName>
+                                        </p:attrNameLst>
+                                      </p:cBhvr>
+                                      <p:to>
+                                        <p:strVal val="visible"/>
+                                      </p:to>
+                                    </p:set>
+                                  </p:childTnLst>
+                                </p:cTn>
+                              </p:par>
+                            </p:childTnLst>
+                          </p:cTn>
+                        </p:par>
+                      </p:childTnLst>
+                    </p:cTn>
+                  </p:par>
+                  <p:par>
+                    <p:cTn id="7" fill="hold">
+                      <p:stCondLst>
+                        <p:cond delay="indefinite"/>
+                      </p:stCondLst>
+                      <p:childTnLst>
+                        <p:par>
+                          <p:cTn id="8" fill="hold">
+                            <p:stCondLst>
+                              <p:cond delay="0"/>
+                            </p:stCondLst>
+                            <p:childTnLst>
+                              <p:par>
+                                <p:cTn id="9" presetID="10" presetClass="exit" presetSubtype="0" fill="hold" nodeType="clickEffect">
+                                  <p:stCondLst>
+                                    <p:cond delay="0"/>
+                                  </p:stCondLst>
+                                  <p:childTnLst>
+                                    <p:animEffect transition="out" filter="fade">
+                                      <p:cBhvr>
+                                        <p:cTn id="10" dur="500"/>
+                                        <p:tgtEl>
+                                          <p:spTgt spid="17"/>
+                                        </p:tgtEl>
+                                      </p:cBhvr>
+                                    </p:animEffect>
+                                    <p:set>
+                                      <p:cBhvr>
+                                        <p:cTn id="11" dur="1" fill="hold">
+                                          <p:stCondLst>
+                                            <p:cond delay="499"/>
+                                          </p:stCondLst>
+                                        </p:cTn>
+                                        <p:tgtEl>
+                                          <p:spTgt spid="17"/>
+                                        </p:tgtEl>
+                                        <p:attrNameLst>
+                                          <p:attrName>style.visibility</p:attrName>
+                                        </p:attrNameLst>
+                                      </p:cBhvr>
+                                      <p:to>
+                                        <p:strVal val="hidden"/>
+                                      </p:to>
+                                    </p:set>
+                                  </p:childTnLst>
+                                </p:cTn>
+                              </p:par>
+                              <p:par>
+                                <p:cTn id="12" presetID="10" presetClass="exit" presetSubtype="0" fill="hold" grpId="0" nodeType="withEffect">
+                                  <p:stCondLst>
+                                    <p:cond delay="0"/>
+                                  </p:stCondLst>
+                                  <p:childTnLst>
+                                    <p:animEffect transition="out" filter="fade">
+                                      <p:cBhvr>
+                                        <p:cTn id="13" dur="500"/>
+                                        <p:tgtEl>
+                                          <p:spTgt spid="3">
+                                            <p:txEl>
+                                              <p:pRg st="0" end="0"/>
+                                            </p:txEl>
+                                          </p:spTgt>
+                                        </p:tgtEl>
+                                      </p:cBhvr>
+                                    </p:animEffect>
+                                    <p:set>
+                                      <p:cBhvr>
+                                        <p:cTn id="14" dur="1" fill="hold">
+                                          <p:stCondLst>
+                                            <p:cond delay="499"/>
+                                          </p:stCondLst>
+                                        </p:cTn>
+                                        <p:tgtEl>
+                                          <p:spTgt spid="3">
+                                            <p:txEl>
+                                              <p:pRg st="0" end="0"/>
+                                            </p:txEl>
+                                          </p:spTgt>
+                                        </p:tgtEl>
+                                        <p:attrNameLst>
+                                          <p:attrName>style.visibility</p:attrName>
+                                        </p:attrNameLst>
+                                      </p:cBhvr>
+                                      <p:to>
+                                        <p:strVal val="hidden"/>
+                                      </p:to>
+                                    </p:set>
+                                  </p:childTnLst>
+                                </p:cTn>
+                              </p:par>
+                              <p:par>
+                                <p:cTn id="15" presetID="37" presetClass="entr" presetSubtype="0" fill="hold" grpId="0" nodeType="withEffect">
+                                  <p:stCondLst>
+                                    <p:cond delay="0"/>
+                                  </p:stCondLst>
+                                  <p:childTnLst>
+                                    <p:set>
+                                      <p:cBhvr>
+                                        <p:cTn id="16" dur="1" fill="hold">
+                                          <p:stCondLst>
+                                            <p:cond delay="0"/>
+                                          </p:stCondLst>
+                                        </p:cTn>
+                                        <p:tgtEl>
+                                          <p:spTgt spid="18"/>
+                                        </p:tgtEl>
+                                        <p:attrNameLst>
+                                          <p:attrName>style.visibility</p:attrName>
+                                        </p:attrNameLst>
+                                      </p:cBhvr>
+                                      <p:to>
+                                        <p:strVal val="visible"/>
+                                      </p:to>
+                                    </p:set>
+                                    <p:animEffect transition="in" filter="fade">
+                                      <p:cBhvr>
+                                        <p:cTn id="17" dur="1000"/>
+                                        <p:tgtEl>
+                                          <p:spTgt spid="18"/>
+                                        </p:tgtEl>
+                                      </p:cBhvr>
+                                    </p:animEffect>
+                                    <p:anim calcmode="lin" valueType="num">
+                                      <p:cBhvr>
+                                        <p:cTn id="18" dur="1000" fill="hold"/>
+                                        <p:tgtEl>
+                                          <p:spTgt spid="18"/>
+                                        </p:tgtEl>
+                                        <p:attrNameLst>
+                                          <p:attrName>ppt_x</p:attrName>
+                                        </p:attrNameLst>
+                                      </p:cBhvr>
+                                      <p:tavLst>
+                                        <p:tav tm="0">
+                                          <p:val>
+                                            <p:strVal val="#ppt_x"/>
+                                          </p:val>
+                                        </p:tav>
+                                        <p:tav tm="100000">
+                                          <p:val>
+                                            <p:strVal val="#ppt_x"/>
+                                          </p:val>
+                                        </p:tav>
+                                      </p:tavLst>
+                                    </p:anim>
+                                    <p:anim calcmode="lin" valueType="num">
+                                      <p:cBhvr>
+                                        <p:cTn id="19" dur="900" decel="100000" fill="hold"/>
+                                        <p:tgtEl>
+                                          <p:spTgt spid="18"/>
+                                        </p:tgtEl>
+                                        <p:attrNameLst>
+                                          <p:attrName>ppt_y</p:attrName>
+                                        </p:attrNameLst>
+                                      </p:cBhvr>
+                                      <p:tavLst>
+                                        <p:tav tm="0">
+                                          <p:val>
+                                            <p:strVal val="#ppt_y+1"/>
+                                          </p:val>
+                                        </p:tav>
+                                        <p:tav tm="100000">
+                                          <p:val>
+                                            <p:strVal val="#ppt_y-.03"/>
+                                          </p:val>
+                                        </p:tav>
+                                      </p:tavLst>
+                                    </p:anim>
+                                    <p:anim calcmode="lin" valueType="num">
+                                      <p:cBhvr>
+                                        <p:cTn id="20" dur="100" accel="100000" fill="hold">
+                                          <p:stCondLst>
+                                            <p:cond delay="900"/>
+                                          </p:stCondLst>
+                                        </p:cTn>
+                                        <p:tgtEl>
+                                          <p:spTgt spid="18"/>
+                                        </p:tgtEl>
+                                        <p:attrNameLst>
+                                          <p:attrName>ppt_y</p:attrName>
+                                        </p:attrNameLst>
+                                      </p:cBhvr>
+                                      <p:tavLst>
+                                        <p:tav tm="0">
+                                          <p:val>
+                                            <p:strVal val="#ppt_y-.03"/>
+                                          </p:val>
+                                        </p:tav>
+                                        <p:tav tm="100000">
+                                          <p:val>
+                                            <p:strVal val="#ppt_y"/>
+                                          </p:val>
+                                        </p:tav>
+                                      </p:tavLst>
+                                    </p:anim>
+                                  </p:childTnLst>
+                                </p:cTn>
+                              </p:par>
+                            </p:childTnLst>
+                          </p:cTn>
+                        </p:par>
+                      </p:childTnLst>
+                    </p:cTn>
+                  </p:par>
+                </p:childTnLst>
+              </p:cTn>
+              <p:prevCondLst>
+                <p:cond evt="onPrev" delay="0">
+                  <p:tgtEl>
+                    <p:sldTgt/>
+                  </p:tgtEl>
+                </p:cond>
+              </p:prevCondLst>
+              <p:nextCondLst>
+                <p:cond evt="onNext" delay="0">
+                  <p:tgtEl>
+                    <p:sldTgt/>
+                  </p:tgtEl>
+                </p:cond>
+              </p:nextCondLst>
+            </p:seq>
+          </p:childTnLst>
+        </p:cTn>
+      </p:par>
+    </p:tnLst>
+    <p:bldLst>
+      <p:bldP spid="3" grpId="0" build="p"/>
+      <p:bldP spid="18" grpId="0"/>
+    </p:bldLst>
+  </p:timing>
 </p:sld>
 </file>
 
@@ -3365,4 +4715,265 @@
     </a:ext>
   </a:extLst>
 </a:theme>
+</file>
+
+<file path=ppt/theme/theme2.xml><?xml version="1.0" encoding="utf-8"?>
+<a:theme xmlns:a="http://schemas.openxmlformats.org/drawingml/2006/main" name="Office Theme">
+  <a:themeElements>
+    <a:clrScheme name="Office">
+      <a:dk1>
+        <a:sysClr val="windowText" lastClr="000000"/>
+      </a:dk1>
+      <a:lt1>
+        <a:sysClr val="window" lastClr="FFFFFF"/>
+      </a:lt1>
+      <a:dk2>
+        <a:srgbClr val="44546A"/>
+      </a:dk2>
+      <a:lt2>
+        <a:srgbClr val="E7E6E6"/>
+      </a:lt2>
+      <a:accent1>
+        <a:srgbClr val="5B9BD5"/>
+      </a:accent1>
+      <a:accent2>
+        <a:srgbClr val="ED7D31"/>
+      </a:accent2>
+      <a:accent3>
+        <a:srgbClr val="A5A5A5"/>
+      </a:accent3>
+      <a:accent4>
+        <a:srgbClr val="FFC000"/>
+      </a:accent4>
+      <a:accent5>
+        <a:srgbClr val="4472C4"/>
+      </a:accent5>
+      <a:accent6>
+        <a:srgbClr val="70AD47"/>
+      </a:accent6>
+      <a:hlink>
+        <a:srgbClr val="0563C1"/>
+      </a:hlink>
+      <a:folHlink>
+        <a:srgbClr val="954F72"/>
+      </a:folHlink>
+    </a:clrScheme>
+    <a:fontScheme name="Office">
+      <a:majorFont>
+        <a:latin typeface="Calibri Light" panose="020F0302020204030204"/>
+        <a:ea typeface=""/>
+        <a:cs typeface=""/>
+        <a:font script="Jpan" typeface="ＭＳ Ｐゴシック"/>
+        <a:font script="Hang" typeface="맑은 고딕"/>
+        <a:font script="Hans" typeface="宋体"/>
+        <a:font script="Hant" typeface="新細明體"/>
+        <a:font script="Arab" typeface="Times New Roman"/>
+        <a:font script="Hebr" typeface="Times New Roman"/>
+        <a:font script="Thai" typeface="Angsana New"/>
+        <a:font script="Ethi" typeface="Nyala"/>
+        <a:font script="Beng" typeface="Vrinda"/>
+        <a:font script="Gujr" typeface="Shruti"/>
+        <a:font script="Khmr" typeface="MoolBoran"/>
+        <a:font script="Knda" typeface="Tunga"/>
+        <a:font script="Guru" typeface="Raavi"/>
+        <a:font script="Cans" typeface="Euphemia"/>
+        <a:font script="Cher" typeface="Plantagenet Cherokee"/>
+        <a:font script="Yiii" typeface="Microsoft Yi Baiti"/>
+        <a:font script="Tibt" typeface="Microsoft Himalaya"/>
+        <a:font script="Thaa" typeface="MV Boli"/>
+        <a:font script="Deva" typeface="Mangal"/>
+        <a:font script="Telu" typeface="Gautami"/>
+        <a:font script="Taml" typeface="Latha"/>
+        <a:font script="Syrc" typeface="Estrangelo Edessa"/>
+        <a:font script="Orya" typeface="Kalinga"/>
+        <a:font script="Mlym" typeface="Kartika"/>
+        <a:font script="Laoo" typeface="DokChampa"/>
+        <a:font script="Sinh" typeface="Iskoola Pota"/>
+        <a:font script="Mong" typeface="Mongolian Baiti"/>
+        <a:font script="Viet" typeface="Times New Roman"/>
+        <a:font script="Uigh" typeface="Microsoft Uighur"/>
+        <a:font script="Geor" typeface="Sylfaen"/>
+      </a:majorFont>
+      <a:minorFont>
+        <a:latin typeface="Calibri" panose="020F0502020204030204"/>
+        <a:ea typeface=""/>
+        <a:cs typeface=""/>
+        <a:font script="Jpan" typeface="ＭＳ Ｐゴシック"/>
+        <a:font script="Hang" typeface="맑은 고딕"/>
+        <a:font script="Hans" typeface="宋体"/>
+        <a:font script="Hant" typeface="新細明體"/>
+        <a:font script="Arab" typeface="Arial"/>
+        <a:font script="Hebr" typeface="Arial"/>
+        <a:font script="Thai" typeface="Cordia New"/>
+        <a:font script="Ethi" typeface="Nyala"/>
+        <a:font script="Beng" typeface="Vrinda"/>
+        <a:font script="Gujr" typeface="Shruti"/>
+        <a:font script="Khmr" typeface="DaunPenh"/>
+        <a:font script="Knda" typeface="Tunga"/>
+        <a:font script="Guru" typeface="Raavi"/>
+        <a:font script="Cans" typeface="Euphemia"/>
+        <a:font script="Cher" typeface="Plantagenet Cherokee"/>
+        <a:font script="Yiii" typeface="Microsoft Yi Baiti"/>
+        <a:font script="Tibt" typeface="Microsoft Himalaya"/>
+        <a:font script="Thaa" typeface="MV Boli"/>
+        <a:font script="Deva" typeface="Mangal"/>
+        <a:font script="Telu" typeface="Gautami"/>
+        <a:font script="Taml" typeface="Latha"/>
+        <a:font script="Syrc" typeface="Estrangelo Edessa"/>
+        <a:font script="Orya" typeface="Kalinga"/>
+        <a:font script="Mlym" typeface="Kartika"/>
+        <a:font script="Laoo" typeface="DokChampa"/>
+        <a:font script="Sinh" typeface="Iskoola Pota"/>
+        <a:font script="Mong" typeface="Mongolian Baiti"/>
+        <a:font script="Viet" typeface="Arial"/>
+        <a:font script="Uigh" typeface="Microsoft Uighur"/>
+        <a:font script="Geor" typeface="Sylfaen"/>
+      </a:minorFont>
+    </a:fontScheme>
+    <a:fmtScheme name="Office">
+      <a:fillStyleLst>
+        <a:solidFill>
+          <a:schemeClr val="phClr"/>
+        </a:solidFill>
+        <a:gradFill rotWithShape="1">
+          <a:gsLst>
+            <a:gs pos="0">
+              <a:schemeClr val="phClr">
+                <a:lumMod val="110000"/>
+                <a:satMod val="105000"/>
+                <a:tint val="67000"/>
+              </a:schemeClr>
+            </a:gs>
+            <a:gs pos="50000">
+              <a:schemeClr val="phClr">
+                <a:lumMod val="105000"/>
+                <a:satMod val="103000"/>
+                <a:tint val="73000"/>
+              </a:schemeClr>
+            </a:gs>
+            <a:gs pos="100000">
+              <a:schemeClr val="phClr">
+                <a:lumMod val="105000"/>
+                <a:satMod val="109000"/>
+                <a:tint val="81000"/>
+              </a:schemeClr>
+            </a:gs>
+          </a:gsLst>
+          <a:lin ang="5400000" scaled="0"/>
+        </a:gradFill>
+        <a:gradFill rotWithShape="1">
+          <a:gsLst>
+            <a:gs pos="0">
+              <a:schemeClr val="phClr">
+                <a:satMod val="103000"/>
+                <a:lumMod val="102000"/>
+                <a:tint val="94000"/>
+              </a:schemeClr>
+            </a:gs>
+            <a:gs pos="50000">
+              <a:schemeClr val="phClr">
+                <a:satMod val="110000"/>
+                <a:lumMod val="100000"/>
+                <a:shade val="100000"/>
+              </a:schemeClr>
+            </a:gs>
+            <a:gs pos="100000">
+              <a:schemeClr val="phClr">
+                <a:lumMod val="99000"/>
+                <a:satMod val="120000"/>
+                <a:shade val="78000"/>
+              </a:schemeClr>
+            </a:gs>
+          </a:gsLst>
+          <a:lin ang="5400000" scaled="0"/>
+        </a:gradFill>
+      </a:fillStyleLst>
+      <a:lnStyleLst>
+        <a:ln w="6350" cap="flat" cmpd="sng" algn="ctr">
+          <a:solidFill>
+            <a:schemeClr val="phClr"/>
+          </a:solidFill>
+          <a:prstDash val="solid"/>
+          <a:miter lim="800000"/>
+        </a:ln>
+        <a:ln w="12700" cap="flat" cmpd="sng" algn="ctr">
+          <a:solidFill>
+            <a:schemeClr val="phClr"/>
+          </a:solidFill>
+          <a:prstDash val="solid"/>
+          <a:miter lim="800000"/>
+        </a:ln>
+        <a:ln w="19050" cap="flat" cmpd="sng" algn="ctr">
+          <a:solidFill>
+            <a:schemeClr val="phClr"/>
+          </a:solidFill>
+          <a:prstDash val="solid"/>
+          <a:miter lim="800000"/>
+        </a:ln>
+      </a:lnStyleLst>
+      <a:effectStyleLst>
+        <a:effectStyle>
+          <a:effectLst/>
+        </a:effectStyle>
+        <a:effectStyle>
+          <a:effectLst/>
+        </a:effectStyle>
+        <a:effectStyle>
+          <a:effectLst>
+            <a:outerShdw blurRad="57150" dist="19050" dir="5400000" algn="ctr" rotWithShape="0">
+              <a:srgbClr val="000000">
+                <a:alpha val="63000"/>
+              </a:srgbClr>
+            </a:outerShdw>
+          </a:effectLst>
+        </a:effectStyle>
+      </a:effectStyleLst>
+      <a:bgFillStyleLst>
+        <a:solidFill>
+          <a:schemeClr val="phClr"/>
+        </a:solidFill>
+        <a:solidFill>
+          <a:schemeClr val="phClr">
+            <a:tint val="95000"/>
+            <a:satMod val="170000"/>
+          </a:schemeClr>
+        </a:solidFill>
+        <a:gradFill rotWithShape="1">
+          <a:gsLst>
+            <a:gs pos="0">
+              <a:schemeClr val="phClr">
+                <a:tint val="93000"/>
+                <a:satMod val="150000"/>
+                <a:shade val="98000"/>
+                <a:lumMod val="102000"/>
+              </a:schemeClr>
+            </a:gs>
+            <a:gs pos="50000">
+              <a:schemeClr val="phClr">
+                <a:tint val="98000"/>
+                <a:satMod val="130000"/>
+                <a:shade val="90000"/>
+                <a:lumMod val="103000"/>
+              </a:schemeClr>
+            </a:gs>
+            <a:gs pos="100000">
+              <a:schemeClr val="phClr">
+                <a:shade val="63000"/>
+                <a:satMod val="120000"/>
+              </a:schemeClr>
+            </a:gs>
+          </a:gsLst>
+          <a:lin ang="5400000" scaled="0"/>
+        </a:gradFill>
+      </a:bgFillStyleLst>
+    </a:fmtScheme>
+  </a:themeElements>
+  <a:objectDefaults/>
+  <a:extraClrSchemeLst/>
+  <a:extLst>
+    <a:ext uri="{05A4C25C-085E-4340-85A3-A5531E510DB2}">
+      <thm15:themeFamily xmlns:thm15="http://schemas.microsoft.com/office/thememl/2012/main" name="Office Theme" id="{62F939B6-93AF-4DB8-9C6B-D6C7DFDC589F}" vid="{4A3C46E8-61CC-4603-A589-7422A47A8E4A}"/>
+    </a:ext>
+  </a:extLst>
+</a:theme>
 </file>
</xml_diff>

<commit_message>
1 slide addition through phone
Addition of a slide through phone..
</commit_message>
<xml_diff>
--- a/extreme_programming.pptx
+++ b/extreme_programming.pptx
@@ -5,7 +5,7 @@
     <p:sldMasterId id="2147483648" r:id="rId1"/>
   </p:sldMasterIdLst>
   <p:notesMasterIdLst>
-    <p:notesMasterId r:id="rId7"/>
+    <p:notesMasterId r:id="rId8"/>
   </p:notesMasterIdLst>
   <p:sldIdLst>
     <p:sldId id="256" r:id="rId2"/>
@@ -13,6 +13,7 @@
     <p:sldId id="258" r:id="rId4"/>
     <p:sldId id="259" r:id="rId5"/>
     <p:sldId id="260" r:id="rId6"/>
+    <p:sldId id="261" r:id="rId7"/>
   </p:sldIdLst>
   <p:sldSz cx="12192000" cy="6858000"/>
   <p:notesSz cx="6858000" cy="9144000"/>
@@ -888,10 +889,9 @@
         <a:lstStyle/>
         <a:p>
           <a:r>
-            <a:rPr lang="en-US" dirty="0" smtClean="0"/>
+            <a:rPr lang="en-US" dirty="0"/>
             <a:t>Software development model</a:t>
           </a:r>
-          <a:endParaRPr lang="en-US" dirty="0"/>
         </a:p>
       </dgm:t>
     </dgm:pt>
@@ -925,10 +925,9 @@
         <a:lstStyle/>
         <a:p>
           <a:r>
-            <a:rPr lang="en-US" dirty="0" smtClean="0"/>
+            <a:rPr lang="en-US" dirty="0"/>
             <a:t>Waterfall model</a:t>
           </a:r>
-          <a:endParaRPr lang="en-US" dirty="0"/>
         </a:p>
       </dgm:t>
     </dgm:pt>
@@ -962,10 +961,9 @@
         <a:lstStyle/>
         <a:p>
           <a:r>
-            <a:rPr lang="en-US" dirty="0" smtClean="0"/>
+            <a:rPr lang="en-US" dirty="0"/>
             <a:t>Iterative model</a:t>
           </a:r>
-          <a:endParaRPr lang="en-US" dirty="0"/>
         </a:p>
       </dgm:t>
     </dgm:pt>
@@ -999,14 +997,9 @@
         <a:lstStyle/>
         <a:p>
           <a:r>
-            <a:rPr lang="en-US" dirty="0" smtClean="0"/>
-            <a:t>Agile </a:t>
+            <a:rPr lang="en-US" dirty="0"/>
+            <a:t>Agile model</a:t>
           </a:r>
-          <a:r>
-            <a:rPr lang="en-US" dirty="0" smtClean="0"/>
-            <a:t>model</a:t>
-          </a:r>
-          <a:endParaRPr lang="en-US" dirty="0"/>
         </a:p>
       </dgm:t>
     </dgm:pt>
@@ -1041,10 +1034,9 @@
         <a:p>
           <a:pPr algn="ctr"/>
           <a:r>
-            <a:rPr lang="en-US" dirty="0" smtClean="0"/>
+            <a:rPr lang="en-US" dirty="0"/>
             <a:t>RAD model</a:t>
           </a:r>
-          <a:endParaRPr lang="en-US" dirty="0"/>
         </a:p>
       </dgm:t>
     </dgm:pt>
@@ -1079,10 +1071,9 @@
         <a:p>
           <a:pPr algn="ctr"/>
           <a:r>
-            <a:rPr lang="en-US" dirty="0" smtClean="0"/>
+            <a:rPr lang="en-US" dirty="0"/>
             <a:t>Incremental model</a:t>
           </a:r>
-          <a:endParaRPr lang="en-US" dirty="0"/>
         </a:p>
       </dgm:t>
     </dgm:pt>
@@ -1117,10 +1108,9 @@
         <a:p>
           <a:pPr algn="ctr"/>
           <a:r>
-            <a:rPr lang="en-US" dirty="0" smtClean="0"/>
+            <a:rPr lang="en-US" dirty="0"/>
             <a:t>V model</a:t>
           </a:r>
-          <a:endParaRPr lang="en-US" dirty="0"/>
         </a:p>
       </dgm:t>
     </dgm:pt>
@@ -1155,10 +1145,9 @@
         <a:p>
           <a:pPr algn="ctr"/>
           <a:r>
-            <a:rPr lang="en-US" dirty="0" smtClean="0"/>
+            <a:rPr lang="en-US" dirty="0"/>
             <a:t>Spiral model</a:t>
           </a:r>
-          <a:endParaRPr lang="en-US" dirty="0"/>
         </a:p>
       </dgm:t>
     </dgm:pt>
@@ -1198,13 +1187,6 @@
     <dgm:pt modelId="{8046D806-D633-4925-88FF-13EA3736C642}" type="pres">
       <dgm:prSet presAssocID="{3E21CBF3-ED67-4DE4-92E8-D28F4E02C66C}" presName="centerShape" presStyleLbl="node0" presStyleIdx="0" presStyleCnt="1"/>
       <dgm:spPr/>
-      <dgm:t>
-        <a:bodyPr/>
-        <a:lstStyle/>
-        <a:p>
-          <a:endParaRPr lang="en-US"/>
-        </a:p>
-      </dgm:t>
     </dgm:pt>
     <dgm:pt modelId="{0B9D4084-EA21-4F7B-A20F-0E1723A71ADE}" type="pres">
       <dgm:prSet presAssocID="{3A1CE0DB-424D-4E8C-9CC4-E9A7F0192187}" presName="node" presStyleLbl="node1" presStyleIdx="0" presStyleCnt="7">
@@ -1213,13 +1195,6 @@
         </dgm:presLayoutVars>
       </dgm:prSet>
       <dgm:spPr/>
-      <dgm:t>
-        <a:bodyPr/>
-        <a:lstStyle/>
-        <a:p>
-          <a:endParaRPr lang="en-US"/>
-        </a:p>
-      </dgm:t>
     </dgm:pt>
     <dgm:pt modelId="{C3F76657-0C10-4626-945F-7A6C8CB3D378}" type="pres">
       <dgm:prSet presAssocID="{3A1CE0DB-424D-4E8C-9CC4-E9A7F0192187}" presName="dummy" presStyleCnt="0"/>
@@ -1236,13 +1211,6 @@
         </dgm:presLayoutVars>
       </dgm:prSet>
       <dgm:spPr/>
-      <dgm:t>
-        <a:bodyPr/>
-        <a:lstStyle/>
-        <a:p>
-          <a:endParaRPr lang="en-US"/>
-        </a:p>
-      </dgm:t>
     </dgm:pt>
     <dgm:pt modelId="{1C97F2A5-5C24-4585-9A86-9D9C4FF71750}" type="pres">
       <dgm:prSet presAssocID="{446E3B0E-A84C-4C0D-90C5-2CDA8EE8A1E3}" presName="dummy" presStyleCnt="0"/>
@@ -1259,13 +1227,6 @@
         </dgm:presLayoutVars>
       </dgm:prSet>
       <dgm:spPr/>
-      <dgm:t>
-        <a:bodyPr/>
-        <a:lstStyle/>
-        <a:p>
-          <a:endParaRPr lang="en-US"/>
-        </a:p>
-      </dgm:t>
     </dgm:pt>
     <dgm:pt modelId="{F71AE671-5521-4538-904C-D35BB1613898}" type="pres">
       <dgm:prSet presAssocID="{BD0E6AD9-71FA-4C38-8A7F-3AE8864E181B}" presName="dummy" presStyleCnt="0"/>
@@ -1282,13 +1243,6 @@
         </dgm:presLayoutVars>
       </dgm:prSet>
       <dgm:spPr/>
-      <dgm:t>
-        <a:bodyPr/>
-        <a:lstStyle/>
-        <a:p>
-          <a:endParaRPr lang="en-US"/>
-        </a:p>
-      </dgm:t>
     </dgm:pt>
     <dgm:pt modelId="{DDABE81E-CC26-47A2-9338-31B34FE15AC9}" type="pres">
       <dgm:prSet presAssocID="{BF8C4942-3560-466A-B7F7-036045090DB4}" presName="dummy" presStyleCnt="0"/>
@@ -1337,13 +1291,6 @@
         </dgm:presLayoutVars>
       </dgm:prSet>
       <dgm:spPr/>
-      <dgm:t>
-        <a:bodyPr/>
-        <a:lstStyle/>
-        <a:p>
-          <a:endParaRPr lang="en-US"/>
-        </a:p>
-      </dgm:t>
     </dgm:pt>
     <dgm:pt modelId="{D04A1D7A-1F4E-4F24-8F55-DAB82E2F31D9}" type="pres">
       <dgm:prSet presAssocID="{801A760C-B3A6-4942-B41F-1B74F7CFB869}" presName="dummy" presStyleCnt="0"/>
@@ -1355,30 +1302,30 @@
     </dgm:pt>
   </dgm:ptLst>
   <dgm:cxnLst>
+    <dgm:cxn modelId="{E9743714-F755-4952-B8AE-87189FB9134E}" type="presOf" srcId="{EAA2BEE3-0DBD-465D-BB64-31830BFC8ABC}" destId="{120EC894-2FDD-4E69-8DA1-1E4987D6750C}" srcOrd="0" destOrd="0" presId="urn:microsoft.com/office/officeart/2005/8/layout/radial6"/>
+    <dgm:cxn modelId="{8FCE9B16-5AA7-4F09-B332-9E3766D358F6}" srcId="{3E21CBF3-ED67-4DE4-92E8-D28F4E02C66C}" destId="{BF8C4942-3560-466A-B7F7-036045090DB4}" srcOrd="3" destOrd="0" parTransId="{1BB7DC7D-6905-49E9-9FD0-654AD573C40E}" sibTransId="{2E8BD8F1-AC8D-430A-A16A-29538E9A8D89}"/>
     <dgm:cxn modelId="{CC218D1B-DE1E-4C94-83BC-7E2AA8A513E5}" type="presOf" srcId="{821F0E55-CEF6-48A1-AC37-6D1FD50F8A7C}" destId="{43787B64-6ECE-4862-83FC-999710B65D94}" srcOrd="0" destOrd="0" presId="urn:microsoft.com/office/officeart/2005/8/layout/radial6"/>
+    <dgm:cxn modelId="{4F5D3727-F173-42E5-BE78-47119F4A09E9}" type="presOf" srcId="{E4A3282E-BB57-4C66-ACAD-724F46D03C99}" destId="{ADF11B85-49CD-4C45-834D-28EF8F01FAF4}" srcOrd="0" destOrd="0" presId="urn:microsoft.com/office/officeart/2005/8/layout/radial6"/>
+    <dgm:cxn modelId="{42468133-6626-413F-8036-DCB1ECD7F00D}" srcId="{8A4D3A20-F65F-4192-9123-EAC5330E5D1D}" destId="{3E21CBF3-ED67-4DE4-92E8-D28F4E02C66C}" srcOrd="0" destOrd="0" parTransId="{62D71432-5937-427D-9E65-CD7804702917}" sibTransId="{56D95F66-2F36-41C3-A4C8-AAA41A7C5935}"/>
+    <dgm:cxn modelId="{93AA4161-2792-4A73-924C-3A9358908DED}" srcId="{3E21CBF3-ED67-4DE4-92E8-D28F4E02C66C}" destId="{7C910102-AEE4-484B-ACEB-B163D80A8AC3}" srcOrd="5" destOrd="0" parTransId="{2C662DC6-0642-4B64-BA19-E82C9A57D4C8}" sibTransId="{821F0E55-CEF6-48A1-AC37-6D1FD50F8A7C}"/>
+    <dgm:cxn modelId="{CB5E1146-E11D-4CD5-866D-1BEA23F58352}" srcId="{3E21CBF3-ED67-4DE4-92E8-D28F4E02C66C}" destId="{3A1CE0DB-424D-4E8C-9CC4-E9A7F0192187}" srcOrd="0" destOrd="0" parTransId="{584E096D-ECCA-45D3-8418-8AF5829CA25D}" sibTransId="{52532CF6-0526-4785-A2A6-1AD1072ADB9D}"/>
+    <dgm:cxn modelId="{92566467-7247-47BB-92DD-F94AED937561}" type="presOf" srcId="{BF8C4942-3560-466A-B7F7-036045090DB4}" destId="{B0856285-8B4C-4921-A3FF-D6436B7247C2}" srcOrd="0" destOrd="0" presId="urn:microsoft.com/office/officeart/2005/8/layout/radial6"/>
+    <dgm:cxn modelId="{4DD5694D-2AF2-4CFA-9337-E79D88305FFC}" type="presOf" srcId="{3E21CBF3-ED67-4DE4-92E8-D28F4E02C66C}" destId="{8046D806-D633-4925-88FF-13EA3736C642}" srcOrd="0" destOrd="0" presId="urn:microsoft.com/office/officeart/2005/8/layout/radial6"/>
+    <dgm:cxn modelId="{018C504D-7874-4067-8879-D7782E9BE75B}" type="presOf" srcId="{801A760C-B3A6-4942-B41F-1B74F7CFB869}" destId="{C0E538A1-8247-4D29-A464-326B7E9E49F2}" srcOrd="0" destOrd="0" presId="urn:microsoft.com/office/officeart/2005/8/layout/radial6"/>
+    <dgm:cxn modelId="{F2CD6D79-35C3-46D2-8458-7C54E7AD556B}" srcId="{3E21CBF3-ED67-4DE4-92E8-D28F4E02C66C}" destId="{446E3B0E-A84C-4C0D-90C5-2CDA8EE8A1E3}" srcOrd="1" destOrd="0" parTransId="{86A5A7C0-6915-4FCE-82B7-85A9613781AF}" sibTransId="{1E6BF274-94E7-49EA-823A-D7901911558F}"/>
+    <dgm:cxn modelId="{D76F3C5A-023F-4A45-ACBC-D57F39A6B014}" type="presOf" srcId="{2E8BD8F1-AC8D-430A-A16A-29538E9A8D89}" destId="{D4C25836-BB1E-40C6-9055-79DFE51E84A4}" srcOrd="0" destOrd="0" presId="urn:microsoft.com/office/officeart/2005/8/layout/radial6"/>
+    <dgm:cxn modelId="{327FA47C-F072-4DC1-B582-E34C662F0AC8}" srcId="{3E21CBF3-ED67-4DE4-92E8-D28F4E02C66C}" destId="{EAA2BEE3-0DBD-465D-BB64-31830BFC8ABC}" srcOrd="4" destOrd="0" parTransId="{4622D5E9-A79E-4AC5-AC80-5F230C759282}" sibTransId="{C8CE8BA7-678D-4C94-8F91-3A77355BB83A}"/>
     <dgm:cxn modelId="{81F40D88-E1FA-41F6-BC21-DA8471BBF5BC}" type="presOf" srcId="{3A1CE0DB-424D-4E8C-9CC4-E9A7F0192187}" destId="{0B9D4084-EA21-4F7B-A20F-0E1723A71ADE}" srcOrd="0" destOrd="0" presId="urn:microsoft.com/office/officeart/2005/8/layout/radial6"/>
+    <dgm:cxn modelId="{E5A2C89A-9107-4792-8CCC-4898D6EC5DBA}" srcId="{3E21CBF3-ED67-4DE4-92E8-D28F4E02C66C}" destId="{801A760C-B3A6-4942-B41F-1B74F7CFB869}" srcOrd="6" destOrd="0" parTransId="{FF8C1F41-9000-4666-8B3C-F006C6352F33}" sibTransId="{088CB9C7-E6AD-4656-9612-A21801614288}"/>
+    <dgm:cxn modelId="{DAA053A5-BCE7-48B6-8287-21AE5DC5B4BA}" type="presOf" srcId="{7C910102-AEE4-484B-ACEB-B163D80A8AC3}" destId="{5EBC7458-FEF4-4BAA-BB89-62B9D0604C8A}" srcOrd="0" destOrd="0" presId="urn:microsoft.com/office/officeart/2005/8/layout/radial6"/>
     <dgm:cxn modelId="{FB39E0B0-FD2B-47CC-8CE3-29C073135CA4}" type="presOf" srcId="{446E3B0E-A84C-4C0D-90C5-2CDA8EE8A1E3}" destId="{024B37C8-2E78-4627-9714-90BFEACD2D8D}" srcOrd="0" destOrd="0" presId="urn:microsoft.com/office/officeart/2005/8/layout/radial6"/>
-    <dgm:cxn modelId="{4F5D3727-F173-42E5-BE78-47119F4A09E9}" type="presOf" srcId="{E4A3282E-BB57-4C66-ACAD-724F46D03C99}" destId="{ADF11B85-49CD-4C45-834D-28EF8F01FAF4}" srcOrd="0" destOrd="0" presId="urn:microsoft.com/office/officeart/2005/8/layout/radial6"/>
-    <dgm:cxn modelId="{EFFA6EF2-B05B-4E0A-B221-5F635EFD3D52}" type="presOf" srcId="{088CB9C7-E6AD-4656-9612-A21801614288}" destId="{974D1544-313C-4B85-96E4-F98694E51952}" srcOrd="0" destOrd="0" presId="urn:microsoft.com/office/officeart/2005/8/layout/radial6"/>
-    <dgm:cxn modelId="{DAA053A5-BCE7-48B6-8287-21AE5DC5B4BA}" type="presOf" srcId="{7C910102-AEE4-484B-ACEB-B163D80A8AC3}" destId="{5EBC7458-FEF4-4BAA-BB89-62B9D0604C8A}" srcOrd="0" destOrd="0" presId="urn:microsoft.com/office/officeart/2005/8/layout/radial6"/>
-    <dgm:cxn modelId="{E9743714-F755-4952-B8AE-87189FB9134E}" type="presOf" srcId="{EAA2BEE3-0DBD-465D-BB64-31830BFC8ABC}" destId="{120EC894-2FDD-4E69-8DA1-1E4987D6750C}" srcOrd="0" destOrd="0" presId="urn:microsoft.com/office/officeart/2005/8/layout/radial6"/>
-    <dgm:cxn modelId="{4DD5694D-2AF2-4CFA-9337-E79D88305FFC}" type="presOf" srcId="{3E21CBF3-ED67-4DE4-92E8-D28F4E02C66C}" destId="{8046D806-D633-4925-88FF-13EA3736C642}" srcOrd="0" destOrd="0" presId="urn:microsoft.com/office/officeart/2005/8/layout/radial6"/>
-    <dgm:cxn modelId="{42468133-6626-413F-8036-DCB1ECD7F00D}" srcId="{8A4D3A20-F65F-4192-9123-EAC5330E5D1D}" destId="{3E21CBF3-ED67-4DE4-92E8-D28F4E02C66C}" srcOrd="0" destOrd="0" parTransId="{62D71432-5937-427D-9E65-CD7804702917}" sibTransId="{56D95F66-2F36-41C3-A4C8-AAA41A7C5935}"/>
     <dgm:cxn modelId="{50BB35C0-5301-4620-96E0-8F8C590935C8}" type="presOf" srcId="{1E6BF274-94E7-49EA-823A-D7901911558F}" destId="{3403E89E-646F-4749-98B8-1636056908AA}" srcOrd="0" destOrd="0" presId="urn:microsoft.com/office/officeart/2005/8/layout/radial6"/>
     <dgm:cxn modelId="{CE250DD7-ACD0-419C-BC0A-C35258FD7568}" type="presOf" srcId="{C8CE8BA7-678D-4C94-8F91-3A77355BB83A}" destId="{62725212-3288-4862-A14D-4E6BB5BCB641}" srcOrd="0" destOrd="0" presId="urn:microsoft.com/office/officeart/2005/8/layout/radial6"/>
-    <dgm:cxn modelId="{92566467-7247-47BB-92DD-F94AED937561}" type="presOf" srcId="{BF8C4942-3560-466A-B7F7-036045090DB4}" destId="{B0856285-8B4C-4921-A3FF-D6436B7247C2}" srcOrd="0" destOrd="0" presId="urn:microsoft.com/office/officeart/2005/8/layout/radial6"/>
-    <dgm:cxn modelId="{66EDC8FB-B067-479B-8726-281A44F690D2}" type="presOf" srcId="{52532CF6-0526-4785-A2A6-1AD1072ADB9D}" destId="{98C0CE5D-6568-4C58-8044-A6118E4DFAF6}" srcOrd="0" destOrd="0" presId="urn:microsoft.com/office/officeart/2005/8/layout/radial6"/>
-    <dgm:cxn modelId="{D76F3C5A-023F-4A45-ACBC-D57F39A6B014}" type="presOf" srcId="{2E8BD8F1-AC8D-430A-A16A-29538E9A8D89}" destId="{D4C25836-BB1E-40C6-9055-79DFE51E84A4}" srcOrd="0" destOrd="0" presId="urn:microsoft.com/office/officeart/2005/8/layout/radial6"/>
-    <dgm:cxn modelId="{93AA4161-2792-4A73-924C-3A9358908DED}" srcId="{3E21CBF3-ED67-4DE4-92E8-D28F4E02C66C}" destId="{7C910102-AEE4-484B-ACEB-B163D80A8AC3}" srcOrd="5" destOrd="0" parTransId="{2C662DC6-0642-4B64-BA19-E82C9A57D4C8}" sibTransId="{821F0E55-CEF6-48A1-AC37-6D1FD50F8A7C}"/>
     <dgm:cxn modelId="{9567DEDF-D775-4550-8F1F-6817B3956601}" type="presOf" srcId="{8A4D3A20-F65F-4192-9123-EAC5330E5D1D}" destId="{AF29EEAD-64B5-4C37-8C6D-6E10B5F4AE2B}" srcOrd="0" destOrd="0" presId="urn:microsoft.com/office/officeart/2005/8/layout/radial6"/>
     <dgm:cxn modelId="{FFE282E0-13BB-4F72-8399-760865E79B14}" type="presOf" srcId="{BD0E6AD9-71FA-4C38-8A7F-3AE8864E181B}" destId="{D02A1073-280A-4030-B61B-6AB009F7EB42}" srcOrd="0" destOrd="0" presId="urn:microsoft.com/office/officeart/2005/8/layout/radial6"/>
-    <dgm:cxn modelId="{E5A2C89A-9107-4792-8CCC-4898D6EC5DBA}" srcId="{3E21CBF3-ED67-4DE4-92E8-D28F4E02C66C}" destId="{801A760C-B3A6-4942-B41F-1B74F7CFB869}" srcOrd="6" destOrd="0" parTransId="{FF8C1F41-9000-4666-8B3C-F006C6352F33}" sibTransId="{088CB9C7-E6AD-4656-9612-A21801614288}"/>
-    <dgm:cxn modelId="{327FA47C-F072-4DC1-B582-E34C662F0AC8}" srcId="{3E21CBF3-ED67-4DE4-92E8-D28F4E02C66C}" destId="{EAA2BEE3-0DBD-465D-BB64-31830BFC8ABC}" srcOrd="4" destOrd="0" parTransId="{4622D5E9-A79E-4AC5-AC80-5F230C759282}" sibTransId="{C8CE8BA7-678D-4C94-8F91-3A77355BB83A}"/>
-    <dgm:cxn modelId="{F2CD6D79-35C3-46D2-8458-7C54E7AD556B}" srcId="{3E21CBF3-ED67-4DE4-92E8-D28F4E02C66C}" destId="{446E3B0E-A84C-4C0D-90C5-2CDA8EE8A1E3}" srcOrd="1" destOrd="0" parTransId="{86A5A7C0-6915-4FCE-82B7-85A9613781AF}" sibTransId="{1E6BF274-94E7-49EA-823A-D7901911558F}"/>
-    <dgm:cxn modelId="{CB5E1146-E11D-4CD5-866D-1BEA23F58352}" srcId="{3E21CBF3-ED67-4DE4-92E8-D28F4E02C66C}" destId="{3A1CE0DB-424D-4E8C-9CC4-E9A7F0192187}" srcOrd="0" destOrd="0" parTransId="{584E096D-ECCA-45D3-8418-8AF5829CA25D}" sibTransId="{52532CF6-0526-4785-A2A6-1AD1072ADB9D}"/>
-    <dgm:cxn modelId="{8FCE9B16-5AA7-4F09-B332-9E3766D358F6}" srcId="{3E21CBF3-ED67-4DE4-92E8-D28F4E02C66C}" destId="{BF8C4942-3560-466A-B7F7-036045090DB4}" srcOrd="3" destOrd="0" parTransId="{1BB7DC7D-6905-49E9-9FD0-654AD573C40E}" sibTransId="{2E8BD8F1-AC8D-430A-A16A-29538E9A8D89}"/>
-    <dgm:cxn modelId="{018C504D-7874-4067-8879-D7782E9BE75B}" type="presOf" srcId="{801A760C-B3A6-4942-B41F-1B74F7CFB869}" destId="{C0E538A1-8247-4D29-A464-326B7E9E49F2}" srcOrd="0" destOrd="0" presId="urn:microsoft.com/office/officeart/2005/8/layout/radial6"/>
     <dgm:cxn modelId="{553FE6F1-27F8-4BAB-A7E2-EC6F04AD7955}" srcId="{3E21CBF3-ED67-4DE4-92E8-D28F4E02C66C}" destId="{BD0E6AD9-71FA-4C38-8A7F-3AE8864E181B}" srcOrd="2" destOrd="0" parTransId="{21A2A793-8C28-4FBF-B131-56655A905B20}" sibTransId="{E4A3282E-BB57-4C66-ACAD-724F46D03C99}"/>
+    <dgm:cxn modelId="{EFFA6EF2-B05B-4E0A-B221-5F635EFD3D52}" type="presOf" srcId="{088CB9C7-E6AD-4656-9612-A21801614288}" destId="{974D1544-313C-4B85-96E4-F98694E51952}" srcOrd="0" destOrd="0" presId="urn:microsoft.com/office/officeart/2005/8/layout/radial6"/>
+    <dgm:cxn modelId="{66EDC8FB-B067-479B-8726-281A44F690D2}" type="presOf" srcId="{52532CF6-0526-4785-A2A6-1AD1072ADB9D}" destId="{98C0CE5D-6568-4C58-8044-A6118E4DFAF6}" srcOrd="0" destOrd="0" presId="urn:microsoft.com/office/officeart/2005/8/layout/radial6"/>
     <dgm:cxn modelId="{A04761CE-40E8-4443-8732-F45F58B56D78}" type="presParOf" srcId="{AF29EEAD-64B5-4C37-8C6D-6E10B5F4AE2B}" destId="{8046D806-D633-4925-88FF-13EA3736C642}" srcOrd="0" destOrd="0" presId="urn:microsoft.com/office/officeart/2005/8/layout/radial6"/>
     <dgm:cxn modelId="{2BDE61AF-93C8-4714-955F-AC1CEEAD996A}" type="presParOf" srcId="{AF29EEAD-64B5-4C37-8C6D-6E10B5F4AE2B}" destId="{0B9D4084-EA21-4F7B-A20F-0E1723A71ADE}" srcOrd="1" destOrd="0" presId="urn:microsoft.com/office/officeart/2005/8/layout/radial6"/>
     <dgm:cxn modelId="{D3FBE3C8-C3B7-4527-A151-529E9FDD7DB8}" type="presParOf" srcId="{AF29EEAD-64B5-4C37-8C6D-6E10B5F4AE2B}" destId="{C3F76657-0C10-4626-945F-7A6C8CB3D378}" srcOrd="2" destOrd="0" presId="urn:microsoft.com/office/officeart/2005/8/layout/radial6"/>
@@ -1797,7 +1744,7 @@
         </a:bodyPr>
         <a:lstStyle/>
         <a:p>
-          <a:pPr lvl="0" algn="ctr" defTabSz="533400">
+          <a:pPr marL="0" lvl="0" indent="0" algn="ctr" defTabSz="533400">
             <a:lnSpc>
               <a:spcPct val="90000"/>
             </a:lnSpc>
@@ -1807,12 +1754,12 @@
             <a:spcAft>
               <a:spcPct val="35000"/>
             </a:spcAft>
+            <a:buNone/>
           </a:pPr>
           <a:r>
-            <a:rPr lang="en-US" sz="1200" kern="1200" dirty="0" smtClean="0"/>
+            <a:rPr lang="en-US" sz="1200" kern="1200" dirty="0"/>
             <a:t>Software development model</a:t>
           </a:r>
-          <a:endParaRPr lang="en-US" sz="1200" kern="1200" dirty="0"/>
         </a:p>
       </dsp:txBody>
       <dsp:txXfrm>
@@ -1875,7 +1822,7 @@
         </a:bodyPr>
         <a:lstStyle/>
         <a:p>
-          <a:pPr lvl="0" algn="ctr" defTabSz="444500">
+          <a:pPr marL="0" lvl="0" indent="0" algn="ctr" defTabSz="444500">
             <a:lnSpc>
               <a:spcPct val="90000"/>
             </a:lnSpc>
@@ -1885,12 +1832,12 @@
             <a:spcAft>
               <a:spcPct val="35000"/>
             </a:spcAft>
+            <a:buNone/>
           </a:pPr>
           <a:r>
-            <a:rPr lang="en-US" sz="1000" kern="1200" dirty="0" smtClean="0"/>
+            <a:rPr lang="en-US" sz="1000" kern="1200" dirty="0"/>
             <a:t>Waterfall model</a:t>
           </a:r>
-          <a:endParaRPr lang="en-US" sz="1000" kern="1200" dirty="0"/>
         </a:p>
       </dsp:txBody>
       <dsp:txXfrm>
@@ -1953,7 +1900,7 @@
         </a:bodyPr>
         <a:lstStyle/>
         <a:p>
-          <a:pPr lvl="0" algn="ctr" defTabSz="444500">
+          <a:pPr marL="0" lvl="0" indent="0" algn="ctr" defTabSz="444500">
             <a:lnSpc>
               <a:spcPct val="90000"/>
             </a:lnSpc>
@@ -1963,12 +1910,12 @@
             <a:spcAft>
               <a:spcPct val="35000"/>
             </a:spcAft>
+            <a:buNone/>
           </a:pPr>
           <a:r>
-            <a:rPr lang="en-US" sz="1000" kern="1200" dirty="0" smtClean="0"/>
+            <a:rPr lang="en-US" sz="1000" kern="1200" dirty="0"/>
             <a:t>Iterative model</a:t>
           </a:r>
-          <a:endParaRPr lang="en-US" sz="1000" kern="1200" dirty="0"/>
         </a:p>
       </dsp:txBody>
       <dsp:txXfrm>
@@ -2031,7 +1978,7 @@
         </a:bodyPr>
         <a:lstStyle/>
         <a:p>
-          <a:pPr lvl="0" algn="ctr" defTabSz="444500">
+          <a:pPr marL="0" lvl="0" indent="0" algn="ctr" defTabSz="444500">
             <a:lnSpc>
               <a:spcPct val="90000"/>
             </a:lnSpc>
@@ -2041,16 +1988,12 @@
             <a:spcAft>
               <a:spcPct val="35000"/>
             </a:spcAft>
+            <a:buNone/>
           </a:pPr>
           <a:r>
-            <a:rPr lang="en-US" sz="1000" kern="1200" dirty="0" smtClean="0"/>
-            <a:t>Agile </a:t>
+            <a:rPr lang="en-US" sz="1000" kern="1200" dirty="0"/>
+            <a:t>Agile model</a:t>
           </a:r>
-          <a:r>
-            <a:rPr lang="en-US" sz="1000" kern="1200" dirty="0" smtClean="0"/>
-            <a:t>model</a:t>
-          </a:r>
-          <a:endParaRPr lang="en-US" sz="1000" kern="1200" dirty="0"/>
         </a:p>
       </dsp:txBody>
       <dsp:txXfrm>
@@ -2113,7 +2056,7 @@
         </a:bodyPr>
         <a:lstStyle/>
         <a:p>
-          <a:pPr lvl="0" algn="ctr" defTabSz="444500">
+          <a:pPr marL="0" lvl="0" indent="0" algn="ctr" defTabSz="444500">
             <a:lnSpc>
               <a:spcPct val="90000"/>
             </a:lnSpc>
@@ -2123,12 +2066,12 @@
             <a:spcAft>
               <a:spcPct val="35000"/>
             </a:spcAft>
+            <a:buNone/>
           </a:pPr>
           <a:r>
-            <a:rPr lang="en-US" sz="1000" kern="1200" dirty="0" smtClean="0"/>
+            <a:rPr lang="en-US" sz="1000" kern="1200" dirty="0"/>
             <a:t>RAD model</a:t>
           </a:r>
-          <a:endParaRPr lang="en-US" sz="1000" kern="1200" dirty="0"/>
         </a:p>
       </dsp:txBody>
       <dsp:txXfrm>
@@ -2191,7 +2134,7 @@
         </a:bodyPr>
         <a:lstStyle/>
         <a:p>
-          <a:pPr lvl="0" algn="ctr" defTabSz="444500">
+          <a:pPr marL="0" lvl="0" indent="0" algn="ctr" defTabSz="444500">
             <a:lnSpc>
               <a:spcPct val="90000"/>
             </a:lnSpc>
@@ -2201,12 +2144,12 @@
             <a:spcAft>
               <a:spcPct val="35000"/>
             </a:spcAft>
+            <a:buNone/>
           </a:pPr>
           <a:r>
-            <a:rPr lang="en-US" sz="1000" kern="1200" dirty="0" smtClean="0"/>
+            <a:rPr lang="en-US" sz="1000" kern="1200" dirty="0"/>
             <a:t>Incremental model</a:t>
           </a:r>
-          <a:endParaRPr lang="en-US" sz="1000" kern="1200" dirty="0"/>
         </a:p>
       </dsp:txBody>
       <dsp:txXfrm>
@@ -2269,7 +2212,7 @@
         </a:bodyPr>
         <a:lstStyle/>
         <a:p>
-          <a:pPr lvl="0" algn="ctr" defTabSz="444500">
+          <a:pPr marL="0" lvl="0" indent="0" algn="ctr" defTabSz="444500">
             <a:lnSpc>
               <a:spcPct val="90000"/>
             </a:lnSpc>
@@ -2279,12 +2222,12 @@
             <a:spcAft>
               <a:spcPct val="35000"/>
             </a:spcAft>
+            <a:buNone/>
           </a:pPr>
           <a:r>
-            <a:rPr lang="en-US" sz="1000" kern="1200" dirty="0" smtClean="0"/>
+            <a:rPr lang="en-US" sz="1000" kern="1200" dirty="0"/>
             <a:t>V model</a:t>
           </a:r>
-          <a:endParaRPr lang="en-US" sz="1000" kern="1200" dirty="0"/>
         </a:p>
       </dsp:txBody>
       <dsp:txXfrm>
@@ -2347,7 +2290,7 @@
         </a:bodyPr>
         <a:lstStyle/>
         <a:p>
-          <a:pPr lvl="0" algn="ctr" defTabSz="444500">
+          <a:pPr marL="0" lvl="0" indent="0" algn="ctr" defTabSz="444500">
             <a:lnSpc>
               <a:spcPct val="90000"/>
             </a:lnSpc>
@@ -2357,12 +2300,12 @@
             <a:spcAft>
               <a:spcPct val="35000"/>
             </a:spcAft>
+            <a:buNone/>
           </a:pPr>
           <a:r>
-            <a:rPr lang="en-US" sz="1000" kern="1200" dirty="0" smtClean="0"/>
+            <a:rPr lang="en-US" sz="1000" kern="1200" dirty="0"/>
             <a:t>Spiral model</a:t>
           </a:r>
-          <a:endParaRPr lang="en-US" sz="1000" kern="1200" dirty="0"/>
         </a:p>
       </dsp:txBody>
       <dsp:txXfrm>
@@ -3897,7 +3840,7 @@
           <a:p>
             <a:fld id="{70711676-1DE2-458B-90FC-D5D4D01EA265}" type="datetimeFigureOut">
               <a:rPr lang="en-US" smtClean="0"/>
-              <a:t>19|12|6</a:t>
+              <a:t>12/7/2019</a:t>
             </a:fld>
             <a:endParaRPr lang="en-US"/>
           </a:p>
@@ -3961,38 +3904,37 @@
           <a:p>
             <a:pPr lvl="0"/>
             <a:r>
-              <a:rPr lang="en-US" smtClean="0"/>
+              <a:rPr lang="en-US"/>
               <a:t>Click to edit Master text styles</a:t>
             </a:r>
           </a:p>
           <a:p>
             <a:pPr lvl="1"/>
             <a:r>
-              <a:rPr lang="en-US" smtClean="0"/>
+              <a:rPr lang="en-US"/>
               <a:t>Second level</a:t>
             </a:r>
           </a:p>
           <a:p>
             <a:pPr lvl="2"/>
             <a:r>
-              <a:rPr lang="en-US" smtClean="0"/>
+              <a:rPr lang="en-US"/>
               <a:t>Third level</a:t>
             </a:r>
           </a:p>
           <a:p>
             <a:pPr lvl="3"/>
             <a:r>
-              <a:rPr lang="en-US" smtClean="0"/>
+              <a:rPr lang="en-US"/>
               <a:t>Fourth level</a:t>
             </a:r>
           </a:p>
           <a:p>
             <a:pPr lvl="4"/>
             <a:r>
-              <a:rPr lang="en-US" smtClean="0"/>
+              <a:rPr lang="en-US"/>
               <a:t>Fifth level</a:t>
             </a:r>
-            <a:endParaRPr lang="en-US"/>
           </a:p>
         </p:txBody>
       </p:sp>
@@ -4210,10 +4152,9 @@
           <a:lstStyle/>
           <a:p>
             <a:r>
-              <a:rPr lang="en-US" dirty="0" smtClean="0"/>
+              <a:rPr lang="en-US" dirty="0"/>
               <a:t>START OF AASHISH! (RISE OF CONCEPT)</a:t>
             </a:r>
-            <a:endParaRPr lang="en-US" dirty="0"/>
           </a:p>
         </p:txBody>
       </p:sp>
@@ -4379,10 +4320,9 @@
           </a:lstStyle>
           <a:p>
             <a:r>
-              <a:rPr lang="en-US" smtClean="0"/>
+              <a:rPr lang="en-US"/>
               <a:t>Click to edit Master title style</a:t>
             </a:r>
-            <a:endParaRPr lang="en-US"/>
           </a:p>
         </p:txBody>
       </p:sp>
@@ -4444,10 +4384,9 @@
           </a:lstStyle>
           <a:p>
             <a:r>
-              <a:rPr lang="en-US" smtClean="0"/>
+              <a:rPr lang="en-US"/>
               <a:t>Click to edit Master subtitle style</a:t>
             </a:r>
-            <a:endParaRPr lang="en-US"/>
           </a:p>
         </p:txBody>
       </p:sp>
@@ -4468,7 +4407,7 @@
           <a:p>
             <a:fld id="{EF60C9F4-19BA-40F2-B011-90CF0A2B4916}" type="datetimeFigureOut">
               <a:rPr lang="en-US" smtClean="0"/>
-              <a:t>19|12|6</a:t>
+              <a:t>12/7/2019</a:t>
             </a:fld>
             <a:endParaRPr lang="en-US"/>
           </a:p>
@@ -4562,10 +4501,9 @@
           <a:lstStyle/>
           <a:p>
             <a:r>
-              <a:rPr lang="en-US" smtClean="0"/>
+              <a:rPr lang="en-US"/>
               <a:t>Click to edit Master title style</a:t>
             </a:r>
-            <a:endParaRPr lang="en-US"/>
           </a:p>
         </p:txBody>
       </p:sp>
@@ -4586,38 +4524,37 @@
           <a:p>
             <a:pPr lvl="0"/>
             <a:r>
-              <a:rPr lang="en-US" smtClean="0"/>
+              <a:rPr lang="en-US"/>
               <a:t>Click to edit Master text styles</a:t>
             </a:r>
           </a:p>
           <a:p>
             <a:pPr lvl="1"/>
             <a:r>
-              <a:rPr lang="en-US" smtClean="0"/>
+              <a:rPr lang="en-US"/>
               <a:t>Second level</a:t>
             </a:r>
           </a:p>
           <a:p>
             <a:pPr lvl="2"/>
             <a:r>
-              <a:rPr lang="en-US" smtClean="0"/>
+              <a:rPr lang="en-US"/>
               <a:t>Third level</a:t>
             </a:r>
           </a:p>
           <a:p>
             <a:pPr lvl="3"/>
             <a:r>
-              <a:rPr lang="en-US" smtClean="0"/>
+              <a:rPr lang="en-US"/>
               <a:t>Fourth level</a:t>
             </a:r>
           </a:p>
           <a:p>
             <a:pPr lvl="4"/>
             <a:r>
-              <a:rPr lang="en-US" smtClean="0"/>
+              <a:rPr lang="en-US"/>
               <a:t>Fifth level</a:t>
             </a:r>
-            <a:endParaRPr lang="en-US"/>
           </a:p>
         </p:txBody>
       </p:sp>
@@ -4638,7 +4575,7 @@
           <a:p>
             <a:fld id="{EF60C9F4-19BA-40F2-B011-90CF0A2B4916}" type="datetimeFigureOut">
               <a:rPr lang="en-US" smtClean="0"/>
-              <a:t>19|12|6</a:t>
+              <a:t>12/7/2019</a:t>
             </a:fld>
             <a:endParaRPr lang="en-US"/>
           </a:p>
@@ -4737,10 +4674,9 @@
           <a:lstStyle/>
           <a:p>
             <a:r>
-              <a:rPr lang="en-US" smtClean="0"/>
+              <a:rPr lang="en-US"/>
               <a:t>Click to edit Master title style</a:t>
             </a:r>
-            <a:endParaRPr lang="en-US"/>
           </a:p>
         </p:txBody>
       </p:sp>
@@ -4766,38 +4702,37 @@
           <a:p>
             <a:pPr lvl="0"/>
             <a:r>
-              <a:rPr lang="en-US" smtClean="0"/>
+              <a:rPr lang="en-US"/>
               <a:t>Click to edit Master text styles</a:t>
             </a:r>
           </a:p>
           <a:p>
             <a:pPr lvl="1"/>
             <a:r>
-              <a:rPr lang="en-US" smtClean="0"/>
+              <a:rPr lang="en-US"/>
               <a:t>Second level</a:t>
             </a:r>
           </a:p>
           <a:p>
             <a:pPr lvl="2"/>
             <a:r>
-              <a:rPr lang="en-US" smtClean="0"/>
+              <a:rPr lang="en-US"/>
               <a:t>Third level</a:t>
             </a:r>
           </a:p>
           <a:p>
             <a:pPr lvl="3"/>
             <a:r>
-              <a:rPr lang="en-US" smtClean="0"/>
+              <a:rPr lang="en-US"/>
               <a:t>Fourth level</a:t>
             </a:r>
           </a:p>
           <a:p>
             <a:pPr lvl="4"/>
             <a:r>
-              <a:rPr lang="en-US" smtClean="0"/>
+              <a:rPr lang="en-US"/>
               <a:t>Fifth level</a:t>
             </a:r>
-            <a:endParaRPr lang="en-US"/>
           </a:p>
         </p:txBody>
       </p:sp>
@@ -4818,7 +4753,7 @@
           <a:p>
             <a:fld id="{EF60C9F4-19BA-40F2-B011-90CF0A2B4916}" type="datetimeFigureOut">
               <a:rPr lang="en-US" smtClean="0"/>
-              <a:t>19|12|6</a:t>
+              <a:t>12/7/2019</a:t>
             </a:fld>
             <a:endParaRPr lang="en-US"/>
           </a:p>
@@ -4912,10 +4847,9 @@
           <a:lstStyle/>
           <a:p>
             <a:r>
-              <a:rPr lang="en-US" smtClean="0"/>
+              <a:rPr lang="en-US"/>
               <a:t>Click to edit Master title style</a:t>
             </a:r>
-            <a:endParaRPr lang="en-US"/>
           </a:p>
         </p:txBody>
       </p:sp>
@@ -4936,38 +4870,37 @@
           <a:p>
             <a:pPr lvl="0"/>
             <a:r>
-              <a:rPr lang="en-US" smtClean="0"/>
+              <a:rPr lang="en-US"/>
               <a:t>Click to edit Master text styles</a:t>
             </a:r>
           </a:p>
           <a:p>
             <a:pPr lvl="1"/>
             <a:r>
-              <a:rPr lang="en-US" smtClean="0"/>
+              <a:rPr lang="en-US"/>
               <a:t>Second level</a:t>
             </a:r>
           </a:p>
           <a:p>
             <a:pPr lvl="2"/>
             <a:r>
-              <a:rPr lang="en-US" smtClean="0"/>
+              <a:rPr lang="en-US"/>
               <a:t>Third level</a:t>
             </a:r>
           </a:p>
           <a:p>
             <a:pPr lvl="3"/>
             <a:r>
-              <a:rPr lang="en-US" smtClean="0"/>
+              <a:rPr lang="en-US"/>
               <a:t>Fourth level</a:t>
             </a:r>
           </a:p>
           <a:p>
             <a:pPr lvl="4"/>
             <a:r>
-              <a:rPr lang="en-US" smtClean="0"/>
+              <a:rPr lang="en-US"/>
               <a:t>Fifth level</a:t>
             </a:r>
-            <a:endParaRPr lang="en-US"/>
           </a:p>
         </p:txBody>
       </p:sp>
@@ -4988,7 +4921,7 @@
           <a:p>
             <a:fld id="{EF60C9F4-19BA-40F2-B011-90CF0A2B4916}" type="datetimeFigureOut">
               <a:rPr lang="en-US" smtClean="0"/>
-              <a:t>19|12|6</a:t>
+              <a:t>12/7/2019</a:t>
             </a:fld>
             <a:endParaRPr lang="en-US"/>
           </a:p>
@@ -5091,10 +5024,9 @@
           </a:lstStyle>
           <a:p>
             <a:r>
-              <a:rPr lang="en-US" smtClean="0"/>
+              <a:rPr lang="en-US"/>
               <a:t>Click to edit Master title style</a:t>
             </a:r>
-            <a:endParaRPr lang="en-US"/>
           </a:p>
         </p:txBody>
       </p:sp>
@@ -5211,7 +5143,7 @@
           <a:p>
             <a:pPr lvl="0"/>
             <a:r>
-              <a:rPr lang="en-US" smtClean="0"/>
+              <a:rPr lang="en-US"/>
               <a:t>Click to edit Master text styles</a:t>
             </a:r>
           </a:p>
@@ -5234,7 +5166,7 @@
           <a:p>
             <a:fld id="{EF60C9F4-19BA-40F2-B011-90CF0A2B4916}" type="datetimeFigureOut">
               <a:rPr lang="en-US" smtClean="0"/>
-              <a:t>19|12|6</a:t>
+              <a:t>12/7/2019</a:t>
             </a:fld>
             <a:endParaRPr lang="en-US"/>
           </a:p>
@@ -5328,10 +5260,9 @@
           <a:lstStyle/>
           <a:p>
             <a:r>
-              <a:rPr lang="en-US" smtClean="0"/>
+              <a:rPr lang="en-US"/>
               <a:t>Click to edit Master title style</a:t>
             </a:r>
-            <a:endParaRPr lang="en-US"/>
           </a:p>
         </p:txBody>
       </p:sp>
@@ -5357,38 +5288,37 @@
           <a:p>
             <a:pPr lvl="0"/>
             <a:r>
-              <a:rPr lang="en-US" smtClean="0"/>
+              <a:rPr lang="en-US"/>
               <a:t>Click to edit Master text styles</a:t>
             </a:r>
           </a:p>
           <a:p>
             <a:pPr lvl="1"/>
             <a:r>
-              <a:rPr lang="en-US" smtClean="0"/>
+              <a:rPr lang="en-US"/>
               <a:t>Second level</a:t>
             </a:r>
           </a:p>
           <a:p>
             <a:pPr lvl="2"/>
             <a:r>
-              <a:rPr lang="en-US" smtClean="0"/>
+              <a:rPr lang="en-US"/>
               <a:t>Third level</a:t>
             </a:r>
           </a:p>
           <a:p>
             <a:pPr lvl="3"/>
             <a:r>
-              <a:rPr lang="en-US" smtClean="0"/>
+              <a:rPr lang="en-US"/>
               <a:t>Fourth level</a:t>
             </a:r>
           </a:p>
           <a:p>
             <a:pPr lvl="4"/>
             <a:r>
-              <a:rPr lang="en-US" smtClean="0"/>
+              <a:rPr lang="en-US"/>
               <a:t>Fifth level</a:t>
             </a:r>
-            <a:endParaRPr lang="en-US"/>
           </a:p>
         </p:txBody>
       </p:sp>
@@ -5414,38 +5344,37 @@
           <a:p>
             <a:pPr lvl="0"/>
             <a:r>
-              <a:rPr lang="en-US" smtClean="0"/>
+              <a:rPr lang="en-US"/>
               <a:t>Click to edit Master text styles</a:t>
             </a:r>
           </a:p>
           <a:p>
             <a:pPr lvl="1"/>
             <a:r>
-              <a:rPr lang="en-US" smtClean="0"/>
+              <a:rPr lang="en-US"/>
               <a:t>Second level</a:t>
             </a:r>
           </a:p>
           <a:p>
             <a:pPr lvl="2"/>
             <a:r>
-              <a:rPr lang="en-US" smtClean="0"/>
+              <a:rPr lang="en-US"/>
               <a:t>Third level</a:t>
             </a:r>
           </a:p>
           <a:p>
             <a:pPr lvl="3"/>
             <a:r>
-              <a:rPr lang="en-US" smtClean="0"/>
+              <a:rPr lang="en-US"/>
               <a:t>Fourth level</a:t>
             </a:r>
           </a:p>
           <a:p>
             <a:pPr lvl="4"/>
             <a:r>
-              <a:rPr lang="en-US" smtClean="0"/>
+              <a:rPr lang="en-US"/>
               <a:t>Fifth level</a:t>
             </a:r>
-            <a:endParaRPr lang="en-US"/>
           </a:p>
         </p:txBody>
       </p:sp>
@@ -5466,7 +5395,7 @@
           <a:p>
             <a:fld id="{EF60C9F4-19BA-40F2-B011-90CF0A2B4916}" type="datetimeFigureOut">
               <a:rPr lang="en-US" smtClean="0"/>
-              <a:t>19|12|6</a:t>
+              <a:t>12/7/2019</a:t>
             </a:fld>
             <a:endParaRPr lang="en-US"/>
           </a:p>
@@ -5565,10 +5494,9 @@
           <a:lstStyle/>
           <a:p>
             <a:r>
-              <a:rPr lang="en-US" smtClean="0"/>
+              <a:rPr lang="en-US"/>
               <a:t>Click to edit Master title style</a:t>
             </a:r>
-            <a:endParaRPr lang="en-US"/>
           </a:p>
         </p:txBody>
       </p:sp>
@@ -5631,7 +5559,7 @@
           <a:p>
             <a:pPr lvl="0"/>
             <a:r>
-              <a:rPr lang="en-US" smtClean="0"/>
+              <a:rPr lang="en-US"/>
               <a:t>Click to edit Master text styles</a:t>
             </a:r>
           </a:p>
@@ -5659,38 +5587,37 @@
           <a:p>
             <a:pPr lvl="0"/>
             <a:r>
-              <a:rPr lang="en-US" smtClean="0"/>
+              <a:rPr lang="en-US"/>
               <a:t>Click to edit Master text styles</a:t>
             </a:r>
           </a:p>
           <a:p>
             <a:pPr lvl="1"/>
             <a:r>
-              <a:rPr lang="en-US" smtClean="0"/>
+              <a:rPr lang="en-US"/>
               <a:t>Second level</a:t>
             </a:r>
           </a:p>
           <a:p>
             <a:pPr lvl="2"/>
             <a:r>
-              <a:rPr lang="en-US" smtClean="0"/>
+              <a:rPr lang="en-US"/>
               <a:t>Third level</a:t>
             </a:r>
           </a:p>
           <a:p>
             <a:pPr lvl="3"/>
             <a:r>
-              <a:rPr lang="en-US" smtClean="0"/>
+              <a:rPr lang="en-US"/>
               <a:t>Fourth level</a:t>
             </a:r>
           </a:p>
           <a:p>
             <a:pPr lvl="4"/>
             <a:r>
-              <a:rPr lang="en-US" smtClean="0"/>
+              <a:rPr lang="en-US"/>
               <a:t>Fifth level</a:t>
             </a:r>
-            <a:endParaRPr lang="en-US"/>
           </a:p>
         </p:txBody>
       </p:sp>
@@ -5753,7 +5680,7 @@
           <a:p>
             <a:pPr lvl="0"/>
             <a:r>
-              <a:rPr lang="en-US" smtClean="0"/>
+              <a:rPr lang="en-US"/>
               <a:t>Click to edit Master text styles</a:t>
             </a:r>
           </a:p>
@@ -5781,38 +5708,37 @@
           <a:p>
             <a:pPr lvl="0"/>
             <a:r>
-              <a:rPr lang="en-US" smtClean="0"/>
+              <a:rPr lang="en-US"/>
               <a:t>Click to edit Master text styles</a:t>
             </a:r>
           </a:p>
           <a:p>
             <a:pPr lvl="1"/>
             <a:r>
-              <a:rPr lang="en-US" smtClean="0"/>
+              <a:rPr lang="en-US"/>
               <a:t>Second level</a:t>
             </a:r>
           </a:p>
           <a:p>
             <a:pPr lvl="2"/>
             <a:r>
-              <a:rPr lang="en-US" smtClean="0"/>
+              <a:rPr lang="en-US"/>
               <a:t>Third level</a:t>
             </a:r>
           </a:p>
           <a:p>
             <a:pPr lvl="3"/>
             <a:r>
-              <a:rPr lang="en-US" smtClean="0"/>
+              <a:rPr lang="en-US"/>
               <a:t>Fourth level</a:t>
             </a:r>
           </a:p>
           <a:p>
             <a:pPr lvl="4"/>
             <a:r>
-              <a:rPr lang="en-US" smtClean="0"/>
+              <a:rPr lang="en-US"/>
               <a:t>Fifth level</a:t>
             </a:r>
-            <a:endParaRPr lang="en-US"/>
           </a:p>
         </p:txBody>
       </p:sp>
@@ -5833,7 +5759,7 @@
           <a:p>
             <a:fld id="{EF60C9F4-19BA-40F2-B011-90CF0A2B4916}" type="datetimeFigureOut">
               <a:rPr lang="en-US" smtClean="0"/>
-              <a:t>19|12|6</a:t>
+              <a:t>12/7/2019</a:t>
             </a:fld>
             <a:endParaRPr lang="en-US"/>
           </a:p>
@@ -5927,10 +5853,9 @@
           <a:lstStyle/>
           <a:p>
             <a:r>
-              <a:rPr lang="en-US" smtClean="0"/>
+              <a:rPr lang="en-US"/>
               <a:t>Click to edit Master title style</a:t>
             </a:r>
-            <a:endParaRPr lang="en-US"/>
           </a:p>
         </p:txBody>
       </p:sp>
@@ -5951,7 +5876,7 @@
           <a:p>
             <a:fld id="{EF60C9F4-19BA-40F2-B011-90CF0A2B4916}" type="datetimeFigureOut">
               <a:rPr lang="en-US" smtClean="0"/>
-              <a:t>19|12|6</a:t>
+              <a:t>12/7/2019</a:t>
             </a:fld>
             <a:endParaRPr lang="en-US"/>
           </a:p>
@@ -6046,7 +5971,7 @@
           <a:p>
             <a:fld id="{EF60C9F4-19BA-40F2-B011-90CF0A2B4916}" type="datetimeFigureOut">
               <a:rPr lang="en-US" smtClean="0"/>
-              <a:t>19|12|6</a:t>
+              <a:t>12/7/2019</a:t>
             </a:fld>
             <a:endParaRPr lang="en-US"/>
           </a:p>
@@ -6149,10 +6074,9 @@
           </a:lstStyle>
           <a:p>
             <a:r>
-              <a:rPr lang="en-US" smtClean="0"/>
+              <a:rPr lang="en-US"/>
               <a:t>Click to edit Master title style</a:t>
             </a:r>
-            <a:endParaRPr lang="en-US"/>
           </a:p>
         </p:txBody>
       </p:sp>
@@ -6206,38 +6130,37 @@
           <a:p>
             <a:pPr lvl="0"/>
             <a:r>
-              <a:rPr lang="en-US" smtClean="0"/>
+              <a:rPr lang="en-US"/>
               <a:t>Click to edit Master text styles</a:t>
             </a:r>
           </a:p>
           <a:p>
             <a:pPr lvl="1"/>
             <a:r>
-              <a:rPr lang="en-US" smtClean="0"/>
+              <a:rPr lang="en-US"/>
               <a:t>Second level</a:t>
             </a:r>
           </a:p>
           <a:p>
             <a:pPr lvl="2"/>
             <a:r>
-              <a:rPr lang="en-US" smtClean="0"/>
+              <a:rPr lang="en-US"/>
               <a:t>Third level</a:t>
             </a:r>
           </a:p>
           <a:p>
             <a:pPr lvl="3"/>
             <a:r>
-              <a:rPr lang="en-US" smtClean="0"/>
+              <a:rPr lang="en-US"/>
               <a:t>Fourth level</a:t>
             </a:r>
           </a:p>
           <a:p>
             <a:pPr lvl="4"/>
             <a:r>
-              <a:rPr lang="en-US" smtClean="0"/>
+              <a:rPr lang="en-US"/>
               <a:t>Fifth level</a:t>
             </a:r>
-            <a:endParaRPr lang="en-US"/>
           </a:p>
         </p:txBody>
       </p:sp>
@@ -6300,7 +6223,7 @@
           <a:p>
             <a:pPr lvl="0"/>
             <a:r>
-              <a:rPr lang="en-US" smtClean="0"/>
+              <a:rPr lang="en-US"/>
               <a:t>Click to edit Master text styles</a:t>
             </a:r>
           </a:p>
@@ -6323,7 +6246,7 @@
           <a:p>
             <a:fld id="{EF60C9F4-19BA-40F2-B011-90CF0A2B4916}" type="datetimeFigureOut">
               <a:rPr lang="en-US" smtClean="0"/>
-              <a:t>19|12|6</a:t>
+              <a:t>12/7/2019</a:t>
             </a:fld>
             <a:endParaRPr lang="en-US"/>
           </a:p>
@@ -6426,10 +6349,9 @@
           </a:lstStyle>
           <a:p>
             <a:r>
-              <a:rPr lang="en-US" smtClean="0"/>
+              <a:rPr lang="en-US"/>
               <a:t>Click to edit Master title style</a:t>
             </a:r>
-            <a:endParaRPr lang="en-US"/>
           </a:p>
         </p:txBody>
       </p:sp>
@@ -6553,7 +6475,7 @@
           <a:p>
             <a:pPr lvl="0"/>
             <a:r>
-              <a:rPr lang="en-US" smtClean="0"/>
+              <a:rPr lang="en-US"/>
               <a:t>Click to edit Master text styles</a:t>
             </a:r>
           </a:p>
@@ -6576,7 +6498,7 @@
           <a:p>
             <a:fld id="{EF60C9F4-19BA-40F2-B011-90CF0A2B4916}" type="datetimeFigureOut">
               <a:rPr lang="en-US" smtClean="0"/>
-              <a:t>19|12|6</a:t>
+              <a:t>12/7/2019</a:t>
             </a:fld>
             <a:endParaRPr lang="en-US"/>
           </a:p>
@@ -6685,10 +6607,9 @@
           <a:lstStyle/>
           <a:p>
             <a:r>
-              <a:rPr lang="en-US" smtClean="0"/>
+              <a:rPr lang="en-US"/>
               <a:t>Click to edit Master title style</a:t>
             </a:r>
-            <a:endParaRPr lang="en-US"/>
           </a:p>
         </p:txBody>
       </p:sp>
@@ -6719,38 +6640,37 @@
           <a:p>
             <a:pPr lvl="0"/>
             <a:r>
-              <a:rPr lang="en-US" smtClean="0"/>
+              <a:rPr lang="en-US"/>
               <a:t>Click to edit Master text styles</a:t>
             </a:r>
           </a:p>
           <a:p>
             <a:pPr lvl="1"/>
             <a:r>
-              <a:rPr lang="en-US" smtClean="0"/>
+              <a:rPr lang="en-US"/>
               <a:t>Second level</a:t>
             </a:r>
           </a:p>
           <a:p>
             <a:pPr lvl="2"/>
             <a:r>
-              <a:rPr lang="en-US" smtClean="0"/>
+              <a:rPr lang="en-US"/>
               <a:t>Third level</a:t>
             </a:r>
           </a:p>
           <a:p>
             <a:pPr lvl="3"/>
             <a:r>
-              <a:rPr lang="en-US" smtClean="0"/>
+              <a:rPr lang="en-US"/>
               <a:t>Fourth level</a:t>
             </a:r>
           </a:p>
           <a:p>
             <a:pPr lvl="4"/>
             <a:r>
-              <a:rPr lang="en-US" smtClean="0"/>
+              <a:rPr lang="en-US"/>
               <a:t>Fifth level</a:t>
             </a:r>
-            <a:endParaRPr lang="en-US"/>
           </a:p>
         </p:txBody>
       </p:sp>
@@ -6789,7 +6709,7 @@
           <a:p>
             <a:fld id="{EF60C9F4-19BA-40F2-B011-90CF0A2B4916}" type="datetimeFigureOut">
               <a:rPr lang="en-US" smtClean="0"/>
-              <a:t>19|12|6</a:t>
+              <a:t>12/7/2019</a:t>
             </a:fld>
             <a:endParaRPr lang="en-US"/>
           </a:p>
@@ -7230,10 +7150,9 @@
           <a:lstStyle/>
           <a:p>
             <a:r>
-              <a:rPr lang="en-US" dirty="0" smtClean="0"/>
+              <a:rPr lang="en-US" dirty="0"/>
               <a:t>	Extreme Programming</a:t>
             </a:r>
-            <a:endParaRPr lang="en-US" dirty="0"/>
           </a:p>
         </p:txBody>
       </p:sp>
@@ -7263,7 +7182,7 @@
           <a:lstStyle/>
           <a:p>
             <a:r>
-              <a:rPr lang="en-US" dirty="0" smtClean="0">
+              <a:rPr lang="en-US" dirty="0">
                 <a:solidFill>
                   <a:schemeClr val="bg1"/>
                 </a:solidFill>
@@ -7277,7 +7196,7 @@
               <a:buChar char="-"/>
             </a:pPr>
             <a:r>
-              <a:rPr lang="en-US" dirty="0" smtClean="0">
+              <a:rPr lang="en-US" dirty="0">
                 <a:solidFill>
                   <a:schemeClr val="bg1"/>
                 </a:solidFill>
@@ -7291,7 +7210,7 @@
               <a:buChar char="-"/>
             </a:pPr>
             <a:r>
-              <a:rPr lang="en-US" dirty="0" err="1" smtClean="0">
+              <a:rPr lang="en-US" dirty="0" err="1">
                 <a:solidFill>
                   <a:schemeClr val="bg1"/>
                 </a:solidFill>
@@ -7299,7 +7218,7 @@
               <a:t>Asim</a:t>
             </a:r>
             <a:r>
-              <a:rPr lang="en-US" dirty="0" smtClean="0">
+              <a:rPr lang="en-US" dirty="0">
                 <a:solidFill>
                   <a:schemeClr val="bg1"/>
                 </a:solidFill>
@@ -7307,14 +7226,14 @@
               <a:t> </a:t>
             </a:r>
             <a:r>
-              <a:rPr lang="en-US" dirty="0" err="1" smtClean="0">
+              <a:rPr lang="en-US" dirty="0" err="1">
                 <a:solidFill>
                   <a:schemeClr val="bg1"/>
                 </a:solidFill>
               </a:rPr>
               <a:t>Aryal</a:t>
             </a:r>
-            <a:endParaRPr lang="en-US" dirty="0" smtClean="0">
+            <a:endParaRPr lang="en-US" dirty="0">
               <a:solidFill>
                 <a:schemeClr val="bg1"/>
               </a:solidFill>
@@ -7326,7 +7245,7 @@
               <a:buChar char="-"/>
             </a:pPr>
             <a:r>
-              <a:rPr lang="en-US" dirty="0" err="1" smtClean="0">
+              <a:rPr lang="en-US" dirty="0" err="1">
                 <a:solidFill>
                   <a:schemeClr val="bg1"/>
                 </a:solidFill>
@@ -7334,7 +7253,7 @@
               <a:t>Niroj</a:t>
             </a:r>
             <a:r>
-              <a:rPr lang="en-US" dirty="0" smtClean="0">
+              <a:rPr lang="en-US" dirty="0">
                 <a:solidFill>
                   <a:schemeClr val="bg1"/>
                 </a:solidFill>
@@ -7342,14 +7261,14 @@
               <a:t> </a:t>
             </a:r>
             <a:r>
-              <a:rPr lang="en-US" dirty="0" err="1" smtClean="0">
+              <a:rPr lang="en-US" dirty="0" err="1">
                 <a:solidFill>
                   <a:schemeClr val="bg1"/>
                 </a:solidFill>
               </a:rPr>
               <a:t>Bajracharya</a:t>
             </a:r>
-            <a:endParaRPr lang="en-US" dirty="0" smtClean="0">
+            <a:endParaRPr lang="en-US" dirty="0">
               <a:solidFill>
                 <a:schemeClr val="bg1"/>
               </a:solidFill>
@@ -7361,7 +7280,7 @@
               <a:buChar char="-"/>
             </a:pPr>
             <a:r>
-              <a:rPr lang="en-US" dirty="0" err="1" smtClean="0">
+              <a:rPr lang="en-US" dirty="0" err="1">
                 <a:solidFill>
                   <a:schemeClr val="bg1"/>
                 </a:solidFill>
@@ -7369,7 +7288,7 @@
               <a:t>Sudip</a:t>
             </a:r>
             <a:r>
-              <a:rPr lang="en-US" dirty="0" smtClean="0">
+              <a:rPr lang="en-US" dirty="0">
                 <a:solidFill>
                   <a:schemeClr val="bg1"/>
                 </a:solidFill>
@@ -7377,14 +7296,14 @@
               <a:t> </a:t>
             </a:r>
             <a:r>
-              <a:rPr lang="en-US" dirty="0" err="1" smtClean="0">
+              <a:rPr lang="en-US" dirty="0" err="1">
                 <a:solidFill>
                   <a:schemeClr val="bg1"/>
                 </a:solidFill>
               </a:rPr>
               <a:t>Gyawali</a:t>
             </a:r>
-            <a:endParaRPr lang="en-US" dirty="0" smtClean="0">
+            <a:endParaRPr lang="en-US" dirty="0">
               <a:solidFill>
                 <a:schemeClr val="bg1"/>
               </a:solidFill>
@@ -7409,13 +7328,6 @@
   <p:clrMapOvr>
     <a:masterClrMapping/>
   </p:clrMapOvr>
-  <p:timing>
-    <p:tnLst>
-      <p:par>
-        <p:cTn id="1" dur="indefinite" restart="never" nodeType="tmRoot"/>
-      </p:par>
-    </p:tnLst>
-  </p:timing>
 </p:sld>
 </file>
 
@@ -7452,10 +7364,9 @@
           <a:lstStyle/>
           <a:p>
             <a:r>
-              <a:rPr lang="en-US" dirty="0" smtClean="0"/>
+              <a:rPr lang="en-US" dirty="0"/>
               <a:t>Rise of Extreme Programming</a:t>
             </a:r>
-            <a:endParaRPr lang="en-US" dirty="0"/>
           </a:p>
         </p:txBody>
       </p:sp>
@@ -7480,10 +7391,9 @@
           <a:lstStyle/>
           <a:p>
             <a:r>
-              <a:rPr lang="en-US" dirty="0" smtClean="0"/>
+              <a:rPr lang="en-US" dirty="0"/>
               <a:t>In 1990s, Object Oriented Programming replaced procedural programming.</a:t>
             </a:r>
-            <a:endParaRPr lang="en-US" dirty="0"/>
           </a:p>
         </p:txBody>
       </p:sp>
@@ -7638,10 +7548,9 @@
           <a:lstStyle/>
           <a:p>
             <a:r>
-              <a:rPr lang="en-US" dirty="0" smtClean="0"/>
+              <a:rPr lang="en-US" dirty="0"/>
               <a:t>Rise of Extreme Programming</a:t>
             </a:r>
-            <a:endParaRPr lang="en-US" dirty="0"/>
           </a:p>
         </p:txBody>
       </p:sp>
@@ -7666,10 +7575,9 @@
           <a:lstStyle/>
           <a:p>
             <a:r>
-              <a:rPr lang="en-US" dirty="0" smtClean="0"/>
+              <a:rPr lang="en-US" dirty="0"/>
               <a:t>Internet changed the business requirement to rapidly changing.</a:t>
             </a:r>
-            <a:endParaRPr lang="en-US" dirty="0"/>
           </a:p>
         </p:txBody>
       </p:sp>
@@ -7724,10 +7632,9 @@
             <a:p>
               <a:pPr algn="ctr"/>
               <a:r>
-                <a:rPr lang="en-US" dirty="0" smtClean="0"/>
+                <a:rPr lang="en-US" dirty="0"/>
                 <a:t>Dot Com Bubble</a:t>
               </a:r>
-              <a:endParaRPr lang="en-US" dirty="0"/>
             </a:p>
           </p:txBody>
         </p:sp>
@@ -7787,7 +7694,7 @@
             <a:lstStyle/>
             <a:p>
               <a:r>
-                <a:rPr lang="en-US" sz="2800" dirty="0" smtClean="0"/>
+                <a:rPr lang="en-US" sz="2800" dirty="0"/>
                 <a:t>↑ Internet rose</a:t>
               </a:r>
               <a:endParaRPr lang="en-US" dirty="0"/>
@@ -7850,21 +7757,16 @@
             <a:lstStyle/>
             <a:p>
               <a:r>
-                <a:rPr lang="en-US" dirty="0" smtClean="0"/>
+                <a:rPr lang="en-US" dirty="0"/>
                 <a:t>Development</a:t>
               </a:r>
             </a:p>
             <a:p>
               <a:pPr algn="ctr"/>
               <a:r>
-                <a:rPr lang="en-US" dirty="0" smtClean="0"/>
-                <a:t>Time </a:t>
+                <a:rPr lang="en-US" dirty="0"/>
+                <a:t>Time ↓</a:t>
               </a:r>
-              <a:r>
-                <a:rPr lang="en-US" dirty="0"/>
-                <a:t>↓</a:t>
-              </a:r>
-              <a:endParaRPr lang="en-US" dirty="0"/>
             </a:p>
           </p:txBody>
         </p:sp>
@@ -7893,7 +7795,7 @@
           <a:p>
             <a:pPr algn="ctr"/>
             <a:r>
-              <a:rPr lang="en-US" sz="8000" b="1" cap="none" spc="0" dirty="0" smtClean="0">
+              <a:rPr lang="en-US" sz="8000" b="1" cap="none" spc="0" dirty="0">
                 <a:ln w="10160">
                   <a:solidFill>
                     <a:schemeClr val="accent5"/>
@@ -7913,24 +7815,6 @@
               </a:rPr>
               <a:t>KENT BECK</a:t>
             </a:r>
-            <a:endParaRPr lang="en-US" sz="8000" b="1" cap="none" spc="0" dirty="0">
-              <a:ln w="10160">
-                <a:solidFill>
-                  <a:schemeClr val="accent5"/>
-                </a:solidFill>
-                <a:prstDash val="solid"/>
-              </a:ln>
-              <a:solidFill>
-                <a:srgbClr val="FFFFFF"/>
-              </a:solidFill>
-              <a:effectLst>
-                <a:outerShdw blurRad="38100" dist="22860" dir="5400000" algn="tl" rotWithShape="0">
-                  <a:srgbClr val="000000">
-                    <a:alpha val="30000"/>
-                  </a:srgbClr>
-                </a:outerShdw>
-              </a:effectLst>
-            </a:endParaRPr>
           </a:p>
         </p:txBody>
       </p:sp>
@@ -8268,14 +8152,13 @@
           <a:lstStyle/>
           <a:p>
             <a:r>
-              <a:rPr lang="en-US" dirty="0" smtClean="0"/>
+              <a:rPr lang="en-US" dirty="0"/>
               <a:t>Extreme Programming (XP) - </a:t>
             </a:r>
             <a:r>
-              <a:rPr lang="en-US" b="1" dirty="0" smtClean="0"/>
+              <a:rPr lang="en-US" b="1" dirty="0"/>
               <a:t>Introduction</a:t>
             </a:r>
-            <a:endParaRPr lang="en-US" b="1" dirty="0"/>
           </a:p>
         </p:txBody>
       </p:sp>
@@ -8479,10 +8362,9 @@
                 </a:spcAft>
               </a:pPr>
               <a:r>
-                <a:rPr lang="en-US" sz="3000" kern="1200" dirty="0" smtClean="0"/>
+                <a:rPr lang="en-US" sz="3000" kern="1200" dirty="0"/>
                 <a:t>Agile model</a:t>
               </a:r>
-              <a:endParaRPr lang="en-US" sz="3000" kern="1200" dirty="0"/>
             </a:p>
           </p:txBody>
         </p:sp>
@@ -8598,10 +8480,9 @@
             <a:p>
               <a:pPr algn="ctr"/>
               <a:r>
-                <a:rPr lang="en-US" dirty="0" smtClean="0"/>
+                <a:rPr lang="en-US" dirty="0"/>
                 <a:t>XP</a:t>
               </a:r>
-              <a:endParaRPr lang="en-US" dirty="0"/>
             </a:p>
           </p:txBody>
         </p:sp>
@@ -8726,10 +8607,9 @@
                 </a:spcAft>
               </a:pPr>
               <a:r>
-                <a:rPr lang="en-US" sz="1400" b="1" kern="1200" dirty="0" smtClean="0"/>
+                <a:rPr lang="en-US" sz="1400" b="1" kern="1200" dirty="0"/>
                 <a:t>Extreme Programming</a:t>
               </a:r>
-              <a:endParaRPr lang="en-US" sz="1400" b="1" kern="1200" dirty="0"/>
             </a:p>
           </p:txBody>
         </p:sp>
@@ -8796,10 +8676,9 @@
             <a:p>
               <a:pPr algn="ctr"/>
               <a:r>
-                <a:rPr lang="en-US" dirty="0" smtClean="0"/>
+                <a:rPr lang="en-US" dirty="0"/>
                 <a:t>FDD</a:t>
               </a:r>
-              <a:endParaRPr lang="en-US" dirty="0"/>
             </a:p>
           </p:txBody>
         </p:sp>
@@ -8924,10 +8803,9 @@
                 </a:spcAft>
               </a:pPr>
               <a:r>
-                <a:rPr lang="en-US" sz="1400" kern="1200" dirty="0" smtClean="0"/>
+                <a:rPr lang="en-US" sz="1400" kern="1200" dirty="0"/>
                 <a:t>Feature Driven Development</a:t>
               </a:r>
-              <a:endParaRPr lang="en-US" sz="1400" kern="1200" dirty="0"/>
             </a:p>
           </p:txBody>
         </p:sp>
@@ -8994,10 +8872,9 @@
             <a:p>
               <a:pPr algn="ctr"/>
               <a:r>
-                <a:rPr lang="en-US" dirty="0" smtClean="0"/>
+                <a:rPr lang="en-US" dirty="0"/>
                 <a:t>ASD</a:t>
               </a:r>
-              <a:endParaRPr lang="en-US" dirty="0"/>
             </a:p>
           </p:txBody>
         </p:sp>
@@ -9122,10 +8999,9 @@
                 </a:spcAft>
               </a:pPr>
               <a:r>
-                <a:rPr lang="en-US" sz="1400" kern="1200" dirty="0" smtClean="0"/>
+                <a:rPr lang="en-US" sz="1400" kern="1200" dirty="0"/>
                 <a:t>Adaptive Software Development</a:t>
               </a:r>
-              <a:endParaRPr lang="en-US" sz="1400" kern="1200" dirty="0"/>
             </a:p>
           </p:txBody>
         </p:sp>
@@ -9900,14 +9776,13 @@
           <a:lstStyle/>
           <a:p>
             <a:r>
-              <a:rPr lang="en-US" dirty="0" smtClean="0"/>
+              <a:rPr lang="en-US" dirty="0"/>
               <a:t>Extreme Programming (XP) - </a:t>
             </a:r>
             <a:r>
-              <a:rPr lang="en-US" b="1" dirty="0" smtClean="0"/>
+              <a:rPr lang="en-US" b="1" dirty="0"/>
               <a:t>Introduction</a:t>
             </a:r>
-            <a:endParaRPr lang="en-US" b="1" dirty="0"/>
           </a:p>
         </p:txBody>
       </p:sp>
@@ -9918,9 +9793,9 @@
           <p:nvPr/>
         </p:nvSpPr>
         <p:spPr>
-          <a:xfrm>
-            <a:off x="577755" y="1577285"/>
-            <a:ext cx="11379784" cy="369332"/>
+          <a:xfrm rot="10800000" flipV="1">
+            <a:off x="1533004" y="3293655"/>
+            <a:ext cx="10764771" cy="521046"/>
           </a:xfrm>
           <a:prstGeom prst="rect">
             <a:avLst/>
@@ -9937,6 +9812,70 @@
               <a:buChar char="•"/>
             </a:pPr>
             <a:endParaRPr lang="en-US" dirty="0"/>
+          </a:p>
+        </p:txBody>
+      </p:sp>
+      <p:sp>
+        <p:nvSpPr>
+          <p:cNvPr id="5" name="TextBox 4">
+            <a:extLst>
+              <a:ext uri="{FF2B5EF4-FFF2-40B4-BE49-F238E27FC236}">
+                <a16:creationId xmlns:a16="http://schemas.microsoft.com/office/drawing/2014/main" id="{845BC587-C97E-5C40-ADA8-4F2558DF8CD7}"/>
+              </a:ext>
+            </a:extLst>
+          </p:cNvPr>
+          <p:cNvSpPr txBox="1"/>
+          <p:nvPr/>
+        </p:nvSpPr>
+        <p:spPr>
+          <a:xfrm>
+            <a:off x="352418" y="1541349"/>
+            <a:ext cx="12150988" cy="2677656"/>
+          </a:xfrm>
+          <a:prstGeom prst="rect">
+            <a:avLst/>
+          </a:prstGeom>
+          <a:noFill/>
+        </p:spPr>
+        <p:txBody>
+          <a:bodyPr wrap="square">
+            <a:spAutoFit/>
+          </a:bodyPr>
+          <a:lstStyle/>
+          <a:p>
+            <a:pPr marL="457200" indent="-457200">
+              <a:buFont typeface="Arial" panose="020B0604020202020204" pitchFamily="34" charset="0"/>
+              <a:buChar char="•"/>
+            </a:pPr>
+            <a:r>
+              <a:rPr lang="en-US" sz="2800"/>
+              <a:t>Extreme Programming can be defined as: software development model intended to improve software quality &amp; responsiveness to changing software requirements. </a:t>
+            </a:r>
+          </a:p>
+          <a:p>
+            <a:pPr marL="457200" indent="-457200">
+              <a:buFont typeface="Arial" panose="020B0604020202020204" pitchFamily="34" charset="0"/>
+              <a:buChar char="•"/>
+            </a:pPr>
+            <a:endParaRPr lang="en-US" sz="2800"/>
+          </a:p>
+          <a:p>
+            <a:pPr marL="457200" indent="-457200">
+              <a:buFont typeface="Arial" panose="020B0604020202020204" pitchFamily="34" charset="0"/>
+              <a:buChar char="•"/>
+            </a:pPr>
+            <a:r>
+              <a:rPr lang="en-US" sz="2800"/>
+              <a:t>In XP, there are </a:t>
+            </a:r>
+            <a:r>
+              <a:rPr lang="en-US" sz="2800" b="1"/>
+              <a:t>shorter software development cycles</a:t>
+            </a:r>
+            <a:r>
+              <a:rPr lang="en-US" sz="2800"/>
+              <a:t> where checkpoints can be incorporating new software requirements. </a:t>
+            </a:r>
           </a:p>
         </p:txBody>
       </p:sp>
@@ -9950,13 +9889,107 @@
   <p:clrMapOvr>
     <a:masterClrMapping/>
   </p:clrMapOvr>
-  <p:timing>
-    <p:tnLst>
-      <p:par>
-        <p:cTn id="1" dur="indefinite" restart="never" nodeType="tmRoot"/>
-      </p:par>
-    </p:tnLst>
-  </p:timing>
+</p:sld>
+</file>
+
+<file path=ppt/slides/slide6.xml><?xml version="1.0" encoding="utf-8"?>
+<p:sld xmlns:a="http://schemas.openxmlformats.org/drawingml/2006/main" xmlns:r="http://schemas.openxmlformats.org/officeDocument/2006/relationships" xmlns:p="http://schemas.openxmlformats.org/presentationml/2006/main">
+  <p:cSld>
+    <p:spTree>
+      <p:nvGrpSpPr>
+        <p:cNvPr id="1" name=""/>
+        <p:cNvGrpSpPr/>
+        <p:nvPr/>
+      </p:nvGrpSpPr>
+      <p:grpSpPr>
+        <a:xfrm>
+          <a:off x="0" y="0"/>
+          <a:ext cx="0" cy="0"/>
+          <a:chOff x="0" y="0"/>
+          <a:chExt cx="0" cy="0"/>
+        </a:xfrm>
+      </p:grpSpPr>
+      <p:sp>
+        <p:nvSpPr>
+          <p:cNvPr id="2" name="Title 1">
+            <a:extLst>
+              <a:ext uri="{FF2B5EF4-FFF2-40B4-BE49-F238E27FC236}">
+                <a16:creationId xmlns:a16="http://schemas.microsoft.com/office/drawing/2014/main" id="{C93B6084-F736-A941-B57C-DA4A0F990DB0}"/>
+              </a:ext>
+            </a:extLst>
+          </p:cNvPr>
+          <p:cNvSpPr>
+            <a:spLocks noGrp="1"/>
+          </p:cNvSpPr>
+          <p:nvPr>
+            <p:ph type="title"/>
+          </p:nvPr>
+        </p:nvSpPr>
+        <p:spPr>
+          <a:xfrm>
+            <a:off x="129752" y="365125"/>
+            <a:ext cx="11224048" cy="1460500"/>
+          </a:xfrm>
+        </p:spPr>
+        <p:txBody>
+          <a:bodyPr/>
+          <a:lstStyle/>
+          <a:p>
+            <a:r>
+              <a:rPr lang="en-US"/>
+              <a:t>Extreme Programming (XP) - </a:t>
+            </a:r>
+            <a:r>
+              <a:rPr lang="en-US" b="1"/>
+              <a:t>Diagram</a:t>
+            </a:r>
+            <a:endParaRPr lang="en-US"/>
+          </a:p>
+        </p:txBody>
+      </p:sp>
+      <p:sp>
+        <p:nvSpPr>
+          <p:cNvPr id="6" name="TextBox 5">
+            <a:extLst>
+              <a:ext uri="{FF2B5EF4-FFF2-40B4-BE49-F238E27FC236}">
+                <a16:creationId xmlns:a16="http://schemas.microsoft.com/office/drawing/2014/main" id="{4E292BAC-9FB4-7241-A8BB-F0A7AC4E93FD}"/>
+              </a:ext>
+            </a:extLst>
+          </p:cNvPr>
+          <p:cNvSpPr txBox="1"/>
+          <p:nvPr/>
+        </p:nvSpPr>
+        <p:spPr>
+          <a:xfrm>
+            <a:off x="5124980" y="2512241"/>
+            <a:ext cx="1828800" cy="1828800"/>
+          </a:xfrm>
+          <a:prstGeom prst="rect">
+            <a:avLst/>
+          </a:prstGeom>
+          <a:noFill/>
+        </p:spPr>
+        <p:txBody>
+          <a:bodyPr wrap="square" rtlCol="0">
+            <a:spAutoFit/>
+          </a:bodyPr>
+          <a:lstStyle/>
+          <a:p>
+            <a:pPr algn="l"/>
+            <a:endParaRPr lang="en-US"/>
+          </a:p>
+        </p:txBody>
+      </p:sp>
+    </p:spTree>
+    <p:extLst>
+      <p:ext uri="{BB962C8B-B14F-4D97-AF65-F5344CB8AC3E}">
+        <p14:creationId xmlns:p14="http://schemas.microsoft.com/office/powerpoint/2010/main" val="1286191198"/>
+      </p:ext>
+    </p:extLst>
+  </p:cSld>
+  <p:clrMapOvr>
+    <a:masterClrMapping/>
+  </p:clrMapOvr>
 </p:sld>
 </file>
 

</xml_diff>

<commit_message>
added 1 slide through phone
</commit_message>
<xml_diff>
--- a/extreme_programming.pptx
+++ b/extreme_programming.pptx
@@ -5,7 +5,7 @@
     <p:sldMasterId id="2147483648" r:id="rId1"/>
   </p:sldMasterIdLst>
   <p:notesMasterIdLst>
-    <p:notesMasterId r:id="rId7"/>
+    <p:notesMasterId r:id="rId8"/>
   </p:notesMasterIdLst>
   <p:sldIdLst>
     <p:sldId id="256" r:id="rId2"/>
@@ -13,6 +13,7 @@
     <p:sldId id="258" r:id="rId4"/>
     <p:sldId id="259" r:id="rId5"/>
     <p:sldId id="260" r:id="rId6"/>
+    <p:sldId id="261" r:id="rId7"/>
   </p:sldIdLst>
   <p:sldSz cx="12192000" cy="6858000"/>
   <p:notesSz cx="6858000" cy="9144000"/>
@@ -888,10 +889,9 @@
         <a:lstStyle/>
         <a:p>
           <a:r>
-            <a:rPr lang="en-US" dirty="0" smtClean="0"/>
+            <a:rPr lang="en-US" dirty="0"/>
             <a:t>Software development model</a:t>
           </a:r>
-          <a:endParaRPr lang="en-US" dirty="0"/>
         </a:p>
       </dgm:t>
     </dgm:pt>
@@ -925,10 +925,9 @@
         <a:lstStyle/>
         <a:p>
           <a:r>
-            <a:rPr lang="en-US" dirty="0" smtClean="0"/>
+            <a:rPr lang="en-US" dirty="0"/>
             <a:t>Waterfall model</a:t>
           </a:r>
-          <a:endParaRPr lang="en-US" dirty="0"/>
         </a:p>
       </dgm:t>
     </dgm:pt>
@@ -962,10 +961,9 @@
         <a:lstStyle/>
         <a:p>
           <a:r>
-            <a:rPr lang="en-US" dirty="0" smtClean="0"/>
+            <a:rPr lang="en-US" dirty="0"/>
             <a:t>Iterative model</a:t>
           </a:r>
-          <a:endParaRPr lang="en-US" dirty="0"/>
         </a:p>
       </dgm:t>
     </dgm:pt>
@@ -999,14 +997,9 @@
         <a:lstStyle/>
         <a:p>
           <a:r>
-            <a:rPr lang="en-US" dirty="0" smtClean="0"/>
-            <a:t>Agile </a:t>
+            <a:rPr lang="en-US" dirty="0"/>
+            <a:t>Agile model</a:t>
           </a:r>
-          <a:r>
-            <a:rPr lang="en-US" dirty="0" smtClean="0"/>
-            <a:t>model</a:t>
-          </a:r>
-          <a:endParaRPr lang="en-US" dirty="0"/>
         </a:p>
       </dgm:t>
     </dgm:pt>
@@ -1041,10 +1034,9 @@
         <a:p>
           <a:pPr algn="ctr"/>
           <a:r>
-            <a:rPr lang="en-US" dirty="0" smtClean="0"/>
+            <a:rPr lang="en-US" dirty="0"/>
             <a:t>RAD model</a:t>
           </a:r>
-          <a:endParaRPr lang="en-US" dirty="0"/>
         </a:p>
       </dgm:t>
     </dgm:pt>
@@ -1079,10 +1071,9 @@
         <a:p>
           <a:pPr algn="ctr"/>
           <a:r>
-            <a:rPr lang="en-US" dirty="0" smtClean="0"/>
+            <a:rPr lang="en-US" dirty="0"/>
             <a:t>Incremental model</a:t>
           </a:r>
-          <a:endParaRPr lang="en-US" dirty="0"/>
         </a:p>
       </dgm:t>
     </dgm:pt>
@@ -1117,10 +1108,9 @@
         <a:p>
           <a:pPr algn="ctr"/>
           <a:r>
-            <a:rPr lang="en-US" dirty="0" smtClean="0"/>
+            <a:rPr lang="en-US" dirty="0"/>
             <a:t>V model</a:t>
           </a:r>
-          <a:endParaRPr lang="en-US" dirty="0"/>
         </a:p>
       </dgm:t>
     </dgm:pt>
@@ -1155,10 +1145,9 @@
         <a:p>
           <a:pPr algn="ctr"/>
           <a:r>
-            <a:rPr lang="en-US" dirty="0" smtClean="0"/>
+            <a:rPr lang="en-US" dirty="0"/>
             <a:t>Spiral model</a:t>
           </a:r>
-          <a:endParaRPr lang="en-US" dirty="0"/>
         </a:p>
       </dgm:t>
     </dgm:pt>
@@ -1198,13 +1187,6 @@
     <dgm:pt modelId="{8046D806-D633-4925-88FF-13EA3736C642}" type="pres">
       <dgm:prSet presAssocID="{3E21CBF3-ED67-4DE4-92E8-D28F4E02C66C}" presName="centerShape" presStyleLbl="node0" presStyleIdx="0" presStyleCnt="1"/>
       <dgm:spPr/>
-      <dgm:t>
-        <a:bodyPr/>
-        <a:lstStyle/>
-        <a:p>
-          <a:endParaRPr lang="en-US"/>
-        </a:p>
-      </dgm:t>
     </dgm:pt>
     <dgm:pt modelId="{0B9D4084-EA21-4F7B-A20F-0E1723A71ADE}" type="pres">
       <dgm:prSet presAssocID="{3A1CE0DB-424D-4E8C-9CC4-E9A7F0192187}" presName="node" presStyleLbl="node1" presStyleIdx="0" presStyleCnt="7">
@@ -1213,13 +1195,6 @@
         </dgm:presLayoutVars>
       </dgm:prSet>
       <dgm:spPr/>
-      <dgm:t>
-        <a:bodyPr/>
-        <a:lstStyle/>
-        <a:p>
-          <a:endParaRPr lang="en-US"/>
-        </a:p>
-      </dgm:t>
     </dgm:pt>
     <dgm:pt modelId="{C3F76657-0C10-4626-945F-7A6C8CB3D378}" type="pres">
       <dgm:prSet presAssocID="{3A1CE0DB-424D-4E8C-9CC4-E9A7F0192187}" presName="dummy" presStyleCnt="0"/>
@@ -1236,13 +1211,6 @@
         </dgm:presLayoutVars>
       </dgm:prSet>
       <dgm:spPr/>
-      <dgm:t>
-        <a:bodyPr/>
-        <a:lstStyle/>
-        <a:p>
-          <a:endParaRPr lang="en-US"/>
-        </a:p>
-      </dgm:t>
     </dgm:pt>
     <dgm:pt modelId="{1C97F2A5-5C24-4585-9A86-9D9C4FF71750}" type="pres">
       <dgm:prSet presAssocID="{446E3B0E-A84C-4C0D-90C5-2CDA8EE8A1E3}" presName="dummy" presStyleCnt="0"/>
@@ -1259,13 +1227,6 @@
         </dgm:presLayoutVars>
       </dgm:prSet>
       <dgm:spPr/>
-      <dgm:t>
-        <a:bodyPr/>
-        <a:lstStyle/>
-        <a:p>
-          <a:endParaRPr lang="en-US"/>
-        </a:p>
-      </dgm:t>
     </dgm:pt>
     <dgm:pt modelId="{F71AE671-5521-4538-904C-D35BB1613898}" type="pres">
       <dgm:prSet presAssocID="{BD0E6AD9-71FA-4C38-8A7F-3AE8864E181B}" presName="dummy" presStyleCnt="0"/>
@@ -1282,13 +1243,6 @@
         </dgm:presLayoutVars>
       </dgm:prSet>
       <dgm:spPr/>
-      <dgm:t>
-        <a:bodyPr/>
-        <a:lstStyle/>
-        <a:p>
-          <a:endParaRPr lang="en-US"/>
-        </a:p>
-      </dgm:t>
     </dgm:pt>
     <dgm:pt modelId="{DDABE81E-CC26-47A2-9338-31B34FE15AC9}" type="pres">
       <dgm:prSet presAssocID="{BF8C4942-3560-466A-B7F7-036045090DB4}" presName="dummy" presStyleCnt="0"/>
@@ -1337,13 +1291,6 @@
         </dgm:presLayoutVars>
       </dgm:prSet>
       <dgm:spPr/>
-      <dgm:t>
-        <a:bodyPr/>
-        <a:lstStyle/>
-        <a:p>
-          <a:endParaRPr lang="en-US"/>
-        </a:p>
-      </dgm:t>
     </dgm:pt>
     <dgm:pt modelId="{D04A1D7A-1F4E-4F24-8F55-DAB82E2F31D9}" type="pres">
       <dgm:prSet presAssocID="{801A760C-B3A6-4942-B41F-1B74F7CFB869}" presName="dummy" presStyleCnt="0"/>
@@ -1355,30 +1302,30 @@
     </dgm:pt>
   </dgm:ptLst>
   <dgm:cxnLst>
+    <dgm:cxn modelId="{E9743714-F755-4952-B8AE-87189FB9134E}" type="presOf" srcId="{EAA2BEE3-0DBD-465D-BB64-31830BFC8ABC}" destId="{120EC894-2FDD-4E69-8DA1-1E4987D6750C}" srcOrd="0" destOrd="0" presId="urn:microsoft.com/office/officeart/2005/8/layout/radial6"/>
+    <dgm:cxn modelId="{8FCE9B16-5AA7-4F09-B332-9E3766D358F6}" srcId="{3E21CBF3-ED67-4DE4-92E8-D28F4E02C66C}" destId="{BF8C4942-3560-466A-B7F7-036045090DB4}" srcOrd="3" destOrd="0" parTransId="{1BB7DC7D-6905-49E9-9FD0-654AD573C40E}" sibTransId="{2E8BD8F1-AC8D-430A-A16A-29538E9A8D89}"/>
     <dgm:cxn modelId="{CC218D1B-DE1E-4C94-83BC-7E2AA8A513E5}" type="presOf" srcId="{821F0E55-CEF6-48A1-AC37-6D1FD50F8A7C}" destId="{43787B64-6ECE-4862-83FC-999710B65D94}" srcOrd="0" destOrd="0" presId="urn:microsoft.com/office/officeart/2005/8/layout/radial6"/>
+    <dgm:cxn modelId="{4F5D3727-F173-42E5-BE78-47119F4A09E9}" type="presOf" srcId="{E4A3282E-BB57-4C66-ACAD-724F46D03C99}" destId="{ADF11B85-49CD-4C45-834D-28EF8F01FAF4}" srcOrd="0" destOrd="0" presId="urn:microsoft.com/office/officeart/2005/8/layout/radial6"/>
+    <dgm:cxn modelId="{42468133-6626-413F-8036-DCB1ECD7F00D}" srcId="{8A4D3A20-F65F-4192-9123-EAC5330E5D1D}" destId="{3E21CBF3-ED67-4DE4-92E8-D28F4E02C66C}" srcOrd="0" destOrd="0" parTransId="{62D71432-5937-427D-9E65-CD7804702917}" sibTransId="{56D95F66-2F36-41C3-A4C8-AAA41A7C5935}"/>
+    <dgm:cxn modelId="{93AA4161-2792-4A73-924C-3A9358908DED}" srcId="{3E21CBF3-ED67-4DE4-92E8-D28F4E02C66C}" destId="{7C910102-AEE4-484B-ACEB-B163D80A8AC3}" srcOrd="5" destOrd="0" parTransId="{2C662DC6-0642-4B64-BA19-E82C9A57D4C8}" sibTransId="{821F0E55-CEF6-48A1-AC37-6D1FD50F8A7C}"/>
+    <dgm:cxn modelId="{CB5E1146-E11D-4CD5-866D-1BEA23F58352}" srcId="{3E21CBF3-ED67-4DE4-92E8-D28F4E02C66C}" destId="{3A1CE0DB-424D-4E8C-9CC4-E9A7F0192187}" srcOrd="0" destOrd="0" parTransId="{584E096D-ECCA-45D3-8418-8AF5829CA25D}" sibTransId="{52532CF6-0526-4785-A2A6-1AD1072ADB9D}"/>
+    <dgm:cxn modelId="{92566467-7247-47BB-92DD-F94AED937561}" type="presOf" srcId="{BF8C4942-3560-466A-B7F7-036045090DB4}" destId="{B0856285-8B4C-4921-A3FF-D6436B7247C2}" srcOrd="0" destOrd="0" presId="urn:microsoft.com/office/officeart/2005/8/layout/radial6"/>
+    <dgm:cxn modelId="{4DD5694D-2AF2-4CFA-9337-E79D88305FFC}" type="presOf" srcId="{3E21CBF3-ED67-4DE4-92E8-D28F4E02C66C}" destId="{8046D806-D633-4925-88FF-13EA3736C642}" srcOrd="0" destOrd="0" presId="urn:microsoft.com/office/officeart/2005/8/layout/radial6"/>
+    <dgm:cxn modelId="{018C504D-7874-4067-8879-D7782E9BE75B}" type="presOf" srcId="{801A760C-B3A6-4942-B41F-1B74F7CFB869}" destId="{C0E538A1-8247-4D29-A464-326B7E9E49F2}" srcOrd="0" destOrd="0" presId="urn:microsoft.com/office/officeart/2005/8/layout/radial6"/>
+    <dgm:cxn modelId="{F2CD6D79-35C3-46D2-8458-7C54E7AD556B}" srcId="{3E21CBF3-ED67-4DE4-92E8-D28F4E02C66C}" destId="{446E3B0E-A84C-4C0D-90C5-2CDA8EE8A1E3}" srcOrd="1" destOrd="0" parTransId="{86A5A7C0-6915-4FCE-82B7-85A9613781AF}" sibTransId="{1E6BF274-94E7-49EA-823A-D7901911558F}"/>
+    <dgm:cxn modelId="{D76F3C5A-023F-4A45-ACBC-D57F39A6B014}" type="presOf" srcId="{2E8BD8F1-AC8D-430A-A16A-29538E9A8D89}" destId="{D4C25836-BB1E-40C6-9055-79DFE51E84A4}" srcOrd="0" destOrd="0" presId="urn:microsoft.com/office/officeart/2005/8/layout/radial6"/>
+    <dgm:cxn modelId="{327FA47C-F072-4DC1-B582-E34C662F0AC8}" srcId="{3E21CBF3-ED67-4DE4-92E8-D28F4E02C66C}" destId="{EAA2BEE3-0DBD-465D-BB64-31830BFC8ABC}" srcOrd="4" destOrd="0" parTransId="{4622D5E9-A79E-4AC5-AC80-5F230C759282}" sibTransId="{C8CE8BA7-678D-4C94-8F91-3A77355BB83A}"/>
     <dgm:cxn modelId="{81F40D88-E1FA-41F6-BC21-DA8471BBF5BC}" type="presOf" srcId="{3A1CE0DB-424D-4E8C-9CC4-E9A7F0192187}" destId="{0B9D4084-EA21-4F7B-A20F-0E1723A71ADE}" srcOrd="0" destOrd="0" presId="urn:microsoft.com/office/officeart/2005/8/layout/radial6"/>
+    <dgm:cxn modelId="{E5A2C89A-9107-4792-8CCC-4898D6EC5DBA}" srcId="{3E21CBF3-ED67-4DE4-92E8-D28F4E02C66C}" destId="{801A760C-B3A6-4942-B41F-1B74F7CFB869}" srcOrd="6" destOrd="0" parTransId="{FF8C1F41-9000-4666-8B3C-F006C6352F33}" sibTransId="{088CB9C7-E6AD-4656-9612-A21801614288}"/>
+    <dgm:cxn modelId="{DAA053A5-BCE7-48B6-8287-21AE5DC5B4BA}" type="presOf" srcId="{7C910102-AEE4-484B-ACEB-B163D80A8AC3}" destId="{5EBC7458-FEF4-4BAA-BB89-62B9D0604C8A}" srcOrd="0" destOrd="0" presId="urn:microsoft.com/office/officeart/2005/8/layout/radial6"/>
     <dgm:cxn modelId="{FB39E0B0-FD2B-47CC-8CE3-29C073135CA4}" type="presOf" srcId="{446E3B0E-A84C-4C0D-90C5-2CDA8EE8A1E3}" destId="{024B37C8-2E78-4627-9714-90BFEACD2D8D}" srcOrd="0" destOrd="0" presId="urn:microsoft.com/office/officeart/2005/8/layout/radial6"/>
-    <dgm:cxn modelId="{4F5D3727-F173-42E5-BE78-47119F4A09E9}" type="presOf" srcId="{E4A3282E-BB57-4C66-ACAD-724F46D03C99}" destId="{ADF11B85-49CD-4C45-834D-28EF8F01FAF4}" srcOrd="0" destOrd="0" presId="urn:microsoft.com/office/officeart/2005/8/layout/radial6"/>
-    <dgm:cxn modelId="{EFFA6EF2-B05B-4E0A-B221-5F635EFD3D52}" type="presOf" srcId="{088CB9C7-E6AD-4656-9612-A21801614288}" destId="{974D1544-313C-4B85-96E4-F98694E51952}" srcOrd="0" destOrd="0" presId="urn:microsoft.com/office/officeart/2005/8/layout/radial6"/>
-    <dgm:cxn modelId="{DAA053A5-BCE7-48B6-8287-21AE5DC5B4BA}" type="presOf" srcId="{7C910102-AEE4-484B-ACEB-B163D80A8AC3}" destId="{5EBC7458-FEF4-4BAA-BB89-62B9D0604C8A}" srcOrd="0" destOrd="0" presId="urn:microsoft.com/office/officeart/2005/8/layout/radial6"/>
-    <dgm:cxn modelId="{E9743714-F755-4952-B8AE-87189FB9134E}" type="presOf" srcId="{EAA2BEE3-0DBD-465D-BB64-31830BFC8ABC}" destId="{120EC894-2FDD-4E69-8DA1-1E4987D6750C}" srcOrd="0" destOrd="0" presId="urn:microsoft.com/office/officeart/2005/8/layout/radial6"/>
-    <dgm:cxn modelId="{4DD5694D-2AF2-4CFA-9337-E79D88305FFC}" type="presOf" srcId="{3E21CBF3-ED67-4DE4-92E8-D28F4E02C66C}" destId="{8046D806-D633-4925-88FF-13EA3736C642}" srcOrd="0" destOrd="0" presId="urn:microsoft.com/office/officeart/2005/8/layout/radial6"/>
-    <dgm:cxn modelId="{42468133-6626-413F-8036-DCB1ECD7F00D}" srcId="{8A4D3A20-F65F-4192-9123-EAC5330E5D1D}" destId="{3E21CBF3-ED67-4DE4-92E8-D28F4E02C66C}" srcOrd="0" destOrd="0" parTransId="{62D71432-5937-427D-9E65-CD7804702917}" sibTransId="{56D95F66-2F36-41C3-A4C8-AAA41A7C5935}"/>
     <dgm:cxn modelId="{50BB35C0-5301-4620-96E0-8F8C590935C8}" type="presOf" srcId="{1E6BF274-94E7-49EA-823A-D7901911558F}" destId="{3403E89E-646F-4749-98B8-1636056908AA}" srcOrd="0" destOrd="0" presId="urn:microsoft.com/office/officeart/2005/8/layout/radial6"/>
     <dgm:cxn modelId="{CE250DD7-ACD0-419C-BC0A-C35258FD7568}" type="presOf" srcId="{C8CE8BA7-678D-4C94-8F91-3A77355BB83A}" destId="{62725212-3288-4862-A14D-4E6BB5BCB641}" srcOrd="0" destOrd="0" presId="urn:microsoft.com/office/officeart/2005/8/layout/radial6"/>
-    <dgm:cxn modelId="{92566467-7247-47BB-92DD-F94AED937561}" type="presOf" srcId="{BF8C4942-3560-466A-B7F7-036045090DB4}" destId="{B0856285-8B4C-4921-A3FF-D6436B7247C2}" srcOrd="0" destOrd="0" presId="urn:microsoft.com/office/officeart/2005/8/layout/radial6"/>
-    <dgm:cxn modelId="{66EDC8FB-B067-479B-8726-281A44F690D2}" type="presOf" srcId="{52532CF6-0526-4785-A2A6-1AD1072ADB9D}" destId="{98C0CE5D-6568-4C58-8044-A6118E4DFAF6}" srcOrd="0" destOrd="0" presId="urn:microsoft.com/office/officeart/2005/8/layout/radial6"/>
-    <dgm:cxn modelId="{D76F3C5A-023F-4A45-ACBC-D57F39A6B014}" type="presOf" srcId="{2E8BD8F1-AC8D-430A-A16A-29538E9A8D89}" destId="{D4C25836-BB1E-40C6-9055-79DFE51E84A4}" srcOrd="0" destOrd="0" presId="urn:microsoft.com/office/officeart/2005/8/layout/radial6"/>
-    <dgm:cxn modelId="{93AA4161-2792-4A73-924C-3A9358908DED}" srcId="{3E21CBF3-ED67-4DE4-92E8-D28F4E02C66C}" destId="{7C910102-AEE4-484B-ACEB-B163D80A8AC3}" srcOrd="5" destOrd="0" parTransId="{2C662DC6-0642-4B64-BA19-E82C9A57D4C8}" sibTransId="{821F0E55-CEF6-48A1-AC37-6D1FD50F8A7C}"/>
     <dgm:cxn modelId="{9567DEDF-D775-4550-8F1F-6817B3956601}" type="presOf" srcId="{8A4D3A20-F65F-4192-9123-EAC5330E5D1D}" destId="{AF29EEAD-64B5-4C37-8C6D-6E10B5F4AE2B}" srcOrd="0" destOrd="0" presId="urn:microsoft.com/office/officeart/2005/8/layout/radial6"/>
     <dgm:cxn modelId="{FFE282E0-13BB-4F72-8399-760865E79B14}" type="presOf" srcId="{BD0E6AD9-71FA-4C38-8A7F-3AE8864E181B}" destId="{D02A1073-280A-4030-B61B-6AB009F7EB42}" srcOrd="0" destOrd="0" presId="urn:microsoft.com/office/officeart/2005/8/layout/radial6"/>
-    <dgm:cxn modelId="{E5A2C89A-9107-4792-8CCC-4898D6EC5DBA}" srcId="{3E21CBF3-ED67-4DE4-92E8-D28F4E02C66C}" destId="{801A760C-B3A6-4942-B41F-1B74F7CFB869}" srcOrd="6" destOrd="0" parTransId="{FF8C1F41-9000-4666-8B3C-F006C6352F33}" sibTransId="{088CB9C7-E6AD-4656-9612-A21801614288}"/>
-    <dgm:cxn modelId="{327FA47C-F072-4DC1-B582-E34C662F0AC8}" srcId="{3E21CBF3-ED67-4DE4-92E8-D28F4E02C66C}" destId="{EAA2BEE3-0DBD-465D-BB64-31830BFC8ABC}" srcOrd="4" destOrd="0" parTransId="{4622D5E9-A79E-4AC5-AC80-5F230C759282}" sibTransId="{C8CE8BA7-678D-4C94-8F91-3A77355BB83A}"/>
-    <dgm:cxn modelId="{F2CD6D79-35C3-46D2-8458-7C54E7AD556B}" srcId="{3E21CBF3-ED67-4DE4-92E8-D28F4E02C66C}" destId="{446E3B0E-A84C-4C0D-90C5-2CDA8EE8A1E3}" srcOrd="1" destOrd="0" parTransId="{86A5A7C0-6915-4FCE-82B7-85A9613781AF}" sibTransId="{1E6BF274-94E7-49EA-823A-D7901911558F}"/>
-    <dgm:cxn modelId="{CB5E1146-E11D-4CD5-866D-1BEA23F58352}" srcId="{3E21CBF3-ED67-4DE4-92E8-D28F4E02C66C}" destId="{3A1CE0DB-424D-4E8C-9CC4-E9A7F0192187}" srcOrd="0" destOrd="0" parTransId="{584E096D-ECCA-45D3-8418-8AF5829CA25D}" sibTransId="{52532CF6-0526-4785-A2A6-1AD1072ADB9D}"/>
-    <dgm:cxn modelId="{8FCE9B16-5AA7-4F09-B332-9E3766D358F6}" srcId="{3E21CBF3-ED67-4DE4-92E8-D28F4E02C66C}" destId="{BF8C4942-3560-466A-B7F7-036045090DB4}" srcOrd="3" destOrd="0" parTransId="{1BB7DC7D-6905-49E9-9FD0-654AD573C40E}" sibTransId="{2E8BD8F1-AC8D-430A-A16A-29538E9A8D89}"/>
-    <dgm:cxn modelId="{018C504D-7874-4067-8879-D7782E9BE75B}" type="presOf" srcId="{801A760C-B3A6-4942-B41F-1B74F7CFB869}" destId="{C0E538A1-8247-4D29-A464-326B7E9E49F2}" srcOrd="0" destOrd="0" presId="urn:microsoft.com/office/officeart/2005/8/layout/radial6"/>
     <dgm:cxn modelId="{553FE6F1-27F8-4BAB-A7E2-EC6F04AD7955}" srcId="{3E21CBF3-ED67-4DE4-92E8-D28F4E02C66C}" destId="{BD0E6AD9-71FA-4C38-8A7F-3AE8864E181B}" srcOrd="2" destOrd="0" parTransId="{21A2A793-8C28-4FBF-B131-56655A905B20}" sibTransId="{E4A3282E-BB57-4C66-ACAD-724F46D03C99}"/>
+    <dgm:cxn modelId="{EFFA6EF2-B05B-4E0A-B221-5F635EFD3D52}" type="presOf" srcId="{088CB9C7-E6AD-4656-9612-A21801614288}" destId="{974D1544-313C-4B85-96E4-F98694E51952}" srcOrd="0" destOrd="0" presId="urn:microsoft.com/office/officeart/2005/8/layout/radial6"/>
+    <dgm:cxn modelId="{66EDC8FB-B067-479B-8726-281A44F690D2}" type="presOf" srcId="{52532CF6-0526-4785-A2A6-1AD1072ADB9D}" destId="{98C0CE5D-6568-4C58-8044-A6118E4DFAF6}" srcOrd="0" destOrd="0" presId="urn:microsoft.com/office/officeart/2005/8/layout/radial6"/>
     <dgm:cxn modelId="{A04761CE-40E8-4443-8732-F45F58B56D78}" type="presParOf" srcId="{AF29EEAD-64B5-4C37-8C6D-6E10B5F4AE2B}" destId="{8046D806-D633-4925-88FF-13EA3736C642}" srcOrd="0" destOrd="0" presId="urn:microsoft.com/office/officeart/2005/8/layout/radial6"/>
     <dgm:cxn modelId="{2BDE61AF-93C8-4714-955F-AC1CEEAD996A}" type="presParOf" srcId="{AF29EEAD-64B5-4C37-8C6D-6E10B5F4AE2B}" destId="{0B9D4084-EA21-4F7B-A20F-0E1723A71ADE}" srcOrd="1" destOrd="0" presId="urn:microsoft.com/office/officeart/2005/8/layout/radial6"/>
     <dgm:cxn modelId="{D3FBE3C8-C3B7-4527-A151-529E9FDD7DB8}" type="presParOf" srcId="{AF29EEAD-64B5-4C37-8C6D-6E10B5F4AE2B}" destId="{C3F76657-0C10-4626-945F-7A6C8CB3D378}" srcOrd="2" destOrd="0" presId="urn:microsoft.com/office/officeart/2005/8/layout/radial6"/>
@@ -1797,7 +1744,7 @@
         </a:bodyPr>
         <a:lstStyle/>
         <a:p>
-          <a:pPr lvl="0" algn="ctr" defTabSz="533400">
+          <a:pPr marL="0" lvl="0" indent="0" algn="ctr" defTabSz="533400">
             <a:lnSpc>
               <a:spcPct val="90000"/>
             </a:lnSpc>
@@ -1807,12 +1754,12 @@
             <a:spcAft>
               <a:spcPct val="35000"/>
             </a:spcAft>
+            <a:buNone/>
           </a:pPr>
           <a:r>
-            <a:rPr lang="en-US" sz="1200" kern="1200" dirty="0" smtClean="0"/>
+            <a:rPr lang="en-US" sz="1200" kern="1200" dirty="0"/>
             <a:t>Software development model</a:t>
           </a:r>
-          <a:endParaRPr lang="en-US" sz="1200" kern="1200" dirty="0"/>
         </a:p>
       </dsp:txBody>
       <dsp:txXfrm>
@@ -1875,7 +1822,7 @@
         </a:bodyPr>
         <a:lstStyle/>
         <a:p>
-          <a:pPr lvl="0" algn="ctr" defTabSz="444500">
+          <a:pPr marL="0" lvl="0" indent="0" algn="ctr" defTabSz="444500">
             <a:lnSpc>
               <a:spcPct val="90000"/>
             </a:lnSpc>
@@ -1885,12 +1832,12 @@
             <a:spcAft>
               <a:spcPct val="35000"/>
             </a:spcAft>
+            <a:buNone/>
           </a:pPr>
           <a:r>
-            <a:rPr lang="en-US" sz="1000" kern="1200" dirty="0" smtClean="0"/>
+            <a:rPr lang="en-US" sz="1000" kern="1200" dirty="0"/>
             <a:t>Waterfall model</a:t>
           </a:r>
-          <a:endParaRPr lang="en-US" sz="1000" kern="1200" dirty="0"/>
         </a:p>
       </dsp:txBody>
       <dsp:txXfrm>
@@ -1953,7 +1900,7 @@
         </a:bodyPr>
         <a:lstStyle/>
         <a:p>
-          <a:pPr lvl="0" algn="ctr" defTabSz="444500">
+          <a:pPr marL="0" lvl="0" indent="0" algn="ctr" defTabSz="444500">
             <a:lnSpc>
               <a:spcPct val="90000"/>
             </a:lnSpc>
@@ -1963,12 +1910,12 @@
             <a:spcAft>
               <a:spcPct val="35000"/>
             </a:spcAft>
+            <a:buNone/>
           </a:pPr>
           <a:r>
-            <a:rPr lang="en-US" sz="1000" kern="1200" dirty="0" smtClean="0"/>
+            <a:rPr lang="en-US" sz="1000" kern="1200" dirty="0"/>
             <a:t>Iterative model</a:t>
           </a:r>
-          <a:endParaRPr lang="en-US" sz="1000" kern="1200" dirty="0"/>
         </a:p>
       </dsp:txBody>
       <dsp:txXfrm>
@@ -2031,7 +1978,7 @@
         </a:bodyPr>
         <a:lstStyle/>
         <a:p>
-          <a:pPr lvl="0" algn="ctr" defTabSz="444500">
+          <a:pPr marL="0" lvl="0" indent="0" algn="ctr" defTabSz="444500">
             <a:lnSpc>
               <a:spcPct val="90000"/>
             </a:lnSpc>
@@ -2041,16 +1988,12 @@
             <a:spcAft>
               <a:spcPct val="35000"/>
             </a:spcAft>
+            <a:buNone/>
           </a:pPr>
           <a:r>
-            <a:rPr lang="en-US" sz="1000" kern="1200" dirty="0" smtClean="0"/>
-            <a:t>Agile </a:t>
+            <a:rPr lang="en-US" sz="1000" kern="1200" dirty="0"/>
+            <a:t>Agile model</a:t>
           </a:r>
-          <a:r>
-            <a:rPr lang="en-US" sz="1000" kern="1200" dirty="0" smtClean="0"/>
-            <a:t>model</a:t>
-          </a:r>
-          <a:endParaRPr lang="en-US" sz="1000" kern="1200" dirty="0"/>
         </a:p>
       </dsp:txBody>
       <dsp:txXfrm>
@@ -2113,7 +2056,7 @@
         </a:bodyPr>
         <a:lstStyle/>
         <a:p>
-          <a:pPr lvl="0" algn="ctr" defTabSz="444500">
+          <a:pPr marL="0" lvl="0" indent="0" algn="ctr" defTabSz="444500">
             <a:lnSpc>
               <a:spcPct val="90000"/>
             </a:lnSpc>
@@ -2123,12 +2066,12 @@
             <a:spcAft>
               <a:spcPct val="35000"/>
             </a:spcAft>
+            <a:buNone/>
           </a:pPr>
           <a:r>
-            <a:rPr lang="en-US" sz="1000" kern="1200" dirty="0" smtClean="0"/>
+            <a:rPr lang="en-US" sz="1000" kern="1200" dirty="0"/>
             <a:t>RAD model</a:t>
           </a:r>
-          <a:endParaRPr lang="en-US" sz="1000" kern="1200" dirty="0"/>
         </a:p>
       </dsp:txBody>
       <dsp:txXfrm>
@@ -2191,7 +2134,7 @@
         </a:bodyPr>
         <a:lstStyle/>
         <a:p>
-          <a:pPr lvl="0" algn="ctr" defTabSz="444500">
+          <a:pPr marL="0" lvl="0" indent="0" algn="ctr" defTabSz="444500">
             <a:lnSpc>
               <a:spcPct val="90000"/>
             </a:lnSpc>
@@ -2201,12 +2144,12 @@
             <a:spcAft>
               <a:spcPct val="35000"/>
             </a:spcAft>
+            <a:buNone/>
           </a:pPr>
           <a:r>
-            <a:rPr lang="en-US" sz="1000" kern="1200" dirty="0" smtClean="0"/>
+            <a:rPr lang="en-US" sz="1000" kern="1200" dirty="0"/>
             <a:t>Incremental model</a:t>
           </a:r>
-          <a:endParaRPr lang="en-US" sz="1000" kern="1200" dirty="0"/>
         </a:p>
       </dsp:txBody>
       <dsp:txXfrm>
@@ -2269,7 +2212,7 @@
         </a:bodyPr>
         <a:lstStyle/>
         <a:p>
-          <a:pPr lvl="0" algn="ctr" defTabSz="444500">
+          <a:pPr marL="0" lvl="0" indent="0" algn="ctr" defTabSz="444500">
             <a:lnSpc>
               <a:spcPct val="90000"/>
             </a:lnSpc>
@@ -2279,12 +2222,12 @@
             <a:spcAft>
               <a:spcPct val="35000"/>
             </a:spcAft>
+            <a:buNone/>
           </a:pPr>
           <a:r>
-            <a:rPr lang="en-US" sz="1000" kern="1200" dirty="0" smtClean="0"/>
+            <a:rPr lang="en-US" sz="1000" kern="1200" dirty="0"/>
             <a:t>V model</a:t>
           </a:r>
-          <a:endParaRPr lang="en-US" sz="1000" kern="1200" dirty="0"/>
         </a:p>
       </dsp:txBody>
       <dsp:txXfrm>
@@ -2347,7 +2290,7 @@
         </a:bodyPr>
         <a:lstStyle/>
         <a:p>
-          <a:pPr lvl="0" algn="ctr" defTabSz="444500">
+          <a:pPr marL="0" lvl="0" indent="0" algn="ctr" defTabSz="444500">
             <a:lnSpc>
               <a:spcPct val="90000"/>
             </a:lnSpc>
@@ -2357,12 +2300,12 @@
             <a:spcAft>
               <a:spcPct val="35000"/>
             </a:spcAft>
+            <a:buNone/>
           </a:pPr>
           <a:r>
-            <a:rPr lang="en-US" sz="1000" kern="1200" dirty="0" smtClean="0"/>
+            <a:rPr lang="en-US" sz="1000" kern="1200" dirty="0"/>
             <a:t>Spiral model</a:t>
           </a:r>
-          <a:endParaRPr lang="en-US" sz="1000" kern="1200" dirty="0"/>
         </a:p>
       </dsp:txBody>
       <dsp:txXfrm>
@@ -3897,7 +3840,7 @@
           <a:p>
             <a:fld id="{70711676-1DE2-458B-90FC-D5D4D01EA265}" type="datetimeFigureOut">
               <a:rPr lang="en-US" smtClean="0"/>
-              <a:t>19|12|6</a:t>
+              <a:t>12/7/2019</a:t>
             </a:fld>
             <a:endParaRPr lang="en-US"/>
           </a:p>
@@ -3961,38 +3904,37 @@
           <a:p>
             <a:pPr lvl="0"/>
             <a:r>
-              <a:rPr lang="en-US" smtClean="0"/>
+              <a:rPr lang="en-US"/>
               <a:t>Click to edit Master text styles</a:t>
             </a:r>
           </a:p>
           <a:p>
             <a:pPr lvl="1"/>
             <a:r>
-              <a:rPr lang="en-US" smtClean="0"/>
+              <a:rPr lang="en-US"/>
               <a:t>Second level</a:t>
             </a:r>
           </a:p>
           <a:p>
             <a:pPr lvl="2"/>
             <a:r>
-              <a:rPr lang="en-US" smtClean="0"/>
+              <a:rPr lang="en-US"/>
               <a:t>Third level</a:t>
             </a:r>
           </a:p>
           <a:p>
             <a:pPr lvl="3"/>
             <a:r>
-              <a:rPr lang="en-US" smtClean="0"/>
+              <a:rPr lang="en-US"/>
               <a:t>Fourth level</a:t>
             </a:r>
           </a:p>
           <a:p>
             <a:pPr lvl="4"/>
             <a:r>
-              <a:rPr lang="en-US" smtClean="0"/>
+              <a:rPr lang="en-US"/>
               <a:t>Fifth level</a:t>
             </a:r>
-            <a:endParaRPr lang="en-US"/>
           </a:p>
         </p:txBody>
       </p:sp>
@@ -4210,10 +4152,9 @@
           <a:lstStyle/>
           <a:p>
             <a:r>
-              <a:rPr lang="en-US" dirty="0" smtClean="0"/>
+              <a:rPr lang="en-US" dirty="0"/>
               <a:t>START OF AASHISH! (RISE OF CONCEPT)</a:t>
             </a:r>
-            <a:endParaRPr lang="en-US" dirty="0"/>
           </a:p>
         </p:txBody>
       </p:sp>
@@ -4379,10 +4320,9 @@
           </a:lstStyle>
           <a:p>
             <a:r>
-              <a:rPr lang="en-US" smtClean="0"/>
+              <a:rPr lang="en-US"/>
               <a:t>Click to edit Master title style</a:t>
             </a:r>
-            <a:endParaRPr lang="en-US"/>
           </a:p>
         </p:txBody>
       </p:sp>
@@ -4444,10 +4384,9 @@
           </a:lstStyle>
           <a:p>
             <a:r>
-              <a:rPr lang="en-US" smtClean="0"/>
+              <a:rPr lang="en-US"/>
               <a:t>Click to edit Master subtitle style</a:t>
             </a:r>
-            <a:endParaRPr lang="en-US"/>
           </a:p>
         </p:txBody>
       </p:sp>
@@ -4468,7 +4407,7 @@
           <a:p>
             <a:fld id="{EF60C9F4-19BA-40F2-B011-90CF0A2B4916}" type="datetimeFigureOut">
               <a:rPr lang="en-US" smtClean="0"/>
-              <a:t>19|12|6</a:t>
+              <a:t>12/7/2019</a:t>
             </a:fld>
             <a:endParaRPr lang="en-US"/>
           </a:p>
@@ -4562,10 +4501,9 @@
           <a:lstStyle/>
           <a:p>
             <a:r>
-              <a:rPr lang="en-US" smtClean="0"/>
+              <a:rPr lang="en-US"/>
               <a:t>Click to edit Master title style</a:t>
             </a:r>
-            <a:endParaRPr lang="en-US"/>
           </a:p>
         </p:txBody>
       </p:sp>
@@ -4586,38 +4524,37 @@
           <a:p>
             <a:pPr lvl="0"/>
             <a:r>
-              <a:rPr lang="en-US" smtClean="0"/>
+              <a:rPr lang="en-US"/>
               <a:t>Click to edit Master text styles</a:t>
             </a:r>
           </a:p>
           <a:p>
             <a:pPr lvl="1"/>
             <a:r>
-              <a:rPr lang="en-US" smtClean="0"/>
+              <a:rPr lang="en-US"/>
               <a:t>Second level</a:t>
             </a:r>
           </a:p>
           <a:p>
             <a:pPr lvl="2"/>
             <a:r>
-              <a:rPr lang="en-US" smtClean="0"/>
+              <a:rPr lang="en-US"/>
               <a:t>Third level</a:t>
             </a:r>
           </a:p>
           <a:p>
             <a:pPr lvl="3"/>
             <a:r>
-              <a:rPr lang="en-US" smtClean="0"/>
+              <a:rPr lang="en-US"/>
               <a:t>Fourth level</a:t>
             </a:r>
           </a:p>
           <a:p>
             <a:pPr lvl="4"/>
             <a:r>
-              <a:rPr lang="en-US" smtClean="0"/>
+              <a:rPr lang="en-US"/>
               <a:t>Fifth level</a:t>
             </a:r>
-            <a:endParaRPr lang="en-US"/>
           </a:p>
         </p:txBody>
       </p:sp>
@@ -4638,7 +4575,7 @@
           <a:p>
             <a:fld id="{EF60C9F4-19BA-40F2-B011-90CF0A2B4916}" type="datetimeFigureOut">
               <a:rPr lang="en-US" smtClean="0"/>
-              <a:t>19|12|6</a:t>
+              <a:t>12/7/2019</a:t>
             </a:fld>
             <a:endParaRPr lang="en-US"/>
           </a:p>
@@ -4737,10 +4674,9 @@
           <a:lstStyle/>
           <a:p>
             <a:r>
-              <a:rPr lang="en-US" smtClean="0"/>
+              <a:rPr lang="en-US"/>
               <a:t>Click to edit Master title style</a:t>
             </a:r>
-            <a:endParaRPr lang="en-US"/>
           </a:p>
         </p:txBody>
       </p:sp>
@@ -4766,38 +4702,37 @@
           <a:p>
             <a:pPr lvl="0"/>
             <a:r>
-              <a:rPr lang="en-US" smtClean="0"/>
+              <a:rPr lang="en-US"/>
               <a:t>Click to edit Master text styles</a:t>
             </a:r>
           </a:p>
           <a:p>
             <a:pPr lvl="1"/>
             <a:r>
-              <a:rPr lang="en-US" smtClean="0"/>
+              <a:rPr lang="en-US"/>
               <a:t>Second level</a:t>
             </a:r>
           </a:p>
           <a:p>
             <a:pPr lvl="2"/>
             <a:r>
-              <a:rPr lang="en-US" smtClean="0"/>
+              <a:rPr lang="en-US"/>
               <a:t>Third level</a:t>
             </a:r>
           </a:p>
           <a:p>
             <a:pPr lvl="3"/>
             <a:r>
-              <a:rPr lang="en-US" smtClean="0"/>
+              <a:rPr lang="en-US"/>
               <a:t>Fourth level</a:t>
             </a:r>
           </a:p>
           <a:p>
             <a:pPr lvl="4"/>
             <a:r>
-              <a:rPr lang="en-US" smtClean="0"/>
+              <a:rPr lang="en-US"/>
               <a:t>Fifth level</a:t>
             </a:r>
-            <a:endParaRPr lang="en-US"/>
           </a:p>
         </p:txBody>
       </p:sp>
@@ -4818,7 +4753,7 @@
           <a:p>
             <a:fld id="{EF60C9F4-19BA-40F2-B011-90CF0A2B4916}" type="datetimeFigureOut">
               <a:rPr lang="en-US" smtClean="0"/>
-              <a:t>19|12|6</a:t>
+              <a:t>12/7/2019</a:t>
             </a:fld>
             <a:endParaRPr lang="en-US"/>
           </a:p>
@@ -4912,10 +4847,9 @@
           <a:lstStyle/>
           <a:p>
             <a:r>
-              <a:rPr lang="en-US" smtClean="0"/>
+              <a:rPr lang="en-US"/>
               <a:t>Click to edit Master title style</a:t>
             </a:r>
-            <a:endParaRPr lang="en-US"/>
           </a:p>
         </p:txBody>
       </p:sp>
@@ -4936,38 +4870,37 @@
           <a:p>
             <a:pPr lvl="0"/>
             <a:r>
-              <a:rPr lang="en-US" smtClean="0"/>
+              <a:rPr lang="en-US"/>
               <a:t>Click to edit Master text styles</a:t>
             </a:r>
           </a:p>
           <a:p>
             <a:pPr lvl="1"/>
             <a:r>
-              <a:rPr lang="en-US" smtClean="0"/>
+              <a:rPr lang="en-US"/>
               <a:t>Second level</a:t>
             </a:r>
           </a:p>
           <a:p>
             <a:pPr lvl="2"/>
             <a:r>
-              <a:rPr lang="en-US" smtClean="0"/>
+              <a:rPr lang="en-US"/>
               <a:t>Third level</a:t>
             </a:r>
           </a:p>
           <a:p>
             <a:pPr lvl="3"/>
             <a:r>
-              <a:rPr lang="en-US" smtClean="0"/>
+              <a:rPr lang="en-US"/>
               <a:t>Fourth level</a:t>
             </a:r>
           </a:p>
           <a:p>
             <a:pPr lvl="4"/>
             <a:r>
-              <a:rPr lang="en-US" smtClean="0"/>
+              <a:rPr lang="en-US"/>
               <a:t>Fifth level</a:t>
             </a:r>
-            <a:endParaRPr lang="en-US"/>
           </a:p>
         </p:txBody>
       </p:sp>
@@ -4988,7 +4921,7 @@
           <a:p>
             <a:fld id="{EF60C9F4-19BA-40F2-B011-90CF0A2B4916}" type="datetimeFigureOut">
               <a:rPr lang="en-US" smtClean="0"/>
-              <a:t>19|12|6</a:t>
+              <a:t>12/7/2019</a:t>
             </a:fld>
             <a:endParaRPr lang="en-US"/>
           </a:p>
@@ -5091,10 +5024,9 @@
           </a:lstStyle>
           <a:p>
             <a:r>
-              <a:rPr lang="en-US" smtClean="0"/>
+              <a:rPr lang="en-US"/>
               <a:t>Click to edit Master title style</a:t>
             </a:r>
-            <a:endParaRPr lang="en-US"/>
           </a:p>
         </p:txBody>
       </p:sp>
@@ -5211,7 +5143,7 @@
           <a:p>
             <a:pPr lvl="0"/>
             <a:r>
-              <a:rPr lang="en-US" smtClean="0"/>
+              <a:rPr lang="en-US"/>
               <a:t>Click to edit Master text styles</a:t>
             </a:r>
           </a:p>
@@ -5234,7 +5166,7 @@
           <a:p>
             <a:fld id="{EF60C9F4-19BA-40F2-B011-90CF0A2B4916}" type="datetimeFigureOut">
               <a:rPr lang="en-US" smtClean="0"/>
-              <a:t>19|12|6</a:t>
+              <a:t>12/7/2019</a:t>
             </a:fld>
             <a:endParaRPr lang="en-US"/>
           </a:p>
@@ -5328,10 +5260,9 @@
           <a:lstStyle/>
           <a:p>
             <a:r>
-              <a:rPr lang="en-US" smtClean="0"/>
+              <a:rPr lang="en-US"/>
               <a:t>Click to edit Master title style</a:t>
             </a:r>
-            <a:endParaRPr lang="en-US"/>
           </a:p>
         </p:txBody>
       </p:sp>
@@ -5357,38 +5288,37 @@
           <a:p>
             <a:pPr lvl="0"/>
             <a:r>
-              <a:rPr lang="en-US" smtClean="0"/>
+              <a:rPr lang="en-US"/>
               <a:t>Click to edit Master text styles</a:t>
             </a:r>
           </a:p>
           <a:p>
             <a:pPr lvl="1"/>
             <a:r>
-              <a:rPr lang="en-US" smtClean="0"/>
+              <a:rPr lang="en-US"/>
               <a:t>Second level</a:t>
             </a:r>
           </a:p>
           <a:p>
             <a:pPr lvl="2"/>
             <a:r>
-              <a:rPr lang="en-US" smtClean="0"/>
+              <a:rPr lang="en-US"/>
               <a:t>Third level</a:t>
             </a:r>
           </a:p>
           <a:p>
             <a:pPr lvl="3"/>
             <a:r>
-              <a:rPr lang="en-US" smtClean="0"/>
+              <a:rPr lang="en-US"/>
               <a:t>Fourth level</a:t>
             </a:r>
           </a:p>
           <a:p>
             <a:pPr lvl="4"/>
             <a:r>
-              <a:rPr lang="en-US" smtClean="0"/>
+              <a:rPr lang="en-US"/>
               <a:t>Fifth level</a:t>
             </a:r>
-            <a:endParaRPr lang="en-US"/>
           </a:p>
         </p:txBody>
       </p:sp>
@@ -5414,38 +5344,37 @@
           <a:p>
             <a:pPr lvl="0"/>
             <a:r>
-              <a:rPr lang="en-US" smtClean="0"/>
+              <a:rPr lang="en-US"/>
               <a:t>Click to edit Master text styles</a:t>
             </a:r>
           </a:p>
           <a:p>
             <a:pPr lvl="1"/>
             <a:r>
-              <a:rPr lang="en-US" smtClean="0"/>
+              <a:rPr lang="en-US"/>
               <a:t>Second level</a:t>
             </a:r>
           </a:p>
           <a:p>
             <a:pPr lvl="2"/>
             <a:r>
-              <a:rPr lang="en-US" smtClean="0"/>
+              <a:rPr lang="en-US"/>
               <a:t>Third level</a:t>
             </a:r>
           </a:p>
           <a:p>
             <a:pPr lvl="3"/>
             <a:r>
-              <a:rPr lang="en-US" smtClean="0"/>
+              <a:rPr lang="en-US"/>
               <a:t>Fourth level</a:t>
             </a:r>
           </a:p>
           <a:p>
             <a:pPr lvl="4"/>
             <a:r>
-              <a:rPr lang="en-US" smtClean="0"/>
+              <a:rPr lang="en-US"/>
               <a:t>Fifth level</a:t>
             </a:r>
-            <a:endParaRPr lang="en-US"/>
           </a:p>
         </p:txBody>
       </p:sp>
@@ -5466,7 +5395,7 @@
           <a:p>
             <a:fld id="{EF60C9F4-19BA-40F2-B011-90CF0A2B4916}" type="datetimeFigureOut">
               <a:rPr lang="en-US" smtClean="0"/>
-              <a:t>19|12|6</a:t>
+              <a:t>12/7/2019</a:t>
             </a:fld>
             <a:endParaRPr lang="en-US"/>
           </a:p>
@@ -5565,10 +5494,9 @@
           <a:lstStyle/>
           <a:p>
             <a:r>
-              <a:rPr lang="en-US" smtClean="0"/>
+              <a:rPr lang="en-US"/>
               <a:t>Click to edit Master title style</a:t>
             </a:r>
-            <a:endParaRPr lang="en-US"/>
           </a:p>
         </p:txBody>
       </p:sp>
@@ -5631,7 +5559,7 @@
           <a:p>
             <a:pPr lvl="0"/>
             <a:r>
-              <a:rPr lang="en-US" smtClean="0"/>
+              <a:rPr lang="en-US"/>
               <a:t>Click to edit Master text styles</a:t>
             </a:r>
           </a:p>
@@ -5659,38 +5587,37 @@
           <a:p>
             <a:pPr lvl="0"/>
             <a:r>
-              <a:rPr lang="en-US" smtClean="0"/>
+              <a:rPr lang="en-US"/>
               <a:t>Click to edit Master text styles</a:t>
             </a:r>
           </a:p>
           <a:p>
             <a:pPr lvl="1"/>
             <a:r>
-              <a:rPr lang="en-US" smtClean="0"/>
+              <a:rPr lang="en-US"/>
               <a:t>Second level</a:t>
             </a:r>
           </a:p>
           <a:p>
             <a:pPr lvl="2"/>
             <a:r>
-              <a:rPr lang="en-US" smtClean="0"/>
+              <a:rPr lang="en-US"/>
               <a:t>Third level</a:t>
             </a:r>
           </a:p>
           <a:p>
             <a:pPr lvl="3"/>
             <a:r>
-              <a:rPr lang="en-US" smtClean="0"/>
+              <a:rPr lang="en-US"/>
               <a:t>Fourth level</a:t>
             </a:r>
           </a:p>
           <a:p>
             <a:pPr lvl="4"/>
             <a:r>
-              <a:rPr lang="en-US" smtClean="0"/>
+              <a:rPr lang="en-US"/>
               <a:t>Fifth level</a:t>
             </a:r>
-            <a:endParaRPr lang="en-US"/>
           </a:p>
         </p:txBody>
       </p:sp>
@@ -5753,7 +5680,7 @@
           <a:p>
             <a:pPr lvl="0"/>
             <a:r>
-              <a:rPr lang="en-US" smtClean="0"/>
+              <a:rPr lang="en-US"/>
               <a:t>Click to edit Master text styles</a:t>
             </a:r>
           </a:p>
@@ -5781,38 +5708,37 @@
           <a:p>
             <a:pPr lvl="0"/>
             <a:r>
-              <a:rPr lang="en-US" smtClean="0"/>
+              <a:rPr lang="en-US"/>
               <a:t>Click to edit Master text styles</a:t>
             </a:r>
           </a:p>
           <a:p>
             <a:pPr lvl="1"/>
             <a:r>
-              <a:rPr lang="en-US" smtClean="0"/>
+              <a:rPr lang="en-US"/>
               <a:t>Second level</a:t>
             </a:r>
           </a:p>
           <a:p>
             <a:pPr lvl="2"/>
             <a:r>
-              <a:rPr lang="en-US" smtClean="0"/>
+              <a:rPr lang="en-US"/>
               <a:t>Third level</a:t>
             </a:r>
           </a:p>
           <a:p>
             <a:pPr lvl="3"/>
             <a:r>
-              <a:rPr lang="en-US" smtClean="0"/>
+              <a:rPr lang="en-US"/>
               <a:t>Fourth level</a:t>
             </a:r>
           </a:p>
           <a:p>
             <a:pPr lvl="4"/>
             <a:r>
-              <a:rPr lang="en-US" smtClean="0"/>
+              <a:rPr lang="en-US"/>
               <a:t>Fifth level</a:t>
             </a:r>
-            <a:endParaRPr lang="en-US"/>
           </a:p>
         </p:txBody>
       </p:sp>
@@ -5833,7 +5759,7 @@
           <a:p>
             <a:fld id="{EF60C9F4-19BA-40F2-B011-90CF0A2B4916}" type="datetimeFigureOut">
               <a:rPr lang="en-US" smtClean="0"/>
-              <a:t>19|12|6</a:t>
+              <a:t>12/7/2019</a:t>
             </a:fld>
             <a:endParaRPr lang="en-US"/>
           </a:p>
@@ -5927,10 +5853,9 @@
           <a:lstStyle/>
           <a:p>
             <a:r>
-              <a:rPr lang="en-US" smtClean="0"/>
+              <a:rPr lang="en-US"/>
               <a:t>Click to edit Master title style</a:t>
             </a:r>
-            <a:endParaRPr lang="en-US"/>
           </a:p>
         </p:txBody>
       </p:sp>
@@ -5951,7 +5876,7 @@
           <a:p>
             <a:fld id="{EF60C9F4-19BA-40F2-B011-90CF0A2B4916}" type="datetimeFigureOut">
               <a:rPr lang="en-US" smtClean="0"/>
-              <a:t>19|12|6</a:t>
+              <a:t>12/7/2019</a:t>
             </a:fld>
             <a:endParaRPr lang="en-US"/>
           </a:p>
@@ -6046,7 +5971,7 @@
           <a:p>
             <a:fld id="{EF60C9F4-19BA-40F2-B011-90CF0A2B4916}" type="datetimeFigureOut">
               <a:rPr lang="en-US" smtClean="0"/>
-              <a:t>19|12|6</a:t>
+              <a:t>12/7/2019</a:t>
             </a:fld>
             <a:endParaRPr lang="en-US"/>
           </a:p>
@@ -6149,10 +6074,9 @@
           </a:lstStyle>
           <a:p>
             <a:r>
-              <a:rPr lang="en-US" smtClean="0"/>
+              <a:rPr lang="en-US"/>
               <a:t>Click to edit Master title style</a:t>
             </a:r>
-            <a:endParaRPr lang="en-US"/>
           </a:p>
         </p:txBody>
       </p:sp>
@@ -6206,38 +6130,37 @@
           <a:p>
             <a:pPr lvl="0"/>
             <a:r>
-              <a:rPr lang="en-US" smtClean="0"/>
+              <a:rPr lang="en-US"/>
               <a:t>Click to edit Master text styles</a:t>
             </a:r>
           </a:p>
           <a:p>
             <a:pPr lvl="1"/>
             <a:r>
-              <a:rPr lang="en-US" smtClean="0"/>
+              <a:rPr lang="en-US"/>
               <a:t>Second level</a:t>
             </a:r>
           </a:p>
           <a:p>
             <a:pPr lvl="2"/>
             <a:r>
-              <a:rPr lang="en-US" smtClean="0"/>
+              <a:rPr lang="en-US"/>
               <a:t>Third level</a:t>
             </a:r>
           </a:p>
           <a:p>
             <a:pPr lvl="3"/>
             <a:r>
-              <a:rPr lang="en-US" smtClean="0"/>
+              <a:rPr lang="en-US"/>
               <a:t>Fourth level</a:t>
             </a:r>
           </a:p>
           <a:p>
             <a:pPr lvl="4"/>
             <a:r>
-              <a:rPr lang="en-US" smtClean="0"/>
+              <a:rPr lang="en-US"/>
               <a:t>Fifth level</a:t>
             </a:r>
-            <a:endParaRPr lang="en-US"/>
           </a:p>
         </p:txBody>
       </p:sp>
@@ -6300,7 +6223,7 @@
           <a:p>
             <a:pPr lvl="0"/>
             <a:r>
-              <a:rPr lang="en-US" smtClean="0"/>
+              <a:rPr lang="en-US"/>
               <a:t>Click to edit Master text styles</a:t>
             </a:r>
           </a:p>
@@ -6323,7 +6246,7 @@
           <a:p>
             <a:fld id="{EF60C9F4-19BA-40F2-B011-90CF0A2B4916}" type="datetimeFigureOut">
               <a:rPr lang="en-US" smtClean="0"/>
-              <a:t>19|12|6</a:t>
+              <a:t>12/7/2019</a:t>
             </a:fld>
             <a:endParaRPr lang="en-US"/>
           </a:p>
@@ -6426,10 +6349,9 @@
           </a:lstStyle>
           <a:p>
             <a:r>
-              <a:rPr lang="en-US" smtClean="0"/>
+              <a:rPr lang="en-US"/>
               <a:t>Click to edit Master title style</a:t>
             </a:r>
-            <a:endParaRPr lang="en-US"/>
           </a:p>
         </p:txBody>
       </p:sp>
@@ -6553,7 +6475,7 @@
           <a:p>
             <a:pPr lvl="0"/>
             <a:r>
-              <a:rPr lang="en-US" smtClean="0"/>
+              <a:rPr lang="en-US"/>
               <a:t>Click to edit Master text styles</a:t>
             </a:r>
           </a:p>
@@ -6576,7 +6498,7 @@
           <a:p>
             <a:fld id="{EF60C9F4-19BA-40F2-B011-90CF0A2B4916}" type="datetimeFigureOut">
               <a:rPr lang="en-US" smtClean="0"/>
-              <a:t>19|12|6</a:t>
+              <a:t>12/7/2019</a:t>
             </a:fld>
             <a:endParaRPr lang="en-US"/>
           </a:p>
@@ -6685,10 +6607,9 @@
           <a:lstStyle/>
           <a:p>
             <a:r>
-              <a:rPr lang="en-US" smtClean="0"/>
+              <a:rPr lang="en-US"/>
               <a:t>Click to edit Master title style</a:t>
             </a:r>
-            <a:endParaRPr lang="en-US"/>
           </a:p>
         </p:txBody>
       </p:sp>
@@ -6719,38 +6640,37 @@
           <a:p>
             <a:pPr lvl="0"/>
             <a:r>
-              <a:rPr lang="en-US" smtClean="0"/>
+              <a:rPr lang="en-US"/>
               <a:t>Click to edit Master text styles</a:t>
             </a:r>
           </a:p>
           <a:p>
             <a:pPr lvl="1"/>
             <a:r>
-              <a:rPr lang="en-US" smtClean="0"/>
+              <a:rPr lang="en-US"/>
               <a:t>Second level</a:t>
             </a:r>
           </a:p>
           <a:p>
             <a:pPr lvl="2"/>
             <a:r>
-              <a:rPr lang="en-US" smtClean="0"/>
+              <a:rPr lang="en-US"/>
               <a:t>Third level</a:t>
             </a:r>
           </a:p>
           <a:p>
             <a:pPr lvl="3"/>
             <a:r>
-              <a:rPr lang="en-US" smtClean="0"/>
+              <a:rPr lang="en-US"/>
               <a:t>Fourth level</a:t>
             </a:r>
           </a:p>
           <a:p>
             <a:pPr lvl="4"/>
             <a:r>
-              <a:rPr lang="en-US" smtClean="0"/>
+              <a:rPr lang="en-US"/>
               <a:t>Fifth level</a:t>
             </a:r>
-            <a:endParaRPr lang="en-US"/>
           </a:p>
         </p:txBody>
       </p:sp>
@@ -6789,7 +6709,7 @@
           <a:p>
             <a:fld id="{EF60C9F4-19BA-40F2-B011-90CF0A2B4916}" type="datetimeFigureOut">
               <a:rPr lang="en-US" smtClean="0"/>
-              <a:t>19|12|6</a:t>
+              <a:t>12/7/2019</a:t>
             </a:fld>
             <a:endParaRPr lang="en-US"/>
           </a:p>
@@ -7230,10 +7150,9 @@
           <a:lstStyle/>
           <a:p>
             <a:r>
-              <a:rPr lang="en-US" dirty="0" smtClean="0"/>
+              <a:rPr lang="en-US" dirty="0"/>
               <a:t>	Extreme Programming</a:t>
             </a:r>
-            <a:endParaRPr lang="en-US" dirty="0"/>
           </a:p>
         </p:txBody>
       </p:sp>
@@ -7263,7 +7182,7 @@
           <a:lstStyle/>
           <a:p>
             <a:r>
-              <a:rPr lang="en-US" dirty="0" smtClean="0">
+              <a:rPr lang="en-US" dirty="0">
                 <a:solidFill>
                   <a:schemeClr val="bg1"/>
                 </a:solidFill>
@@ -7277,7 +7196,7 @@
               <a:buChar char="-"/>
             </a:pPr>
             <a:r>
-              <a:rPr lang="en-US" dirty="0" smtClean="0">
+              <a:rPr lang="en-US" dirty="0">
                 <a:solidFill>
                   <a:schemeClr val="bg1"/>
                 </a:solidFill>
@@ -7291,7 +7210,7 @@
               <a:buChar char="-"/>
             </a:pPr>
             <a:r>
-              <a:rPr lang="en-US" dirty="0" err="1" smtClean="0">
+              <a:rPr lang="en-US" dirty="0" err="1">
                 <a:solidFill>
                   <a:schemeClr val="bg1"/>
                 </a:solidFill>
@@ -7299,7 +7218,7 @@
               <a:t>Asim</a:t>
             </a:r>
             <a:r>
-              <a:rPr lang="en-US" dirty="0" smtClean="0">
+              <a:rPr lang="en-US" dirty="0">
                 <a:solidFill>
                   <a:schemeClr val="bg1"/>
                 </a:solidFill>
@@ -7307,14 +7226,14 @@
               <a:t> </a:t>
             </a:r>
             <a:r>
-              <a:rPr lang="en-US" dirty="0" err="1" smtClean="0">
+              <a:rPr lang="en-US" dirty="0" err="1">
                 <a:solidFill>
                   <a:schemeClr val="bg1"/>
                 </a:solidFill>
               </a:rPr>
               <a:t>Aryal</a:t>
             </a:r>
-            <a:endParaRPr lang="en-US" dirty="0" smtClean="0">
+            <a:endParaRPr lang="en-US" dirty="0">
               <a:solidFill>
                 <a:schemeClr val="bg1"/>
               </a:solidFill>
@@ -7326,7 +7245,7 @@
               <a:buChar char="-"/>
             </a:pPr>
             <a:r>
-              <a:rPr lang="en-US" dirty="0" err="1" smtClean="0">
+              <a:rPr lang="en-US" dirty="0" err="1">
                 <a:solidFill>
                   <a:schemeClr val="bg1"/>
                 </a:solidFill>
@@ -7334,7 +7253,7 @@
               <a:t>Niroj</a:t>
             </a:r>
             <a:r>
-              <a:rPr lang="en-US" dirty="0" smtClean="0">
+              <a:rPr lang="en-US" dirty="0">
                 <a:solidFill>
                   <a:schemeClr val="bg1"/>
                 </a:solidFill>
@@ -7342,14 +7261,14 @@
               <a:t> </a:t>
             </a:r>
             <a:r>
-              <a:rPr lang="en-US" dirty="0" err="1" smtClean="0">
+              <a:rPr lang="en-US" dirty="0" err="1">
                 <a:solidFill>
                   <a:schemeClr val="bg1"/>
                 </a:solidFill>
               </a:rPr>
               <a:t>Bajracharya</a:t>
             </a:r>
-            <a:endParaRPr lang="en-US" dirty="0" smtClean="0">
+            <a:endParaRPr lang="en-US" dirty="0">
               <a:solidFill>
                 <a:schemeClr val="bg1"/>
               </a:solidFill>
@@ -7361,7 +7280,7 @@
               <a:buChar char="-"/>
             </a:pPr>
             <a:r>
-              <a:rPr lang="en-US" dirty="0" err="1" smtClean="0">
+              <a:rPr lang="en-US" dirty="0" err="1">
                 <a:solidFill>
                   <a:schemeClr val="bg1"/>
                 </a:solidFill>
@@ -7369,7 +7288,7 @@
               <a:t>Sudip</a:t>
             </a:r>
             <a:r>
-              <a:rPr lang="en-US" dirty="0" smtClean="0">
+              <a:rPr lang="en-US" dirty="0">
                 <a:solidFill>
                   <a:schemeClr val="bg1"/>
                 </a:solidFill>
@@ -7377,14 +7296,14 @@
               <a:t> </a:t>
             </a:r>
             <a:r>
-              <a:rPr lang="en-US" dirty="0" err="1" smtClean="0">
+              <a:rPr lang="en-US" dirty="0" err="1">
                 <a:solidFill>
                   <a:schemeClr val="bg1"/>
                 </a:solidFill>
               </a:rPr>
               <a:t>Gyawali</a:t>
             </a:r>
-            <a:endParaRPr lang="en-US" dirty="0" smtClean="0">
+            <a:endParaRPr lang="en-US" dirty="0">
               <a:solidFill>
                 <a:schemeClr val="bg1"/>
               </a:solidFill>
@@ -7409,13 +7328,6 @@
   <p:clrMapOvr>
     <a:masterClrMapping/>
   </p:clrMapOvr>
-  <p:timing>
-    <p:tnLst>
-      <p:par>
-        <p:cTn id="1" dur="indefinite" restart="never" nodeType="tmRoot"/>
-      </p:par>
-    </p:tnLst>
-  </p:timing>
 </p:sld>
 </file>
 
@@ -7452,10 +7364,9 @@
           <a:lstStyle/>
           <a:p>
             <a:r>
-              <a:rPr lang="en-US" dirty="0" smtClean="0"/>
+              <a:rPr lang="en-US" dirty="0"/>
               <a:t>Rise of Extreme Programming</a:t>
             </a:r>
-            <a:endParaRPr lang="en-US" dirty="0"/>
           </a:p>
         </p:txBody>
       </p:sp>
@@ -7480,10 +7391,9 @@
           <a:lstStyle/>
           <a:p>
             <a:r>
-              <a:rPr lang="en-US" dirty="0" smtClean="0"/>
+              <a:rPr lang="en-US" dirty="0"/>
               <a:t>In 1990s, Object Oriented Programming replaced procedural programming.</a:t>
             </a:r>
-            <a:endParaRPr lang="en-US" dirty="0"/>
           </a:p>
         </p:txBody>
       </p:sp>
@@ -7638,10 +7548,9 @@
           <a:lstStyle/>
           <a:p>
             <a:r>
-              <a:rPr lang="en-US" dirty="0" smtClean="0"/>
+              <a:rPr lang="en-US" dirty="0"/>
               <a:t>Rise of Extreme Programming</a:t>
             </a:r>
-            <a:endParaRPr lang="en-US" dirty="0"/>
           </a:p>
         </p:txBody>
       </p:sp>
@@ -7666,10 +7575,9 @@
           <a:lstStyle/>
           <a:p>
             <a:r>
-              <a:rPr lang="en-US" dirty="0" smtClean="0"/>
+              <a:rPr lang="en-US" dirty="0"/>
               <a:t>Internet changed the business requirement to rapidly changing.</a:t>
             </a:r>
-            <a:endParaRPr lang="en-US" dirty="0"/>
           </a:p>
         </p:txBody>
       </p:sp>
@@ -7724,10 +7632,9 @@
             <a:p>
               <a:pPr algn="ctr"/>
               <a:r>
-                <a:rPr lang="en-US" dirty="0" smtClean="0"/>
+                <a:rPr lang="en-US" dirty="0"/>
                 <a:t>Dot Com Bubble</a:t>
               </a:r>
-              <a:endParaRPr lang="en-US" dirty="0"/>
             </a:p>
           </p:txBody>
         </p:sp>
@@ -7787,7 +7694,7 @@
             <a:lstStyle/>
             <a:p>
               <a:r>
-                <a:rPr lang="en-US" sz="2800" dirty="0" smtClean="0"/>
+                <a:rPr lang="en-US" sz="2800" dirty="0"/>
                 <a:t>↑ Internet rose</a:t>
               </a:r>
               <a:endParaRPr lang="en-US" dirty="0"/>
@@ -7850,21 +7757,16 @@
             <a:lstStyle/>
             <a:p>
               <a:r>
-                <a:rPr lang="en-US" dirty="0" smtClean="0"/>
+                <a:rPr lang="en-US" dirty="0"/>
                 <a:t>Development</a:t>
               </a:r>
             </a:p>
             <a:p>
               <a:pPr algn="ctr"/>
               <a:r>
-                <a:rPr lang="en-US" dirty="0" smtClean="0"/>
-                <a:t>Time </a:t>
+                <a:rPr lang="en-US" dirty="0"/>
+                <a:t>Time ↓</a:t>
               </a:r>
-              <a:r>
-                <a:rPr lang="en-US" dirty="0"/>
-                <a:t>↓</a:t>
-              </a:r>
-              <a:endParaRPr lang="en-US" dirty="0"/>
             </a:p>
           </p:txBody>
         </p:sp>
@@ -7893,7 +7795,7 @@
           <a:p>
             <a:pPr algn="ctr"/>
             <a:r>
-              <a:rPr lang="en-US" sz="8000" b="1" cap="none" spc="0" dirty="0" smtClean="0">
+              <a:rPr lang="en-US" sz="8000" b="1" cap="none" spc="0" dirty="0">
                 <a:ln w="10160">
                   <a:solidFill>
                     <a:schemeClr val="accent5"/>
@@ -7913,24 +7815,6 @@
               </a:rPr>
               <a:t>KENT BECK</a:t>
             </a:r>
-            <a:endParaRPr lang="en-US" sz="8000" b="1" cap="none" spc="0" dirty="0">
-              <a:ln w="10160">
-                <a:solidFill>
-                  <a:schemeClr val="accent5"/>
-                </a:solidFill>
-                <a:prstDash val="solid"/>
-              </a:ln>
-              <a:solidFill>
-                <a:srgbClr val="FFFFFF"/>
-              </a:solidFill>
-              <a:effectLst>
-                <a:outerShdw blurRad="38100" dist="22860" dir="5400000" algn="tl" rotWithShape="0">
-                  <a:srgbClr val="000000">
-                    <a:alpha val="30000"/>
-                  </a:srgbClr>
-                </a:outerShdw>
-              </a:effectLst>
-            </a:endParaRPr>
           </a:p>
         </p:txBody>
       </p:sp>
@@ -8268,14 +8152,13 @@
           <a:lstStyle/>
           <a:p>
             <a:r>
-              <a:rPr lang="en-US" dirty="0" smtClean="0"/>
+              <a:rPr lang="en-US" dirty="0"/>
               <a:t>Extreme Programming (XP) - </a:t>
             </a:r>
             <a:r>
-              <a:rPr lang="en-US" b="1" dirty="0" smtClean="0"/>
+              <a:rPr lang="en-US" b="1" dirty="0"/>
               <a:t>Introduction</a:t>
             </a:r>
-            <a:endParaRPr lang="en-US" b="1" dirty="0"/>
           </a:p>
         </p:txBody>
       </p:sp>
@@ -8479,10 +8362,9 @@
                 </a:spcAft>
               </a:pPr>
               <a:r>
-                <a:rPr lang="en-US" sz="3000" kern="1200" dirty="0" smtClean="0"/>
+                <a:rPr lang="en-US" sz="3000" kern="1200" dirty="0"/>
                 <a:t>Agile model</a:t>
               </a:r>
-              <a:endParaRPr lang="en-US" sz="3000" kern="1200" dirty="0"/>
             </a:p>
           </p:txBody>
         </p:sp>
@@ -8598,10 +8480,9 @@
             <a:p>
               <a:pPr algn="ctr"/>
               <a:r>
-                <a:rPr lang="en-US" dirty="0" smtClean="0"/>
+                <a:rPr lang="en-US" dirty="0"/>
                 <a:t>XP</a:t>
               </a:r>
-              <a:endParaRPr lang="en-US" dirty="0"/>
             </a:p>
           </p:txBody>
         </p:sp>
@@ -8726,10 +8607,9 @@
                 </a:spcAft>
               </a:pPr>
               <a:r>
-                <a:rPr lang="en-US" sz="1400" b="1" kern="1200" dirty="0" smtClean="0"/>
+                <a:rPr lang="en-US" sz="1400" b="1" kern="1200" dirty="0"/>
                 <a:t>Extreme Programming</a:t>
               </a:r>
-              <a:endParaRPr lang="en-US" sz="1400" b="1" kern="1200" dirty="0"/>
             </a:p>
           </p:txBody>
         </p:sp>
@@ -8796,10 +8676,9 @@
             <a:p>
               <a:pPr algn="ctr"/>
               <a:r>
-                <a:rPr lang="en-US" dirty="0" smtClean="0"/>
+                <a:rPr lang="en-US" dirty="0"/>
                 <a:t>FDD</a:t>
               </a:r>
-              <a:endParaRPr lang="en-US" dirty="0"/>
             </a:p>
           </p:txBody>
         </p:sp>
@@ -8924,10 +8803,9 @@
                 </a:spcAft>
               </a:pPr>
               <a:r>
-                <a:rPr lang="en-US" sz="1400" kern="1200" dirty="0" smtClean="0"/>
+                <a:rPr lang="en-US" sz="1400" kern="1200" dirty="0"/>
                 <a:t>Feature Driven Development</a:t>
               </a:r>
-              <a:endParaRPr lang="en-US" sz="1400" kern="1200" dirty="0"/>
             </a:p>
           </p:txBody>
         </p:sp>
@@ -8994,10 +8872,9 @@
             <a:p>
               <a:pPr algn="ctr"/>
               <a:r>
-                <a:rPr lang="en-US" dirty="0" smtClean="0"/>
+                <a:rPr lang="en-US" dirty="0"/>
                 <a:t>ASD</a:t>
               </a:r>
-              <a:endParaRPr lang="en-US" dirty="0"/>
             </a:p>
           </p:txBody>
         </p:sp>
@@ -9122,10 +8999,9 @@
                 </a:spcAft>
               </a:pPr>
               <a:r>
-                <a:rPr lang="en-US" sz="1400" kern="1200" dirty="0" smtClean="0"/>
+                <a:rPr lang="en-US" sz="1400" kern="1200" dirty="0"/>
                 <a:t>Adaptive Software Development</a:t>
               </a:r>
-              <a:endParaRPr lang="en-US" sz="1400" kern="1200" dirty="0"/>
             </a:p>
           </p:txBody>
         </p:sp>
@@ -9900,14 +9776,13 @@
           <a:lstStyle/>
           <a:p>
             <a:r>
-              <a:rPr lang="en-US" dirty="0" smtClean="0"/>
+              <a:rPr lang="en-US" dirty="0"/>
               <a:t>Extreme Programming (XP) - </a:t>
             </a:r>
             <a:r>
-              <a:rPr lang="en-US" b="1" dirty="0" smtClean="0"/>
+              <a:rPr lang="en-US" b="1" dirty="0"/>
               <a:t>Introduction</a:t>
             </a:r>
-            <a:endParaRPr lang="en-US" b="1" dirty="0"/>
           </a:p>
         </p:txBody>
       </p:sp>
@@ -9918,9 +9793,9 @@
           <p:nvPr/>
         </p:nvSpPr>
         <p:spPr>
-          <a:xfrm>
-            <a:off x="577755" y="1577285"/>
-            <a:ext cx="11379784" cy="369332"/>
+          <a:xfrm rot="10800000" flipV="1">
+            <a:off x="1533004" y="3293655"/>
+            <a:ext cx="10764771" cy="521046"/>
           </a:xfrm>
           <a:prstGeom prst="rect">
             <a:avLst/>
@@ -9937,6 +9812,70 @@
               <a:buChar char="•"/>
             </a:pPr>
             <a:endParaRPr lang="en-US" dirty="0"/>
+          </a:p>
+        </p:txBody>
+      </p:sp>
+      <p:sp>
+        <p:nvSpPr>
+          <p:cNvPr id="5" name="TextBox 4">
+            <a:extLst>
+              <a:ext uri="{FF2B5EF4-FFF2-40B4-BE49-F238E27FC236}">
+                <a16:creationId xmlns:a16="http://schemas.microsoft.com/office/drawing/2014/main" id="{845BC587-C97E-5C40-ADA8-4F2558DF8CD7}"/>
+              </a:ext>
+            </a:extLst>
+          </p:cNvPr>
+          <p:cNvSpPr txBox="1"/>
+          <p:nvPr/>
+        </p:nvSpPr>
+        <p:spPr>
+          <a:xfrm>
+            <a:off x="352418" y="1541349"/>
+            <a:ext cx="12150988" cy="2677656"/>
+          </a:xfrm>
+          <a:prstGeom prst="rect">
+            <a:avLst/>
+          </a:prstGeom>
+          <a:noFill/>
+        </p:spPr>
+        <p:txBody>
+          <a:bodyPr wrap="square">
+            <a:spAutoFit/>
+          </a:bodyPr>
+          <a:lstStyle/>
+          <a:p>
+            <a:pPr marL="457200" indent="-457200">
+              <a:buFont typeface="Arial" panose="020B0604020202020204" pitchFamily="34" charset="0"/>
+              <a:buChar char="•"/>
+            </a:pPr>
+            <a:r>
+              <a:rPr lang="en-US" sz="2800"/>
+              <a:t>Extreme Programming can be defined as: software development model intended to improve software quality &amp; responsiveness to changing software requirements. </a:t>
+            </a:r>
+          </a:p>
+          <a:p>
+            <a:pPr marL="457200" indent="-457200">
+              <a:buFont typeface="Arial" panose="020B0604020202020204" pitchFamily="34" charset="0"/>
+              <a:buChar char="•"/>
+            </a:pPr>
+            <a:endParaRPr lang="en-US" sz="2800"/>
+          </a:p>
+          <a:p>
+            <a:pPr marL="457200" indent="-457200">
+              <a:buFont typeface="Arial" panose="020B0604020202020204" pitchFamily="34" charset="0"/>
+              <a:buChar char="•"/>
+            </a:pPr>
+            <a:r>
+              <a:rPr lang="en-US" sz="2800"/>
+              <a:t>In XP, there are </a:t>
+            </a:r>
+            <a:r>
+              <a:rPr lang="en-US" sz="2800" b="1"/>
+              <a:t>shorter software development cycles</a:t>
+            </a:r>
+            <a:r>
+              <a:rPr lang="en-US" sz="2800"/>
+              <a:t> where checkpoints can be incorporating new software requirements. </a:t>
+            </a:r>
           </a:p>
         </p:txBody>
       </p:sp>
@@ -9950,13 +9889,107 @@
   <p:clrMapOvr>
     <a:masterClrMapping/>
   </p:clrMapOvr>
-  <p:timing>
-    <p:tnLst>
-      <p:par>
-        <p:cTn id="1" dur="indefinite" restart="never" nodeType="tmRoot"/>
-      </p:par>
-    </p:tnLst>
-  </p:timing>
+</p:sld>
+</file>
+
+<file path=ppt/slides/slide6.xml><?xml version="1.0" encoding="utf-8"?>
+<p:sld xmlns:a="http://schemas.openxmlformats.org/drawingml/2006/main" xmlns:r="http://schemas.openxmlformats.org/officeDocument/2006/relationships" xmlns:p="http://schemas.openxmlformats.org/presentationml/2006/main">
+  <p:cSld>
+    <p:spTree>
+      <p:nvGrpSpPr>
+        <p:cNvPr id="1" name=""/>
+        <p:cNvGrpSpPr/>
+        <p:nvPr/>
+      </p:nvGrpSpPr>
+      <p:grpSpPr>
+        <a:xfrm>
+          <a:off x="0" y="0"/>
+          <a:ext cx="0" cy="0"/>
+          <a:chOff x="0" y="0"/>
+          <a:chExt cx="0" cy="0"/>
+        </a:xfrm>
+      </p:grpSpPr>
+      <p:sp>
+        <p:nvSpPr>
+          <p:cNvPr id="2" name="Title 1">
+            <a:extLst>
+              <a:ext uri="{FF2B5EF4-FFF2-40B4-BE49-F238E27FC236}">
+                <a16:creationId xmlns:a16="http://schemas.microsoft.com/office/drawing/2014/main" id="{C93B6084-F736-A941-B57C-DA4A0F990DB0}"/>
+              </a:ext>
+            </a:extLst>
+          </p:cNvPr>
+          <p:cNvSpPr>
+            <a:spLocks noGrp="1"/>
+          </p:cNvSpPr>
+          <p:nvPr>
+            <p:ph type="title"/>
+          </p:nvPr>
+        </p:nvSpPr>
+        <p:spPr>
+          <a:xfrm>
+            <a:off x="129752" y="365125"/>
+            <a:ext cx="11224048" cy="1460500"/>
+          </a:xfrm>
+        </p:spPr>
+        <p:txBody>
+          <a:bodyPr/>
+          <a:lstStyle/>
+          <a:p>
+            <a:r>
+              <a:rPr lang="en-US"/>
+              <a:t>Extreme Programming (XP) - </a:t>
+            </a:r>
+            <a:r>
+              <a:rPr lang="en-US" b="1"/>
+              <a:t>Diagram</a:t>
+            </a:r>
+            <a:endParaRPr lang="en-US"/>
+          </a:p>
+        </p:txBody>
+      </p:sp>
+      <p:sp>
+        <p:nvSpPr>
+          <p:cNvPr id="6" name="TextBox 5">
+            <a:extLst>
+              <a:ext uri="{FF2B5EF4-FFF2-40B4-BE49-F238E27FC236}">
+                <a16:creationId xmlns:a16="http://schemas.microsoft.com/office/drawing/2014/main" id="{4E292BAC-9FB4-7241-A8BB-F0A7AC4E93FD}"/>
+              </a:ext>
+            </a:extLst>
+          </p:cNvPr>
+          <p:cNvSpPr txBox="1"/>
+          <p:nvPr/>
+        </p:nvSpPr>
+        <p:spPr>
+          <a:xfrm>
+            <a:off x="5124980" y="2512241"/>
+            <a:ext cx="1828800" cy="1828800"/>
+          </a:xfrm>
+          <a:prstGeom prst="rect">
+            <a:avLst/>
+          </a:prstGeom>
+          <a:noFill/>
+        </p:spPr>
+        <p:txBody>
+          <a:bodyPr wrap="square" rtlCol="0">
+            <a:spAutoFit/>
+          </a:bodyPr>
+          <a:lstStyle/>
+          <a:p>
+            <a:pPr algn="l"/>
+            <a:endParaRPr lang="en-US"/>
+          </a:p>
+        </p:txBody>
+      </p:sp>
+    </p:spTree>
+    <p:extLst>
+      <p:ext uri="{BB962C8B-B14F-4D97-AF65-F5344CB8AC3E}">
+        <p14:creationId xmlns:p14="http://schemas.microsoft.com/office/powerpoint/2010/main" val="1286191198"/>
+      </p:ext>
+    </p:extLst>
+  </p:cSld>
+  <p:clrMapOvr>
+    <a:masterClrMapping/>
+  </p:clrMapOvr>
 </p:sld>
 </file>
 

</xml_diff>

<commit_message>
edited Sudip's presentation a bit
</commit_message>
<xml_diff>
--- a/extreme_programming.pptx
+++ b/extreme_programming.pptx
@@ -7683,6 +7683,90 @@
 </file>
 
 <file path=ppt/notesSlides/notesSlide4.xml><?xml version="1.0" encoding="utf-8"?>
+<p:notes xmlns:a="http://schemas.openxmlformats.org/drawingml/2006/main" xmlns:r="http://schemas.openxmlformats.org/officeDocument/2006/relationships" xmlns:p="http://schemas.openxmlformats.org/presentationml/2006/main">
+  <p:cSld>
+    <p:spTree>
+      <p:nvGrpSpPr>
+        <p:cNvPr id="1" name=""/>
+        <p:cNvGrpSpPr/>
+        <p:nvPr/>
+      </p:nvGrpSpPr>
+      <p:grpSpPr>
+        <a:xfrm>
+          <a:off x="0" y="0"/>
+          <a:ext cx="0" cy="0"/>
+          <a:chOff x="0" y="0"/>
+          <a:chExt cx="0" cy="0"/>
+        </a:xfrm>
+      </p:grpSpPr>
+      <p:sp>
+        <p:nvSpPr>
+          <p:cNvPr id="2" name="Slide Image Placeholder 1"/>
+          <p:cNvSpPr>
+            <a:spLocks noGrp="1" noRot="1" noChangeAspect="1"/>
+          </p:cNvSpPr>
+          <p:nvPr>
+            <p:ph type="sldImg"/>
+          </p:nvPr>
+        </p:nvSpPr>
+        <p:spPr/>
+      </p:sp>
+      <p:sp>
+        <p:nvSpPr>
+          <p:cNvPr id="3" name="Notes Placeholder 2"/>
+          <p:cNvSpPr>
+            <a:spLocks noGrp="1"/>
+          </p:cNvSpPr>
+          <p:nvPr>
+            <p:ph type="body" idx="1"/>
+          </p:nvPr>
+        </p:nvSpPr>
+        <p:spPr/>
+        <p:txBody>
+          <a:bodyPr/>
+          <a:lstStyle/>
+          <a:p>
+            <a:endParaRPr lang="en-US" dirty="0"/>
+          </a:p>
+        </p:txBody>
+      </p:sp>
+      <p:sp>
+        <p:nvSpPr>
+          <p:cNvPr id="4" name="Slide Number Placeholder 3"/>
+          <p:cNvSpPr>
+            <a:spLocks noGrp="1"/>
+          </p:cNvSpPr>
+          <p:nvPr>
+            <p:ph type="sldNum" sz="quarter" idx="10"/>
+          </p:nvPr>
+        </p:nvSpPr>
+        <p:spPr/>
+        <p:txBody>
+          <a:bodyPr/>
+          <a:lstStyle/>
+          <a:p>
+            <a:fld id="{76E79186-0F7F-4415-A6CE-613EF7028156}" type="slidenum">
+              <a:rPr lang="en-US" smtClean="0"/>
+              <a:t>9</a:t>
+            </a:fld>
+            <a:endParaRPr lang="en-US"/>
+          </a:p>
+        </p:txBody>
+      </p:sp>
+    </p:spTree>
+    <p:extLst>
+      <p:ext uri="{BB962C8B-B14F-4D97-AF65-F5344CB8AC3E}">
+        <p14:creationId xmlns:p14="http://schemas.microsoft.com/office/powerpoint/2010/main" val="3896336248"/>
+      </p:ext>
+    </p:extLst>
+  </p:cSld>
+  <p:clrMapOvr>
+    <a:masterClrMapping/>
+  </p:clrMapOvr>
+</p:notes>
+</file>
+
+<file path=ppt/notesSlides/notesSlide5.xml><?xml version="1.0" encoding="utf-8"?>
 <p:notes xmlns:a="http://schemas.openxmlformats.org/drawingml/2006/main" xmlns:r="http://schemas.openxmlformats.org/officeDocument/2006/relationships" xmlns:p="http://schemas.openxmlformats.org/presentationml/2006/main">
   <p:cSld>
     <p:spTree>
@@ -14084,11 +14168,11 @@
             <p:nvPr/>
           </p:nvPicPr>
           <p:blipFill>
-            <a:blip r:embed="rId2">
+            <a:blip r:embed="rId3">
               <a:extLst>
                 <a:ext uri="{BEBA8EAE-BF5A-486C-A8C5-ECC9F3942E4B}">
                   <a14:imgProps xmlns:a14="http://schemas.microsoft.com/office/drawing/2010/main">
-                    <a14:imgLayer r:embed="rId3">
+                    <a14:imgLayer r:embed="rId4">
                       <a14:imgEffect>
                         <a14:brightnessContrast bright="-40000"/>
                       </a14:imgEffect>

</xml_diff>